<commit_message>
Added some slides showing an example of a protected object.
</commit_message>
<xml_diff>
--- a/doc/Presentations/CubedOS-Architecture.pptx
+++ b/doc/Presentations/CubedOS-Architecture.pptx
@@ -10,22 +10,26 @@
     <p:sldId id="258" r:id="rId4"/>
     <p:sldId id="259" r:id="rId5"/>
     <p:sldId id="260" r:id="rId6"/>
-    <p:sldId id="263" r:id="rId7"/>
-    <p:sldId id="261" r:id="rId8"/>
-    <p:sldId id="262" r:id="rId9"/>
-    <p:sldId id="264" r:id="rId10"/>
-    <p:sldId id="265" r:id="rId11"/>
-    <p:sldId id="266" r:id="rId12"/>
-    <p:sldId id="267" r:id="rId13"/>
-    <p:sldId id="268" r:id="rId14"/>
-    <p:sldId id="269" r:id="rId15"/>
-    <p:sldId id="270" r:id="rId16"/>
-    <p:sldId id="271" r:id="rId17"/>
-    <p:sldId id="272" r:id="rId18"/>
-    <p:sldId id="273" r:id="rId19"/>
-    <p:sldId id="274" r:id="rId20"/>
-    <p:sldId id="275" r:id="rId21"/>
-    <p:sldId id="276" r:id="rId22"/>
+    <p:sldId id="277" r:id="rId7"/>
+    <p:sldId id="278" r:id="rId8"/>
+    <p:sldId id="279" r:id="rId9"/>
+    <p:sldId id="280" r:id="rId10"/>
+    <p:sldId id="263" r:id="rId11"/>
+    <p:sldId id="261" r:id="rId12"/>
+    <p:sldId id="262" r:id="rId13"/>
+    <p:sldId id="264" r:id="rId14"/>
+    <p:sldId id="265" r:id="rId15"/>
+    <p:sldId id="266" r:id="rId16"/>
+    <p:sldId id="267" r:id="rId17"/>
+    <p:sldId id="268" r:id="rId18"/>
+    <p:sldId id="269" r:id="rId19"/>
+    <p:sldId id="270" r:id="rId20"/>
+    <p:sldId id="271" r:id="rId21"/>
+    <p:sldId id="272" r:id="rId22"/>
+    <p:sldId id="273" r:id="rId23"/>
+    <p:sldId id="274" r:id="rId24"/>
+    <p:sldId id="275" r:id="rId25"/>
+    <p:sldId id="276" r:id="rId26"/>
   </p:sldIdLst>
   <p:sldSz cx="12192000" cy="6858000"/>
   <p:notesSz cx="6858000" cy="9144000"/>
@@ -279,7 +283,7 @@
           <a:p>
             <a:fld id="{2D99F525-C6F0-44FD-B99C-64DA053E8B7B}" type="datetimeFigureOut">
               <a:rPr lang="en-US" smtClean="0"/>
-              <a:t>2021-07-15</a:t>
+              <a:t>2021-07-22</a:t>
             </a:fld>
             <a:endParaRPr lang="en-US"/>
           </a:p>
@@ -477,7 +481,7 @@
           <a:p>
             <a:fld id="{2D99F525-C6F0-44FD-B99C-64DA053E8B7B}" type="datetimeFigureOut">
               <a:rPr lang="en-US" smtClean="0"/>
-              <a:t>2021-07-15</a:t>
+              <a:t>2021-07-22</a:t>
             </a:fld>
             <a:endParaRPr lang="en-US"/>
           </a:p>
@@ -685,7 +689,7 @@
           <a:p>
             <a:fld id="{2D99F525-C6F0-44FD-B99C-64DA053E8B7B}" type="datetimeFigureOut">
               <a:rPr lang="en-US" smtClean="0"/>
-              <a:t>2021-07-15</a:t>
+              <a:t>2021-07-22</a:t>
             </a:fld>
             <a:endParaRPr lang="en-US"/>
           </a:p>
@@ -883,7 +887,7 @@
           <a:p>
             <a:fld id="{2D99F525-C6F0-44FD-B99C-64DA053E8B7B}" type="datetimeFigureOut">
               <a:rPr lang="en-US" smtClean="0"/>
-              <a:t>2021-07-15</a:t>
+              <a:t>2021-07-22</a:t>
             </a:fld>
             <a:endParaRPr lang="en-US"/>
           </a:p>
@@ -1158,7 +1162,7 @@
           <a:p>
             <a:fld id="{2D99F525-C6F0-44FD-B99C-64DA053E8B7B}" type="datetimeFigureOut">
               <a:rPr lang="en-US" smtClean="0"/>
-              <a:t>2021-07-15</a:t>
+              <a:t>2021-07-22</a:t>
             </a:fld>
             <a:endParaRPr lang="en-US"/>
           </a:p>
@@ -1423,7 +1427,7 @@
           <a:p>
             <a:fld id="{2D99F525-C6F0-44FD-B99C-64DA053E8B7B}" type="datetimeFigureOut">
               <a:rPr lang="en-US" smtClean="0"/>
-              <a:t>2021-07-15</a:t>
+              <a:t>2021-07-22</a:t>
             </a:fld>
             <a:endParaRPr lang="en-US"/>
           </a:p>
@@ -1835,7 +1839,7 @@
           <a:p>
             <a:fld id="{2D99F525-C6F0-44FD-B99C-64DA053E8B7B}" type="datetimeFigureOut">
               <a:rPr lang="en-US" smtClean="0"/>
-              <a:t>2021-07-15</a:t>
+              <a:t>2021-07-22</a:t>
             </a:fld>
             <a:endParaRPr lang="en-US"/>
           </a:p>
@@ -1976,7 +1980,7 @@
           <a:p>
             <a:fld id="{2D99F525-C6F0-44FD-B99C-64DA053E8B7B}" type="datetimeFigureOut">
               <a:rPr lang="en-US" smtClean="0"/>
-              <a:t>2021-07-15</a:t>
+              <a:t>2021-07-22</a:t>
             </a:fld>
             <a:endParaRPr lang="en-US"/>
           </a:p>
@@ -2089,7 +2093,7 @@
           <a:p>
             <a:fld id="{2D99F525-C6F0-44FD-B99C-64DA053E8B7B}" type="datetimeFigureOut">
               <a:rPr lang="en-US" smtClean="0"/>
-              <a:t>2021-07-15</a:t>
+              <a:t>2021-07-22</a:t>
             </a:fld>
             <a:endParaRPr lang="en-US"/>
           </a:p>
@@ -2400,7 +2404,7 @@
           <a:p>
             <a:fld id="{2D99F525-C6F0-44FD-B99C-64DA053E8B7B}" type="datetimeFigureOut">
               <a:rPr lang="en-US" smtClean="0"/>
-              <a:t>2021-07-15</a:t>
+              <a:t>2021-07-22</a:t>
             </a:fld>
             <a:endParaRPr lang="en-US"/>
           </a:p>
@@ -2688,7 +2692,7 @@
           <a:p>
             <a:fld id="{2D99F525-C6F0-44FD-B99C-64DA053E8B7B}" type="datetimeFigureOut">
               <a:rPr lang="en-US" smtClean="0"/>
-              <a:t>2021-07-15</a:t>
+              <a:t>2021-07-22</a:t>
             </a:fld>
             <a:endParaRPr lang="en-US"/>
           </a:p>
@@ -2929,7 +2933,7 @@
           <a:p>
             <a:fld id="{2D99F525-C6F0-44FD-B99C-64DA053E8B7B}" type="datetimeFigureOut">
               <a:rPr lang="en-US" smtClean="0"/>
-              <a:t>2021-07-15</a:t>
+              <a:t>2021-07-22</a:t>
             </a:fld>
             <a:endParaRPr lang="en-US"/>
           </a:p>
@@ -3437,7 +3441,7 @@
           <p:cNvPr id="2" name="Title 1">
             <a:extLst>
               <a:ext uri="{FF2B5EF4-FFF2-40B4-BE49-F238E27FC236}">
-                <a16:creationId xmlns:a16="http://schemas.microsoft.com/office/drawing/2014/main" id="{2B4F0480-03F7-47BC-8CDF-0FE30F883853}"/>
+                <a16:creationId xmlns:a16="http://schemas.microsoft.com/office/drawing/2014/main" id="{99DB4545-9E72-4096-B27E-0B5DF935AD7D}"/>
               </a:ext>
             </a:extLst>
           </p:cNvPr>
@@ -3455,7 +3459,7 @@
           <a:p>
             <a:r>
               <a:rPr lang="en-US" dirty="0"/>
-              <a:t>Advantages</a:t>
+              <a:t>Modules vs Libraries</a:t>
             </a:r>
           </a:p>
         </p:txBody>
@@ -3465,7 +3469,7 @@
           <p:cNvPr id="3" name="Content Placeholder 2">
             <a:extLst>
               <a:ext uri="{FF2B5EF4-FFF2-40B4-BE49-F238E27FC236}">
-                <a16:creationId xmlns:a16="http://schemas.microsoft.com/office/drawing/2014/main" id="{97410E0E-EAB5-4971-8DFD-D7642EDB8302}"/>
+                <a16:creationId xmlns:a16="http://schemas.microsoft.com/office/drawing/2014/main" id="{AFC8F00F-1A69-4936-93A7-75E2AC6D7ACC}"/>
               </a:ext>
             </a:extLst>
           </p:cNvPr>
@@ -3483,19 +3487,43 @@
           <a:p>
             <a:r>
               <a:rPr lang="en-US" dirty="0"/>
-              <a:t>The protected objects can be tuned to transmit only the information needed so the overhead can be kept minimal</a:t>
-            </a:r>
-          </a:p>
-          <a:p>
-            <a:r>
-              <a:rPr lang="en-US" dirty="0"/>
-              <a:t>The parameters of the protected procedures and entries specify the precise types of the data transferred so compile-time type safety is provided</a:t>
-            </a:r>
-          </a:p>
-          <a:p>
-            <a:r>
-              <a:rPr lang="en-US" dirty="0"/>
-              <a:t>The communication patterns of the application are known statically, facilitating analysis</a:t>
+              <a:t>A CubedOS application can also make use of ordinary Ada package libraries. However…</a:t>
+            </a:r>
+          </a:p>
+          <a:p>
+            <a:pPr lvl="1"/>
+            <a:r>
+              <a:rPr lang="en-US" dirty="0"/>
+              <a:t>Communication between modules is only intended to be done via stand alone POs that are touched by the primary tasks; not via shared data inside a library package.</a:t>
+            </a:r>
+          </a:p>
+          <a:p>
+            <a:pPr lvl="1"/>
+            <a:r>
+              <a:rPr lang="en-US" dirty="0"/>
+              <a:t>Package libraries must therefor be task-safe and contain only pure (</a:t>
+            </a:r>
+            <a:r>
+              <a:rPr lang="en-US" dirty="0" err="1"/>
+              <a:t>i</a:t>
+            </a:r>
+            <a:r>
+              <a:rPr lang="en-US" dirty="0"/>
+              <a:t>. e., side effect-free) code.</a:t>
+            </a:r>
+          </a:p>
+          <a:p>
+            <a:pPr lvl="1"/>
+            <a:r>
+              <a:rPr lang="en-US" dirty="0"/>
+              <a:t>Currently there is no automatic checking of this, but SPARK will prevent egregious violations.</a:t>
+            </a:r>
+          </a:p>
+          <a:p>
+            <a:pPr lvl="1"/>
+            <a:r>
+              <a:rPr lang="en-US" i="1" dirty="0"/>
+              <a:t>There is no back door method for modules to communicate!</a:t>
             </a:r>
           </a:p>
         </p:txBody>
@@ -3503,7 +3531,7 @@
     </p:spTree>
     <p:extLst>
       <p:ext uri="{BB962C8B-B14F-4D97-AF65-F5344CB8AC3E}">
-        <p14:creationId xmlns:p14="http://schemas.microsoft.com/office/powerpoint/2010/main" val="3860249526"/>
+        <p14:creationId xmlns:p14="http://schemas.microsoft.com/office/powerpoint/2010/main" val="3223411626"/>
       </p:ext>
     </p:extLst>
   </p:cSld>
@@ -3535,7 +3563,7 @@
           <p:cNvPr id="2" name="Title 1">
             <a:extLst>
               <a:ext uri="{FF2B5EF4-FFF2-40B4-BE49-F238E27FC236}">
-                <a16:creationId xmlns:a16="http://schemas.microsoft.com/office/drawing/2014/main" id="{D16F2AA1-3AB5-4D43-A3A7-AACB72531155}"/>
+                <a16:creationId xmlns:a16="http://schemas.microsoft.com/office/drawing/2014/main" id="{EB734359-A3AE-4CA5-AFB7-7F9CF217D0A8}"/>
               </a:ext>
             </a:extLst>
           </p:cNvPr>
@@ -3553,7 +3581,7 @@
           <a:p>
             <a:r>
               <a:rPr lang="en-US" dirty="0"/>
-              <a:t>Disadvantages</a:t>
+              <a:t>Ravenscar</a:t>
             </a:r>
           </a:p>
         </p:txBody>
@@ -3563,7 +3591,7 @@
           <p:cNvPr id="3" name="Content Placeholder 2">
             <a:extLst>
               <a:ext uri="{FF2B5EF4-FFF2-40B4-BE49-F238E27FC236}">
-                <a16:creationId xmlns:a16="http://schemas.microsoft.com/office/drawing/2014/main" id="{C394B02F-1D6C-4EF8-80C5-338C7A2EF288}"/>
+                <a16:creationId xmlns:a16="http://schemas.microsoft.com/office/drawing/2014/main" id="{98EFF623-7294-46A2-B346-31020D1CBAF4}"/>
               </a:ext>
             </a:extLst>
           </p:cNvPr>
@@ -3577,25 +3605,83 @@
         <p:spPr/>
         <p:txBody>
           <a:bodyPr>
-            <a:normAutofit/>
+            <a:normAutofit lnSpcReduction="10000"/>
           </a:bodyPr>
           <a:lstStyle/>
           <a:p>
             <a:r>
               <a:rPr lang="en-US" dirty="0"/>
-              <a:t>The protected objects must all be custom designed and individually implemented, creating a burden for the application developer</a:t>
-            </a:r>
-          </a:p>
-          <a:p>
-            <a:r>
-              <a:rPr lang="en-US" dirty="0"/>
-              <a:t>The communication patterns are relatively inflexible. Changing them requires overhauling the application</a:t>
-            </a:r>
-          </a:p>
-          <a:p>
-            <a:r>
-              <a:rPr lang="en-US" dirty="0"/>
-              <a:t>Third-party library components are awkward to write since they would have to know about the protected objects that are available in the application in order to communicate. This is a particular problem for client/server oriented systems where a general purpose, reusable server component needs some way to send replies to clients for which it has no prior knowledge.</a:t>
+              <a:t>Ada standard allows </a:t>
+            </a:r>
+            <a:r>
+              <a:rPr lang="en-US" i="1" dirty="0"/>
+              <a:t>profiles</a:t>
+            </a:r>
+            <a:r>
+              <a:rPr lang="en-US" dirty="0"/>
+              <a:t> that limit the language in various ways</a:t>
+            </a:r>
+          </a:p>
+          <a:p>
+            <a:r>
+              <a:rPr lang="en-US" dirty="0"/>
+              <a:t>Ravenscar is a profile that limits the tasking features of Ada</a:t>
+            </a:r>
+          </a:p>
+          <a:p>
+            <a:pPr lvl="1"/>
+            <a:r>
+              <a:rPr lang="en-US" dirty="0"/>
+              <a:t>… to make programs more analyzable.</a:t>
+            </a:r>
+          </a:p>
+          <a:p>
+            <a:pPr lvl="1"/>
+            <a:r>
+              <a:rPr lang="en-US" dirty="0"/>
+              <a:t>… to simplify the runtime system requirements.</a:t>
+            </a:r>
+          </a:p>
+          <a:p>
+            <a:r>
+              <a:rPr lang="en-US" dirty="0"/>
+              <a:t>Under Ravenscar:</a:t>
+            </a:r>
+          </a:p>
+          <a:p>
+            <a:pPr lvl="1"/>
+            <a:r>
+              <a:rPr lang="en-US" dirty="0"/>
+              <a:t>POs can have only a single entry (full Ada allows multiple entries).</a:t>
+            </a:r>
+          </a:p>
+          <a:p>
+            <a:pPr lvl="1"/>
+            <a:r>
+              <a:rPr lang="en-US" dirty="0"/>
+              <a:t>Barrier conditions must be “simple” (full Ada allows complex expressions).</a:t>
+            </a:r>
+          </a:p>
+          <a:p>
+            <a:pPr lvl="1"/>
+            <a:r>
+              <a:rPr lang="en-US" dirty="0"/>
+              <a:t>Only one task can be queued waiting on an entry (full Ada allows multiple tasks to be queued).</a:t>
+            </a:r>
+          </a:p>
+          <a:p>
+            <a:pPr lvl="1"/>
+            <a:r>
+              <a:rPr lang="en-US" dirty="0"/>
+              <a:t>All tasks must be at </a:t>
+            </a:r>
+            <a:r>
+              <a:rPr lang="en-US" i="1" dirty="0"/>
+              <a:t>library level </a:t>
+            </a:r>
+            <a:r>
+              <a:rPr lang="en-US" dirty="0"/>
+              <a:t>and be infinite loops (full Ada allows nested tasks, tasks inside subprograms, and task termination).</a:t>
             </a:r>
           </a:p>
         </p:txBody>
@@ -3603,7 +3689,7 @@
     </p:spTree>
     <p:extLst>
       <p:ext uri="{BB962C8B-B14F-4D97-AF65-F5344CB8AC3E}">
-        <p14:creationId xmlns:p14="http://schemas.microsoft.com/office/powerpoint/2010/main" val="2190874393"/>
+        <p14:creationId xmlns:p14="http://schemas.microsoft.com/office/powerpoint/2010/main" val="224088908"/>
       </p:ext>
     </p:extLst>
   </p:cSld>
@@ -3635,6 +3721,470 @@
           <p:cNvPr id="2" name="Title 1">
             <a:extLst>
               <a:ext uri="{FF2B5EF4-FFF2-40B4-BE49-F238E27FC236}">
+                <a16:creationId xmlns:a16="http://schemas.microsoft.com/office/drawing/2014/main" id="{B914E860-C560-4EB7-AD8D-048FAA144FCD}"/>
+              </a:ext>
+            </a:extLst>
+          </p:cNvPr>
+          <p:cNvSpPr>
+            <a:spLocks noGrp="1"/>
+          </p:cNvSpPr>
+          <p:nvPr>
+            <p:ph type="title"/>
+          </p:nvPr>
+        </p:nvSpPr>
+        <p:spPr/>
+        <p:txBody>
+          <a:bodyPr/>
+          <a:lstStyle/>
+          <a:p>
+            <a:r>
+              <a:rPr lang="en-US" dirty="0" err="1"/>
+              <a:t>Jorvik</a:t>
+            </a:r>
+            <a:endParaRPr lang="en-US" dirty="0"/>
+          </a:p>
+        </p:txBody>
+      </p:sp>
+      <p:sp>
+        <p:nvSpPr>
+          <p:cNvPr id="3" name="Content Placeholder 2">
+            <a:extLst>
+              <a:ext uri="{FF2B5EF4-FFF2-40B4-BE49-F238E27FC236}">
+                <a16:creationId xmlns:a16="http://schemas.microsoft.com/office/drawing/2014/main" id="{C1EC5B3F-C721-4F12-B32F-6A000BADC240}"/>
+              </a:ext>
+            </a:extLst>
+          </p:cNvPr>
+          <p:cNvSpPr>
+            <a:spLocks noGrp="1"/>
+          </p:cNvSpPr>
+          <p:nvPr>
+            <p:ph idx="1"/>
+          </p:nvPr>
+        </p:nvSpPr>
+        <p:spPr/>
+        <p:txBody>
+          <a:bodyPr/>
+          <a:lstStyle/>
+          <a:p>
+            <a:r>
+              <a:rPr lang="en-US" dirty="0"/>
+              <a:t>Ada 2022 will also support the </a:t>
+            </a:r>
+            <a:r>
+              <a:rPr lang="en-US" dirty="0" err="1"/>
+              <a:t>Jorvik</a:t>
+            </a:r>
+            <a:r>
+              <a:rPr lang="en-US" dirty="0"/>
+              <a:t> profile. It is like Ravenscar, but less limited</a:t>
+            </a:r>
+          </a:p>
+          <a:p>
+            <a:pPr lvl="1"/>
+            <a:r>
+              <a:rPr lang="en-US" dirty="0"/>
+              <a:t>POs can have multiple entries.</a:t>
+            </a:r>
+          </a:p>
+          <a:p>
+            <a:pPr lvl="1"/>
+            <a:r>
+              <a:rPr lang="en-US" dirty="0"/>
+              <a:t>Barrier conditions can be less “simple.”</a:t>
+            </a:r>
+          </a:p>
+          <a:p>
+            <a:r>
+              <a:rPr lang="en-US" dirty="0"/>
+              <a:t>CubedOS uses Ravenscar, but does not use </a:t>
+            </a:r>
+            <a:r>
+              <a:rPr lang="en-US" dirty="0" err="1"/>
+              <a:t>Jorvik</a:t>
+            </a:r>
+            <a:r>
+              <a:rPr lang="en-US" dirty="0"/>
+              <a:t> at this time</a:t>
+            </a:r>
+          </a:p>
+          <a:p>
+            <a:pPr lvl="1"/>
+            <a:r>
+              <a:rPr lang="en-US" dirty="0"/>
+              <a:t>… but may in the future if it seems necessary or useful.</a:t>
+            </a:r>
+          </a:p>
+          <a:p>
+            <a:pPr lvl="1"/>
+            <a:r>
+              <a:rPr lang="en-US" dirty="0"/>
+              <a:t>The “simple” barrier conditions do cause some difficulties for CubedOS, and </a:t>
+            </a:r>
+            <a:r>
+              <a:rPr lang="en-US" dirty="0" err="1"/>
+              <a:t>Jorvik</a:t>
+            </a:r>
+            <a:r>
+              <a:rPr lang="en-US" dirty="0"/>
+              <a:t> eliminates that issue.</a:t>
+            </a:r>
+          </a:p>
+        </p:txBody>
+      </p:sp>
+    </p:spTree>
+    <p:extLst>
+      <p:ext uri="{BB962C8B-B14F-4D97-AF65-F5344CB8AC3E}">
+        <p14:creationId xmlns:p14="http://schemas.microsoft.com/office/powerpoint/2010/main" val="1732198395"/>
+      </p:ext>
+    </p:extLst>
+  </p:cSld>
+  <p:clrMapOvr>
+    <a:masterClrMapping/>
+  </p:clrMapOvr>
+</p:sld>
+</file>
+
+<file path=ppt/slides/slide13.xml><?xml version="1.0" encoding="utf-8"?>
+<p:sld xmlns:a="http://schemas.openxmlformats.org/drawingml/2006/main" xmlns:r="http://schemas.openxmlformats.org/officeDocument/2006/relationships" xmlns:p="http://schemas.openxmlformats.org/presentationml/2006/main">
+  <p:cSld>
+    <p:spTree>
+      <p:nvGrpSpPr>
+        <p:cNvPr id="1" name=""/>
+        <p:cNvGrpSpPr/>
+        <p:nvPr/>
+      </p:nvGrpSpPr>
+      <p:grpSpPr>
+        <a:xfrm>
+          <a:off x="0" y="0"/>
+          <a:ext cx="0" cy="0"/>
+          <a:chOff x="0" y="0"/>
+          <a:chExt cx="0" cy="0"/>
+        </a:xfrm>
+      </p:grpSpPr>
+      <p:sp>
+        <p:nvSpPr>
+          <p:cNvPr id="2" name="Title 1">
+            <a:extLst>
+              <a:ext uri="{FF2B5EF4-FFF2-40B4-BE49-F238E27FC236}">
+                <a16:creationId xmlns:a16="http://schemas.microsoft.com/office/drawing/2014/main" id="{28F14640-6503-4EED-B8DC-F6E191E3CF83}"/>
+              </a:ext>
+            </a:extLst>
+          </p:cNvPr>
+          <p:cNvSpPr>
+            <a:spLocks noGrp="1"/>
+          </p:cNvSpPr>
+          <p:nvPr>
+            <p:ph type="title"/>
+          </p:nvPr>
+        </p:nvSpPr>
+        <p:spPr/>
+        <p:txBody>
+          <a:bodyPr/>
+          <a:lstStyle/>
+          <a:p>
+            <a:r>
+              <a:rPr lang="en-US" dirty="0"/>
+              <a:t>General Ravenscar System</a:t>
+            </a:r>
+          </a:p>
+        </p:txBody>
+      </p:sp>
+      <p:graphicFrame>
+        <p:nvGraphicFramePr>
+          <p:cNvPr id="4" name="Object 3">
+            <a:extLst>
+              <a:ext uri="{FF2B5EF4-FFF2-40B4-BE49-F238E27FC236}">
+                <a16:creationId xmlns:a16="http://schemas.microsoft.com/office/drawing/2014/main" id="{D7CB1DDB-A130-4009-9839-30B5035882F6}"/>
+              </a:ext>
+            </a:extLst>
+          </p:cNvPr>
+          <p:cNvGraphicFramePr>
+            <a:graphicFrameLocks noChangeAspect="1"/>
+          </p:cNvGraphicFramePr>
+          <p:nvPr>
+            <p:extLst>
+              <p:ext uri="{D42A27DB-BD31-4B8C-83A1-F6EECF244321}">
+                <p14:modId xmlns:p14="http://schemas.microsoft.com/office/powerpoint/2010/main" val="3713236866"/>
+              </p:ext>
+            </p:extLst>
+          </p:nvPr>
+        </p:nvGraphicFramePr>
+        <p:xfrm>
+          <a:off x="3764756" y="2629694"/>
+          <a:ext cx="4662488" cy="2743200"/>
+        </p:xfrm>
+        <a:graphic>
+          <a:graphicData uri="http://schemas.openxmlformats.org/presentationml/2006/ole">
+            <mc:AlternateContent xmlns:mc="http://schemas.openxmlformats.org/markup-compatibility/2006">
+              <mc:Choice xmlns:v="urn:schemas-microsoft-com:vml" Requires="v">
+                <p:oleObj spid="_x0000_s1034" name="Acrobat Document" r:id="rId3" imgW="4663262" imgH="2743200" progId="Acrobat.Document.DC">
+                  <p:embed/>
+                </p:oleObj>
+              </mc:Choice>
+              <mc:Fallback>
+                <p:oleObj name="Acrobat Document" r:id="rId3" imgW="4663262" imgH="2743200" progId="Acrobat.Document.DC">
+                  <p:embed/>
+                  <p:pic>
+                    <p:nvPicPr>
+                      <p:cNvPr id="0" name=""/>
+                      <p:cNvPicPr/>
+                      <p:nvPr/>
+                    </p:nvPicPr>
+                    <p:blipFill>
+                      <a:blip r:embed="rId4"/>
+                      <a:stretch>
+                        <a:fillRect/>
+                      </a:stretch>
+                    </p:blipFill>
+                    <p:spPr>
+                      <a:xfrm>
+                        <a:off x="3764756" y="2629694"/>
+                        <a:ext cx="4662488" cy="2743200"/>
+                      </a:xfrm>
+                      <a:prstGeom prst="rect">
+                        <a:avLst/>
+                      </a:prstGeom>
+                    </p:spPr>
+                  </p:pic>
+                </p:oleObj>
+              </mc:Fallback>
+            </mc:AlternateContent>
+          </a:graphicData>
+        </a:graphic>
+      </p:graphicFrame>
+    </p:spTree>
+    <p:extLst>
+      <p:ext uri="{BB962C8B-B14F-4D97-AF65-F5344CB8AC3E}">
+        <p14:creationId xmlns:p14="http://schemas.microsoft.com/office/powerpoint/2010/main" val="4194120168"/>
+      </p:ext>
+    </p:extLst>
+  </p:cSld>
+  <p:clrMapOvr>
+    <a:masterClrMapping/>
+  </p:clrMapOvr>
+</p:sld>
+</file>
+
+<file path=ppt/slides/slide14.xml><?xml version="1.0" encoding="utf-8"?>
+<p:sld xmlns:a="http://schemas.openxmlformats.org/drawingml/2006/main" xmlns:r="http://schemas.openxmlformats.org/officeDocument/2006/relationships" xmlns:p="http://schemas.openxmlformats.org/presentationml/2006/main">
+  <p:cSld>
+    <p:spTree>
+      <p:nvGrpSpPr>
+        <p:cNvPr id="1" name=""/>
+        <p:cNvGrpSpPr/>
+        <p:nvPr/>
+      </p:nvGrpSpPr>
+      <p:grpSpPr>
+        <a:xfrm>
+          <a:off x="0" y="0"/>
+          <a:ext cx="0" cy="0"/>
+          <a:chOff x="0" y="0"/>
+          <a:chExt cx="0" cy="0"/>
+        </a:xfrm>
+      </p:grpSpPr>
+      <p:sp>
+        <p:nvSpPr>
+          <p:cNvPr id="2" name="Title 1">
+            <a:extLst>
+              <a:ext uri="{FF2B5EF4-FFF2-40B4-BE49-F238E27FC236}">
+                <a16:creationId xmlns:a16="http://schemas.microsoft.com/office/drawing/2014/main" id="{2B4F0480-03F7-47BC-8CDF-0FE30F883853}"/>
+              </a:ext>
+            </a:extLst>
+          </p:cNvPr>
+          <p:cNvSpPr>
+            <a:spLocks noGrp="1"/>
+          </p:cNvSpPr>
+          <p:nvPr>
+            <p:ph type="title"/>
+          </p:nvPr>
+        </p:nvSpPr>
+        <p:spPr/>
+        <p:txBody>
+          <a:bodyPr/>
+          <a:lstStyle/>
+          <a:p>
+            <a:r>
+              <a:rPr lang="en-US" dirty="0"/>
+              <a:t>Advantages</a:t>
+            </a:r>
+          </a:p>
+        </p:txBody>
+      </p:sp>
+      <p:sp>
+        <p:nvSpPr>
+          <p:cNvPr id="3" name="Content Placeholder 2">
+            <a:extLst>
+              <a:ext uri="{FF2B5EF4-FFF2-40B4-BE49-F238E27FC236}">
+                <a16:creationId xmlns:a16="http://schemas.microsoft.com/office/drawing/2014/main" id="{97410E0E-EAB5-4971-8DFD-D7642EDB8302}"/>
+              </a:ext>
+            </a:extLst>
+          </p:cNvPr>
+          <p:cNvSpPr>
+            <a:spLocks noGrp="1"/>
+          </p:cNvSpPr>
+          <p:nvPr>
+            <p:ph idx="1"/>
+          </p:nvPr>
+        </p:nvSpPr>
+        <p:spPr/>
+        <p:txBody>
+          <a:bodyPr/>
+          <a:lstStyle/>
+          <a:p>
+            <a:r>
+              <a:rPr lang="en-US" dirty="0"/>
+              <a:t>The protected objects can be tuned to transmit only the information needed so the overhead can be kept minimal</a:t>
+            </a:r>
+          </a:p>
+          <a:p>
+            <a:r>
+              <a:rPr lang="en-US" dirty="0"/>
+              <a:t>The parameters of the protected procedures and entries specify the precise types of the data transferred so compile-time type safety is provided</a:t>
+            </a:r>
+          </a:p>
+          <a:p>
+            <a:r>
+              <a:rPr lang="en-US" dirty="0"/>
+              <a:t>The communication patterns of the application are known statically, facilitating analysis</a:t>
+            </a:r>
+          </a:p>
+        </p:txBody>
+      </p:sp>
+    </p:spTree>
+    <p:extLst>
+      <p:ext uri="{BB962C8B-B14F-4D97-AF65-F5344CB8AC3E}">
+        <p14:creationId xmlns:p14="http://schemas.microsoft.com/office/powerpoint/2010/main" val="3860249526"/>
+      </p:ext>
+    </p:extLst>
+  </p:cSld>
+  <p:clrMapOvr>
+    <a:masterClrMapping/>
+  </p:clrMapOvr>
+</p:sld>
+</file>
+
+<file path=ppt/slides/slide15.xml><?xml version="1.0" encoding="utf-8"?>
+<p:sld xmlns:a="http://schemas.openxmlformats.org/drawingml/2006/main" xmlns:r="http://schemas.openxmlformats.org/officeDocument/2006/relationships" xmlns:p="http://schemas.openxmlformats.org/presentationml/2006/main">
+  <p:cSld>
+    <p:spTree>
+      <p:nvGrpSpPr>
+        <p:cNvPr id="1" name=""/>
+        <p:cNvGrpSpPr/>
+        <p:nvPr/>
+      </p:nvGrpSpPr>
+      <p:grpSpPr>
+        <a:xfrm>
+          <a:off x="0" y="0"/>
+          <a:ext cx="0" cy="0"/>
+          <a:chOff x="0" y="0"/>
+          <a:chExt cx="0" cy="0"/>
+        </a:xfrm>
+      </p:grpSpPr>
+      <p:sp>
+        <p:nvSpPr>
+          <p:cNvPr id="2" name="Title 1">
+            <a:extLst>
+              <a:ext uri="{FF2B5EF4-FFF2-40B4-BE49-F238E27FC236}">
+                <a16:creationId xmlns:a16="http://schemas.microsoft.com/office/drawing/2014/main" id="{D16F2AA1-3AB5-4D43-A3A7-AACB72531155}"/>
+              </a:ext>
+            </a:extLst>
+          </p:cNvPr>
+          <p:cNvSpPr>
+            <a:spLocks noGrp="1"/>
+          </p:cNvSpPr>
+          <p:nvPr>
+            <p:ph type="title"/>
+          </p:nvPr>
+        </p:nvSpPr>
+        <p:spPr/>
+        <p:txBody>
+          <a:bodyPr/>
+          <a:lstStyle/>
+          <a:p>
+            <a:r>
+              <a:rPr lang="en-US" dirty="0"/>
+              <a:t>Disadvantages</a:t>
+            </a:r>
+          </a:p>
+        </p:txBody>
+      </p:sp>
+      <p:sp>
+        <p:nvSpPr>
+          <p:cNvPr id="3" name="Content Placeholder 2">
+            <a:extLst>
+              <a:ext uri="{FF2B5EF4-FFF2-40B4-BE49-F238E27FC236}">
+                <a16:creationId xmlns:a16="http://schemas.microsoft.com/office/drawing/2014/main" id="{C394B02F-1D6C-4EF8-80C5-338C7A2EF288}"/>
+              </a:ext>
+            </a:extLst>
+          </p:cNvPr>
+          <p:cNvSpPr>
+            <a:spLocks noGrp="1"/>
+          </p:cNvSpPr>
+          <p:nvPr>
+            <p:ph idx="1"/>
+          </p:nvPr>
+        </p:nvSpPr>
+        <p:spPr/>
+        <p:txBody>
+          <a:bodyPr>
+            <a:normAutofit/>
+          </a:bodyPr>
+          <a:lstStyle/>
+          <a:p>
+            <a:r>
+              <a:rPr lang="en-US" dirty="0"/>
+              <a:t>The protected objects must all be custom designed and individually implemented, creating a burden for the application developer</a:t>
+            </a:r>
+          </a:p>
+          <a:p>
+            <a:r>
+              <a:rPr lang="en-US" dirty="0"/>
+              <a:t>The communication patterns are relatively inflexible. Changing them requires overhauling the application</a:t>
+            </a:r>
+          </a:p>
+          <a:p>
+            <a:r>
+              <a:rPr lang="en-US" dirty="0"/>
+              <a:t>Third-party library components are awkward to write since they would have to know about the protected objects that are available in the application in order to communicate. This is a particular problem for client/server oriented systems where a general purpose, reusable server component needs some way to send replies to clients for which it has no prior knowledge.</a:t>
+            </a:r>
+          </a:p>
+        </p:txBody>
+      </p:sp>
+    </p:spTree>
+    <p:extLst>
+      <p:ext uri="{BB962C8B-B14F-4D97-AF65-F5344CB8AC3E}">
+        <p14:creationId xmlns:p14="http://schemas.microsoft.com/office/powerpoint/2010/main" val="2190874393"/>
+      </p:ext>
+    </p:extLst>
+  </p:cSld>
+  <p:clrMapOvr>
+    <a:masterClrMapping/>
+  </p:clrMapOvr>
+</p:sld>
+</file>
+
+<file path=ppt/slides/slide16.xml><?xml version="1.0" encoding="utf-8"?>
+<p:sld xmlns:a="http://schemas.openxmlformats.org/drawingml/2006/main" xmlns:r="http://schemas.openxmlformats.org/officeDocument/2006/relationships" xmlns:p="http://schemas.openxmlformats.org/presentationml/2006/main">
+  <p:cSld>
+    <p:spTree>
+      <p:nvGrpSpPr>
+        <p:cNvPr id="1" name=""/>
+        <p:cNvGrpSpPr/>
+        <p:nvPr/>
+      </p:nvGrpSpPr>
+      <p:grpSpPr>
+        <a:xfrm>
+          <a:off x="0" y="0"/>
+          <a:ext cx="0" cy="0"/>
+          <a:chOff x="0" y="0"/>
+          <a:chExt cx="0" cy="0"/>
+        </a:xfrm>
+      </p:grpSpPr>
+      <p:sp>
+        <p:nvSpPr>
+          <p:cNvPr id="2" name="Title 1">
+            <a:extLst>
+              <a:ext uri="{FF2B5EF4-FFF2-40B4-BE49-F238E27FC236}">
                 <a16:creationId xmlns:a16="http://schemas.microsoft.com/office/drawing/2014/main" id="{E80055C7-C6A2-4680-94E9-52E678B9553C}"/>
               </a:ext>
             </a:extLst>
@@ -3686,7 +4236,7 @@
           <a:graphicData uri="http://schemas.openxmlformats.org/presentationml/2006/ole">
             <mc:AlternateContent xmlns:mc="http://schemas.openxmlformats.org/markup-compatibility/2006">
               <mc:Choice xmlns:v="urn:schemas-microsoft-com:vml" Requires="v">
-                <p:oleObj spid="_x0000_s2056" name="Acrobat Document" r:id="rId3" imgW="4663262" imgH="2743200" progId="Acrobat.Document.DC">
+                <p:oleObj spid="_x0000_s2059" name="Acrobat Document" r:id="rId3" imgW="4663262" imgH="2743200" progId="Acrobat.Document.DC">
                   <p:embed/>
                 </p:oleObj>
               </mc:Choice>
@@ -3810,587 +4360,6 @@
 </p:sld>
 </file>
 
-<file path=ppt/slides/slide13.xml><?xml version="1.0" encoding="utf-8"?>
-<p:sld xmlns:a="http://schemas.openxmlformats.org/drawingml/2006/main" xmlns:r="http://schemas.openxmlformats.org/officeDocument/2006/relationships" xmlns:p="http://schemas.openxmlformats.org/presentationml/2006/main">
-  <p:cSld>
-    <p:spTree>
-      <p:nvGrpSpPr>
-        <p:cNvPr id="1" name=""/>
-        <p:cNvGrpSpPr/>
-        <p:nvPr/>
-      </p:nvGrpSpPr>
-      <p:grpSpPr>
-        <a:xfrm>
-          <a:off x="0" y="0"/>
-          <a:ext cx="0" cy="0"/>
-          <a:chOff x="0" y="0"/>
-          <a:chExt cx="0" cy="0"/>
-        </a:xfrm>
-      </p:grpSpPr>
-      <p:sp>
-        <p:nvSpPr>
-          <p:cNvPr id="2" name="Title 1">
-            <a:extLst>
-              <a:ext uri="{FF2B5EF4-FFF2-40B4-BE49-F238E27FC236}">
-                <a16:creationId xmlns:a16="http://schemas.microsoft.com/office/drawing/2014/main" id="{BA9D12D8-B172-472F-BC8F-73A7D9E31D37}"/>
-              </a:ext>
-            </a:extLst>
-          </p:cNvPr>
-          <p:cNvSpPr>
-            <a:spLocks noGrp="1"/>
-          </p:cNvSpPr>
-          <p:nvPr>
-            <p:ph type="title"/>
-          </p:nvPr>
-        </p:nvSpPr>
-        <p:spPr/>
-        <p:txBody>
-          <a:bodyPr/>
-          <a:lstStyle/>
-          <a:p>
-            <a:r>
-              <a:rPr lang="en-US" dirty="0"/>
-              <a:t>Mailboxes</a:t>
-            </a:r>
-          </a:p>
-        </p:txBody>
-      </p:sp>
-      <p:sp>
-        <p:nvSpPr>
-          <p:cNvPr id="3" name="Content Placeholder 2">
-            <a:extLst>
-              <a:ext uri="{FF2B5EF4-FFF2-40B4-BE49-F238E27FC236}">
-                <a16:creationId xmlns:a16="http://schemas.microsoft.com/office/drawing/2014/main" id="{9B61A1C1-A253-4435-AB42-F05EA3856AFE}"/>
-              </a:ext>
-            </a:extLst>
-          </p:cNvPr>
-          <p:cNvSpPr>
-            <a:spLocks noGrp="1"/>
-          </p:cNvSpPr>
-          <p:nvPr>
-            <p:ph idx="1"/>
-          </p:nvPr>
-        </p:nvSpPr>
-        <p:spPr/>
-        <p:txBody>
-          <a:bodyPr/>
-          <a:lstStyle/>
-          <a:p>
-            <a:r>
-              <a:rPr lang="en-US" dirty="0"/>
-              <a:t>Each module corresponds to one and only one mailbox (PO)</a:t>
-            </a:r>
-          </a:p>
-          <a:p>
-            <a:pPr lvl="1"/>
-            <a:r>
-              <a:rPr lang="en-US" dirty="0"/>
-              <a:t>The primary task of a module reads data from its mailbox and processes it.</a:t>
-            </a:r>
-          </a:p>
-          <a:p>
-            <a:pPr lvl="2"/>
-            <a:r>
-              <a:rPr lang="en-US" dirty="0"/>
-              <a:t>… sends data to other modules by installing that data into other mailboxes.</a:t>
-            </a:r>
-          </a:p>
-          <a:p>
-            <a:pPr lvl="2"/>
-            <a:r>
-              <a:rPr lang="en-US" dirty="0"/>
-              <a:t>… loops back to read more data (if available).</a:t>
-            </a:r>
-          </a:p>
-          <a:p>
-            <a:pPr lvl="1"/>
-            <a:r>
-              <a:rPr lang="en-US" dirty="0"/>
-              <a:t>All tasks run concurrently</a:t>
-            </a:r>
-          </a:p>
-          <a:p>
-            <a:pPr lvl="1"/>
-            <a:r>
-              <a:rPr lang="en-US" dirty="0"/>
-              <a:t>A module with nothing to do is suspended on the entry of its mailbox</a:t>
-            </a:r>
-          </a:p>
-          <a:p>
-            <a:pPr lvl="2"/>
-            <a:r>
-              <a:rPr lang="en-US" dirty="0"/>
-              <a:t>This could potentially be true for most (or even all!) of the modules at any given time.</a:t>
-            </a:r>
-          </a:p>
-          <a:p>
-            <a:pPr lvl="2"/>
-            <a:r>
-              <a:rPr lang="en-US" dirty="0"/>
-              <a:t>… but internal tasks in certain modules might “generate” data to deliver to other mailboxes (from handling hardware interrupts, for example).</a:t>
-            </a:r>
-          </a:p>
-          <a:p>
-            <a:pPr lvl="1"/>
-            <a:r>
-              <a:rPr lang="en-US" dirty="0"/>
-              <a:t>Very “reactive” design</a:t>
-            </a:r>
-          </a:p>
-          <a:p>
-            <a:pPr lvl="2"/>
-            <a:r>
-              <a:rPr lang="en-US" dirty="0"/>
-              <a:t>The system does nothing until it must react to some input event (via a hardware interrupt).</a:t>
-            </a:r>
-          </a:p>
-        </p:txBody>
-      </p:sp>
-    </p:spTree>
-    <p:extLst>
-      <p:ext uri="{BB962C8B-B14F-4D97-AF65-F5344CB8AC3E}">
-        <p14:creationId xmlns:p14="http://schemas.microsoft.com/office/powerpoint/2010/main" val="1964587747"/>
-      </p:ext>
-    </p:extLst>
-  </p:cSld>
-  <p:clrMapOvr>
-    <a:masterClrMapping/>
-  </p:clrMapOvr>
-</p:sld>
-</file>
-
-<file path=ppt/slides/slide14.xml><?xml version="1.0" encoding="utf-8"?>
-<p:sld xmlns:a="http://schemas.openxmlformats.org/drawingml/2006/main" xmlns:r="http://schemas.openxmlformats.org/officeDocument/2006/relationships" xmlns:p="http://schemas.openxmlformats.org/presentationml/2006/main">
-  <p:cSld>
-    <p:spTree>
-      <p:nvGrpSpPr>
-        <p:cNvPr id="1" name=""/>
-        <p:cNvGrpSpPr/>
-        <p:nvPr/>
-      </p:nvGrpSpPr>
-      <p:grpSpPr>
-        <a:xfrm>
-          <a:off x="0" y="0"/>
-          <a:ext cx="0" cy="0"/>
-          <a:chOff x="0" y="0"/>
-          <a:chExt cx="0" cy="0"/>
-        </a:xfrm>
-      </p:grpSpPr>
-      <p:sp>
-        <p:nvSpPr>
-          <p:cNvPr id="2" name="Title 1">
-            <a:extLst>
-              <a:ext uri="{FF2B5EF4-FFF2-40B4-BE49-F238E27FC236}">
-                <a16:creationId xmlns:a16="http://schemas.microsoft.com/office/drawing/2014/main" id="{046FFB71-53CB-4163-9260-A9A71F30E992}"/>
-              </a:ext>
-            </a:extLst>
-          </p:cNvPr>
-          <p:cNvSpPr>
-            <a:spLocks noGrp="1"/>
-          </p:cNvSpPr>
-          <p:nvPr>
-            <p:ph type="title"/>
-          </p:nvPr>
-        </p:nvSpPr>
-        <p:spPr/>
-        <p:txBody>
-          <a:bodyPr/>
-          <a:lstStyle/>
-          <a:p>
-            <a:r>
-              <a:rPr lang="en-US" dirty="0"/>
-              <a:t>Generalized Mailboxes</a:t>
-            </a:r>
-          </a:p>
-        </p:txBody>
-      </p:sp>
-      <p:sp>
-        <p:nvSpPr>
-          <p:cNvPr id="3" name="Content Placeholder 2">
-            <a:extLst>
-              <a:ext uri="{FF2B5EF4-FFF2-40B4-BE49-F238E27FC236}">
-                <a16:creationId xmlns:a16="http://schemas.microsoft.com/office/drawing/2014/main" id="{DCAE7C29-A086-42F4-AF96-7D352BA085B7}"/>
-              </a:ext>
-            </a:extLst>
-          </p:cNvPr>
-          <p:cNvSpPr>
-            <a:spLocks noGrp="1"/>
-          </p:cNvSpPr>
-          <p:nvPr>
-            <p:ph idx="1"/>
-          </p:nvPr>
-        </p:nvSpPr>
-        <p:spPr/>
-        <p:txBody>
-          <a:bodyPr/>
-          <a:lstStyle/>
-          <a:p>
-            <a:r>
-              <a:rPr lang="en-US" dirty="0"/>
-              <a:t>Each PO in the mailbox array has the same type. Thus:</a:t>
-            </a:r>
-          </a:p>
-          <a:p>
-            <a:pPr lvl="1"/>
-            <a:r>
-              <a:rPr lang="en-US" dirty="0"/>
-              <a:t>… the same entry</a:t>
-            </a:r>
-          </a:p>
-          <a:p>
-            <a:pPr lvl="1"/>
-            <a:r>
-              <a:rPr lang="en-US" dirty="0"/>
-              <a:t>… the same protected procedures</a:t>
-            </a:r>
-          </a:p>
-          <a:p>
-            <a:pPr lvl="1"/>
-            <a:r>
-              <a:rPr lang="en-US" dirty="0"/>
-              <a:t>… the same internal data storage area</a:t>
-            </a:r>
-          </a:p>
-          <a:p>
-            <a:r>
-              <a:rPr lang="en-US" dirty="0"/>
-              <a:t>Yet, the communication needs of different modules will be different!</a:t>
-            </a:r>
-          </a:p>
-          <a:p>
-            <a:r>
-              <a:rPr lang="en-US" dirty="0"/>
-              <a:t>In CubedOS, the mailboxes hold low-level octet arrays</a:t>
-            </a:r>
-          </a:p>
-          <a:p>
-            <a:pPr lvl="1"/>
-            <a:r>
-              <a:rPr lang="en-US" dirty="0"/>
-              <a:t>Sending modules are expected to </a:t>
-            </a:r>
-            <a:r>
-              <a:rPr lang="en-US" i="1" dirty="0"/>
-              <a:t>encode</a:t>
-            </a:r>
-            <a:r>
-              <a:rPr lang="en-US" dirty="0"/>
-              <a:t> the data they need to send into raw octets (a </a:t>
-            </a:r>
-            <a:r>
-              <a:rPr lang="en-US" i="1" dirty="0"/>
-              <a:t>message</a:t>
-            </a:r>
-            <a:r>
-              <a:rPr lang="en-US" dirty="0"/>
-              <a:t>) before installing that data into a mailbox.</a:t>
-            </a:r>
-          </a:p>
-          <a:p>
-            <a:pPr lvl="1"/>
-            <a:r>
-              <a:rPr lang="en-US" dirty="0"/>
-              <a:t>Receiving modules are expected to </a:t>
-            </a:r>
-            <a:r>
-              <a:rPr lang="en-US" i="1" dirty="0"/>
-              <a:t>decode</a:t>
-            </a:r>
-            <a:r>
-              <a:rPr lang="en-US" dirty="0"/>
-              <a:t> the messages they receive back into meaningful data items with appropriate types.</a:t>
-            </a:r>
-          </a:p>
-        </p:txBody>
-      </p:sp>
-    </p:spTree>
-    <p:extLst>
-      <p:ext uri="{BB962C8B-B14F-4D97-AF65-F5344CB8AC3E}">
-        <p14:creationId xmlns:p14="http://schemas.microsoft.com/office/powerpoint/2010/main" val="2555325921"/>
-      </p:ext>
-    </p:extLst>
-  </p:cSld>
-  <p:clrMapOvr>
-    <a:masterClrMapping/>
-  </p:clrMapOvr>
-</p:sld>
-</file>
-
-<file path=ppt/slides/slide15.xml><?xml version="1.0" encoding="utf-8"?>
-<p:sld xmlns:a="http://schemas.openxmlformats.org/drawingml/2006/main" xmlns:r="http://schemas.openxmlformats.org/officeDocument/2006/relationships" xmlns:p="http://schemas.openxmlformats.org/presentationml/2006/main">
-  <p:cSld>
-    <p:spTree>
-      <p:nvGrpSpPr>
-        <p:cNvPr id="1" name=""/>
-        <p:cNvGrpSpPr/>
-        <p:nvPr/>
-      </p:nvGrpSpPr>
-      <p:grpSpPr>
-        <a:xfrm>
-          <a:off x="0" y="0"/>
-          <a:ext cx="0" cy="0"/>
-          <a:chOff x="0" y="0"/>
-          <a:chExt cx="0" cy="0"/>
-        </a:xfrm>
-      </p:grpSpPr>
-      <p:sp>
-        <p:nvSpPr>
-          <p:cNvPr id="2" name="Title 1">
-            <a:extLst>
-              <a:ext uri="{FF2B5EF4-FFF2-40B4-BE49-F238E27FC236}">
-                <a16:creationId xmlns:a16="http://schemas.microsoft.com/office/drawing/2014/main" id="{2F822B15-C865-4835-97A3-7541D4A5DBCE}"/>
-              </a:ext>
-            </a:extLst>
-          </p:cNvPr>
-          <p:cNvSpPr>
-            <a:spLocks noGrp="1"/>
-          </p:cNvSpPr>
-          <p:nvPr>
-            <p:ph type="title"/>
-          </p:nvPr>
-        </p:nvSpPr>
-        <p:spPr/>
-        <p:txBody>
-          <a:bodyPr/>
-          <a:lstStyle/>
-          <a:p>
-            <a:r>
-              <a:rPr lang="en-US" dirty="0"/>
-              <a:t>Isn’t That Bad??</a:t>
-            </a:r>
-          </a:p>
-        </p:txBody>
-      </p:sp>
-      <p:sp>
-        <p:nvSpPr>
-          <p:cNvPr id="3" name="Content Placeholder 2">
-            <a:extLst>
-              <a:ext uri="{FF2B5EF4-FFF2-40B4-BE49-F238E27FC236}">
-                <a16:creationId xmlns:a16="http://schemas.microsoft.com/office/drawing/2014/main" id="{290DEE58-870A-441E-8E50-9939CC668657}"/>
-              </a:ext>
-            </a:extLst>
-          </p:cNvPr>
-          <p:cNvSpPr>
-            <a:spLocks noGrp="1"/>
-          </p:cNvSpPr>
-          <p:nvPr>
-            <p:ph idx="1"/>
-          </p:nvPr>
-        </p:nvSpPr>
-        <p:spPr/>
-        <p:txBody>
-          <a:bodyPr/>
-          <a:lstStyle/>
-          <a:p>
-            <a:r>
-              <a:rPr lang="en-US" dirty="0"/>
-              <a:t>Yes!</a:t>
-            </a:r>
-          </a:p>
-          <a:p>
-            <a:pPr lvl="1"/>
-            <a:r>
-              <a:rPr lang="en-US" dirty="0"/>
-              <a:t>The type safety of specifically typed protected procedures has been lost. Compile time errors are now runtime errors when a message fails to decode in a meaningful way.</a:t>
-            </a:r>
-          </a:p>
-          <a:p>
-            <a:pPr lvl="1"/>
-            <a:r>
-              <a:rPr lang="en-US" dirty="0"/>
-              <a:t>The destination of a message is specified using an integer index into an array… a runtime quantity. It is now possible to install a message in the wrong mailbox by accident.</a:t>
-            </a:r>
-          </a:p>
-          <a:p>
-            <a:r>
-              <a:rPr lang="en-US" dirty="0"/>
-              <a:t>But…</a:t>
-            </a:r>
-          </a:p>
-          <a:p>
-            <a:pPr lvl="1"/>
-            <a:r>
-              <a:rPr lang="en-US" dirty="0"/>
-              <a:t>Servers can now communicate with clients without a priori knowledge of them. They just need the index of the client’s mailbox (part of the request).</a:t>
-            </a:r>
-          </a:p>
-          <a:p>
-            <a:pPr lvl="1"/>
-            <a:r>
-              <a:rPr lang="en-US" dirty="0"/>
-              <a:t>Communication patterns can now dynamically change.</a:t>
-            </a:r>
-          </a:p>
-        </p:txBody>
-      </p:sp>
-    </p:spTree>
-    <p:extLst>
-      <p:ext uri="{BB962C8B-B14F-4D97-AF65-F5344CB8AC3E}">
-        <p14:creationId xmlns:p14="http://schemas.microsoft.com/office/powerpoint/2010/main" val="3974678013"/>
-      </p:ext>
-    </p:extLst>
-  </p:cSld>
-  <p:clrMapOvr>
-    <a:masterClrMapping/>
-  </p:clrMapOvr>
-</p:sld>
-</file>
-
-<file path=ppt/slides/slide16.xml><?xml version="1.0" encoding="utf-8"?>
-<p:sld xmlns:a="http://schemas.openxmlformats.org/drawingml/2006/main" xmlns:r="http://schemas.openxmlformats.org/officeDocument/2006/relationships" xmlns:p="http://schemas.openxmlformats.org/presentationml/2006/main">
-  <p:cSld>
-    <p:spTree>
-      <p:nvGrpSpPr>
-        <p:cNvPr id="1" name=""/>
-        <p:cNvGrpSpPr/>
-        <p:nvPr/>
-      </p:nvGrpSpPr>
-      <p:grpSpPr>
-        <a:xfrm>
-          <a:off x="0" y="0"/>
-          <a:ext cx="0" cy="0"/>
-          <a:chOff x="0" y="0"/>
-          <a:chExt cx="0" cy="0"/>
-        </a:xfrm>
-      </p:grpSpPr>
-      <p:sp>
-        <p:nvSpPr>
-          <p:cNvPr id="2" name="Title 1">
-            <a:extLst>
-              <a:ext uri="{FF2B5EF4-FFF2-40B4-BE49-F238E27FC236}">
-                <a16:creationId xmlns:a16="http://schemas.microsoft.com/office/drawing/2014/main" id="{227F93E6-D956-4472-9051-7BD0932C7F4B}"/>
-              </a:ext>
-            </a:extLst>
-          </p:cNvPr>
-          <p:cNvSpPr>
-            <a:spLocks noGrp="1"/>
-          </p:cNvSpPr>
-          <p:nvPr>
-            <p:ph type="title"/>
-          </p:nvPr>
-        </p:nvSpPr>
-        <p:spPr/>
-        <p:txBody>
-          <a:bodyPr/>
-          <a:lstStyle/>
-          <a:p>
-            <a:r>
-              <a:rPr lang="en-US" dirty="0"/>
-              <a:t>Not That Bad</a:t>
-            </a:r>
-          </a:p>
-        </p:txBody>
-      </p:sp>
-      <p:sp>
-        <p:nvSpPr>
-          <p:cNvPr id="3" name="Content Placeholder 2">
-            <a:extLst>
-              <a:ext uri="{FF2B5EF4-FFF2-40B4-BE49-F238E27FC236}">
-                <a16:creationId xmlns:a16="http://schemas.microsoft.com/office/drawing/2014/main" id="{65D262A2-82A0-4473-815A-C95AF9258DDC}"/>
-              </a:ext>
-            </a:extLst>
-          </p:cNvPr>
-          <p:cNvSpPr>
-            <a:spLocks noGrp="1"/>
-          </p:cNvSpPr>
-          <p:nvPr>
-            <p:ph idx="1"/>
-          </p:nvPr>
-        </p:nvSpPr>
-        <p:spPr/>
-        <p:txBody>
-          <a:bodyPr>
-            <a:normAutofit lnSpcReduction="10000"/>
-          </a:bodyPr>
-          <a:lstStyle/>
-          <a:p>
-            <a:r>
-              <a:rPr lang="en-US" dirty="0"/>
-              <a:t>A CubedOS convention is for every module to have an API package with encoding/decoding subprograms for module messages</a:t>
-            </a:r>
-          </a:p>
-          <a:p>
-            <a:pPr lvl="1"/>
-            <a:r>
-              <a:rPr lang="en-US" dirty="0"/>
-              <a:t>Example: A random number generating server module.</a:t>
-            </a:r>
-          </a:p>
-          <a:p>
-            <a:pPr lvl="1"/>
-            <a:r>
-              <a:rPr lang="en-US" dirty="0"/>
-              <a:t>Client: Calls API function </a:t>
-            </a:r>
-            <a:r>
-              <a:rPr lang="en-US" dirty="0" err="1"/>
-              <a:t>Get_Number_Request_Encode</a:t>
-            </a:r>
-            <a:r>
-              <a:rPr lang="en-US" dirty="0"/>
-              <a:t> to construct a message asking for a random number. Sends the resulting message to the server’s mailbox.</a:t>
-            </a:r>
-          </a:p>
-          <a:p>
-            <a:pPr lvl="1"/>
-            <a:r>
-              <a:rPr lang="en-US" dirty="0"/>
-              <a:t>Server: Reads message from mailbox. Decodes the request using API procedure </a:t>
-            </a:r>
-            <a:r>
-              <a:rPr lang="en-US" dirty="0" err="1"/>
-              <a:t>Get_Number_Request_Decode</a:t>
-            </a:r>
-            <a:r>
-              <a:rPr lang="en-US" dirty="0"/>
-              <a:t>. Generates a random number.</a:t>
-            </a:r>
-          </a:p>
-          <a:p>
-            <a:pPr lvl="1"/>
-            <a:r>
-              <a:rPr lang="en-US" dirty="0"/>
-              <a:t>Server: Calls API function </a:t>
-            </a:r>
-            <a:r>
-              <a:rPr lang="en-US" dirty="0" err="1"/>
-              <a:t>Get_Number_Reply_Encode</a:t>
-            </a:r>
-            <a:r>
-              <a:rPr lang="en-US" dirty="0"/>
-              <a:t> to construct a message containing the random number. Sends the resulting message to the client’s mailbox (array index taken from message header).</a:t>
-            </a:r>
-          </a:p>
-          <a:p>
-            <a:pPr lvl="1"/>
-            <a:r>
-              <a:rPr lang="en-US" dirty="0"/>
-              <a:t>Client: Reads message from mailbox. Decodes using API procedure </a:t>
-            </a:r>
-            <a:r>
-              <a:rPr lang="en-US" dirty="0" err="1"/>
-              <a:t>Get_Number_Reply_Decode</a:t>
-            </a:r>
-            <a:r>
-              <a:rPr lang="en-US" dirty="0"/>
-              <a:t>.</a:t>
-            </a:r>
-          </a:p>
-        </p:txBody>
-      </p:sp>
-    </p:spTree>
-    <p:extLst>
-      <p:ext uri="{BB962C8B-B14F-4D97-AF65-F5344CB8AC3E}">
-        <p14:creationId xmlns:p14="http://schemas.microsoft.com/office/powerpoint/2010/main" val="1522187031"/>
-      </p:ext>
-    </p:extLst>
-  </p:cSld>
-  <p:clrMapOvr>
-    <a:masterClrMapping/>
-  </p:clrMapOvr>
-</p:sld>
-</file>
-
 <file path=ppt/slides/slide17.xml><?xml version="1.0" encoding="utf-8"?>
 <p:sld xmlns:a="http://schemas.openxmlformats.org/drawingml/2006/main" xmlns:r="http://schemas.openxmlformats.org/officeDocument/2006/relationships" xmlns:p="http://schemas.openxmlformats.org/presentationml/2006/main">
   <p:cSld>
@@ -4413,7 +4382,7 @@
           <p:cNvPr id="2" name="Title 1">
             <a:extLst>
               <a:ext uri="{FF2B5EF4-FFF2-40B4-BE49-F238E27FC236}">
-                <a16:creationId xmlns:a16="http://schemas.microsoft.com/office/drawing/2014/main" id="{AEC4863B-E970-4A97-857A-801E85E4CD09}"/>
+                <a16:creationId xmlns:a16="http://schemas.microsoft.com/office/drawing/2014/main" id="{BA9D12D8-B172-472F-BC8F-73A7D9E31D37}"/>
               </a:ext>
             </a:extLst>
           </p:cNvPr>
@@ -4431,7 +4400,7 @@
           <a:p>
             <a:r>
               <a:rPr lang="en-US" dirty="0"/>
-              <a:t>Conventions</a:t>
+              <a:t>Mailboxes</a:t>
             </a:r>
           </a:p>
         </p:txBody>
@@ -4441,7 +4410,7 @@
           <p:cNvPr id="3" name="Content Placeholder 2">
             <a:extLst>
               <a:ext uri="{FF2B5EF4-FFF2-40B4-BE49-F238E27FC236}">
-                <a16:creationId xmlns:a16="http://schemas.microsoft.com/office/drawing/2014/main" id="{8B2C9848-21AE-493A-AC78-51E73E7BED29}"/>
+                <a16:creationId xmlns:a16="http://schemas.microsoft.com/office/drawing/2014/main" id="{9B61A1C1-A253-4435-AB42-F05EA3856AFE}"/>
               </a:ext>
             </a:extLst>
           </p:cNvPr>
@@ -4454,121 +4423,75 @@
         </p:nvSpPr>
         <p:spPr/>
         <p:txBody>
-          <a:bodyPr>
-            <a:normAutofit lnSpcReduction="10000"/>
-          </a:bodyPr>
-          <a:lstStyle/>
-          <a:p>
-            <a:r>
-              <a:rPr lang="en-US" dirty="0"/>
-              <a:t>CubedOS conceptualizes modules as clients or servers</a:t>
+          <a:bodyPr/>
+          <a:lstStyle/>
+          <a:p>
+            <a:r>
+              <a:rPr lang="en-US" dirty="0"/>
+              <a:t>Each module corresponds to one and only one mailbox (PO)</a:t>
             </a:r>
           </a:p>
           <a:p>
             <a:pPr lvl="1"/>
             <a:r>
               <a:rPr lang="en-US" dirty="0"/>
-              <a:t>… with the understanding that some modules act as both at different times.</a:t>
-            </a:r>
-          </a:p>
-          <a:p>
-            <a:r>
-              <a:rPr lang="en-US" dirty="0"/>
-              <a:t>Thus messages are either “requests” or “replies.”</a:t>
-            </a:r>
-          </a:p>
-          <a:p>
-            <a:r>
-              <a:rPr lang="en-US" dirty="0"/>
-              <a:t>CubedOS convention:</a:t>
+              <a:t>The primary task of a module reads data from its mailbox and processes it.</a:t>
+            </a:r>
+          </a:p>
+          <a:p>
+            <a:pPr lvl="2"/>
+            <a:r>
+              <a:rPr lang="en-US" dirty="0"/>
+              <a:t>… sends data to other modules by installing that data into other mailboxes.</a:t>
+            </a:r>
+          </a:p>
+          <a:p>
+            <a:pPr lvl="2"/>
+            <a:r>
+              <a:rPr lang="en-US" dirty="0"/>
+              <a:t>… loops back to read more data (if available).</a:t>
             </a:r>
           </a:p>
           <a:p>
             <a:pPr lvl="1"/>
             <a:r>
               <a:rPr lang="en-US" dirty="0"/>
-              <a:t>Request messages are constructed (by the client) using an API function with the name </a:t>
-            </a:r>
-            <a:r>
-              <a:rPr lang="en-US" dirty="0" err="1">
-                <a:latin typeface="Courier New" panose="02070309020205020404" pitchFamily="49" charset="0"/>
-                <a:cs typeface="Courier New" panose="02070309020205020404" pitchFamily="49" charset="0"/>
-              </a:rPr>
-              <a:t>Message_Name</a:t>
-            </a:r>
-            <a:r>
-              <a:rPr lang="en-US" dirty="0" err="1"/>
-              <a:t>_Request_Encode</a:t>
-            </a:r>
-            <a:r>
-              <a:rPr lang="en-US" dirty="0"/>
-              <a:t>.</a:t>
+              <a:t>All tasks run concurrently</a:t>
             </a:r>
           </a:p>
           <a:p>
             <a:pPr lvl="1"/>
             <a:r>
               <a:rPr lang="en-US" dirty="0"/>
-              <a:t>Request messages are decoded (by the server) using an API procedure with the name </a:t>
-            </a:r>
-            <a:r>
-              <a:rPr lang="en-US" dirty="0" err="1">
-                <a:latin typeface="Courier New" panose="02070309020205020404" pitchFamily="49" charset="0"/>
-                <a:cs typeface="Courier New" panose="02070309020205020404" pitchFamily="49" charset="0"/>
-              </a:rPr>
-              <a:t>Message_Name</a:t>
-            </a:r>
-            <a:r>
-              <a:rPr lang="en-US" dirty="0" err="1"/>
-              <a:t>_Request_Decode</a:t>
-            </a:r>
-            <a:r>
-              <a:rPr lang="en-US" dirty="0"/>
-              <a:t>.</a:t>
+              <a:t>A module with nothing to do is suspended on the entry of its mailbox</a:t>
+            </a:r>
+          </a:p>
+          <a:p>
+            <a:pPr lvl="2"/>
+            <a:r>
+              <a:rPr lang="en-US" dirty="0"/>
+              <a:t>This could potentially be true for most (or even all!) of the modules at any given time.</a:t>
+            </a:r>
+          </a:p>
+          <a:p>
+            <a:pPr lvl="2"/>
+            <a:r>
+              <a:rPr lang="en-US" dirty="0"/>
+              <a:t>… but internal tasks in certain modules might “generate” data to deliver to other mailboxes (from handling hardware interrupts, for example).</a:t>
             </a:r>
           </a:p>
           <a:p>
             <a:pPr lvl="1"/>
             <a:r>
               <a:rPr lang="en-US" dirty="0"/>
-              <a:t>Reply messages are constructed (by the server) using an API function with the name </a:t>
-            </a:r>
-            <a:r>
-              <a:rPr lang="en-US" dirty="0" err="1">
-                <a:latin typeface="Courier New" panose="02070309020205020404" pitchFamily="49" charset="0"/>
-                <a:cs typeface="Courier New" panose="02070309020205020404" pitchFamily="49" charset="0"/>
-              </a:rPr>
-              <a:t>Message_Name</a:t>
-            </a:r>
-            <a:r>
-              <a:rPr lang="en-US" dirty="0" err="1"/>
-              <a:t>_Reply_Encode</a:t>
-            </a:r>
-            <a:r>
-              <a:rPr lang="en-US" dirty="0"/>
-              <a:t>.</a:t>
-            </a:r>
-          </a:p>
-          <a:p>
-            <a:pPr lvl="1"/>
-            <a:r>
-              <a:rPr lang="en-US" dirty="0"/>
-              <a:t>Reply messages are decoded (by the client) using an API procedure with the name </a:t>
-            </a:r>
-            <a:r>
-              <a:rPr lang="en-US" dirty="0" err="1">
-                <a:latin typeface="Courier New" panose="02070309020205020404" pitchFamily="49" charset="0"/>
-                <a:cs typeface="Courier New" panose="02070309020205020404" pitchFamily="49" charset="0"/>
-              </a:rPr>
-              <a:t>Message_Name</a:t>
-            </a:r>
-            <a:r>
-              <a:rPr lang="en-US" dirty="0" err="1"/>
-              <a:t>_Reply_Decode</a:t>
-            </a:r>
-            <a:r>
-              <a:rPr lang="en-US" dirty="0"/>
-              <a:t>.</a:t>
+              <a:t>Very “reactive” design</a:t>
+            </a:r>
+          </a:p>
+          <a:p>
+            <a:pPr lvl="2"/>
+            <a:r>
+              <a:rPr lang="en-US" dirty="0"/>
+              <a:t>The system does nothing until it must react to some input event (via a hardware interrupt).</a:t>
             </a:r>
           </a:p>
         </p:txBody>
@@ -4576,7 +4499,7 @@
     </p:spTree>
     <p:extLst>
       <p:ext uri="{BB962C8B-B14F-4D97-AF65-F5344CB8AC3E}">
-        <p14:creationId xmlns:p14="http://schemas.microsoft.com/office/powerpoint/2010/main" val="1422545887"/>
+        <p14:creationId xmlns:p14="http://schemas.microsoft.com/office/powerpoint/2010/main" val="1964587747"/>
       </p:ext>
     </p:extLst>
   </p:cSld>
@@ -4608,7 +4531,7 @@
           <p:cNvPr id="2" name="Title 1">
             <a:extLst>
               <a:ext uri="{FF2B5EF4-FFF2-40B4-BE49-F238E27FC236}">
-                <a16:creationId xmlns:a16="http://schemas.microsoft.com/office/drawing/2014/main" id="{A8305739-7513-4ACA-A520-5844D813EDB2}"/>
+                <a16:creationId xmlns:a16="http://schemas.microsoft.com/office/drawing/2014/main" id="{046FFB71-53CB-4163-9260-A9A71F30E992}"/>
               </a:ext>
             </a:extLst>
           </p:cNvPr>
@@ -4626,7 +4549,7 @@
           <a:p>
             <a:r>
               <a:rPr lang="en-US" dirty="0"/>
-              <a:t>What Messages?</a:t>
+              <a:t>Generalized Mailboxes</a:t>
             </a:r>
           </a:p>
         </p:txBody>
@@ -4636,7 +4559,7 @@
           <p:cNvPr id="3" name="Content Placeholder 2">
             <a:extLst>
               <a:ext uri="{FF2B5EF4-FFF2-40B4-BE49-F238E27FC236}">
-                <a16:creationId xmlns:a16="http://schemas.microsoft.com/office/drawing/2014/main" id="{CD1E17CF-30F0-4F98-9039-E3253A703155}"/>
+                <a16:creationId xmlns:a16="http://schemas.microsoft.com/office/drawing/2014/main" id="{DCAE7C29-A086-42F4-AF96-7D352BA085B7}"/>
               </a:ext>
             </a:extLst>
           </p:cNvPr>
@@ -4654,112 +4577,78 @@
           <a:p>
             <a:r>
               <a:rPr lang="en-US" dirty="0"/>
-              <a:t>CubedOS convention: The messages a module understands are declared in that module’s API package using an enumeration type.</a:t>
+              <a:t>Each PO in the mailbox array has the same type. Thus:</a:t>
             </a:r>
           </a:p>
           <a:p>
             <a:pPr lvl="1"/>
             <a:r>
-              <a:rPr lang="en-US" b="1" dirty="0">
-                <a:latin typeface="Courier New" panose="02070309020205020404" pitchFamily="49" charset="0"/>
-                <a:cs typeface="Courier New" panose="02070309020205020404" pitchFamily="49" charset="0"/>
-              </a:rPr>
-              <a:t>type</a:t>
-            </a:r>
-            <a:r>
-              <a:rPr lang="en-US" dirty="0">
-                <a:latin typeface="Courier New" panose="02070309020205020404" pitchFamily="49" charset="0"/>
-                <a:cs typeface="Courier New" panose="02070309020205020404" pitchFamily="49" charset="0"/>
-              </a:rPr>
-              <a:t> </a:t>
-            </a:r>
-            <a:r>
-              <a:rPr lang="en-US" dirty="0" err="1">
-                <a:latin typeface="Courier New" panose="02070309020205020404" pitchFamily="49" charset="0"/>
-                <a:cs typeface="Courier New" panose="02070309020205020404" pitchFamily="49" charset="0"/>
-              </a:rPr>
-              <a:t>Message_Type</a:t>
-            </a:r>
-            <a:r>
-              <a:rPr lang="en-US" dirty="0">
-                <a:latin typeface="Courier New" panose="02070309020205020404" pitchFamily="49" charset="0"/>
-                <a:cs typeface="Courier New" panose="02070309020205020404" pitchFamily="49" charset="0"/>
-              </a:rPr>
-              <a:t> </a:t>
-            </a:r>
-            <a:r>
-              <a:rPr lang="en-US" b="1" dirty="0">
-                <a:latin typeface="Courier New" panose="02070309020205020404" pitchFamily="49" charset="0"/>
-                <a:cs typeface="Courier New" panose="02070309020205020404" pitchFamily="49" charset="0"/>
-              </a:rPr>
-              <a:t>is</a:t>
-            </a:r>
-            <a:r>
-              <a:rPr lang="en-US" dirty="0">
-                <a:latin typeface="Courier New" panose="02070309020205020404" pitchFamily="49" charset="0"/>
-                <a:cs typeface="Courier New" panose="02070309020205020404" pitchFamily="49" charset="0"/>
-              </a:rPr>
-              <a:t> (</a:t>
-            </a:r>
-            <a:br>
-              <a:rPr lang="en-US" dirty="0">
-                <a:latin typeface="Courier New" panose="02070309020205020404" pitchFamily="49" charset="0"/>
-                <a:cs typeface="Courier New" panose="02070309020205020404" pitchFamily="49" charset="0"/>
-              </a:rPr>
-            </a:br>
-            <a:r>
-              <a:rPr lang="en-US" dirty="0">
-                <a:latin typeface="Courier New" panose="02070309020205020404" pitchFamily="49" charset="0"/>
-                <a:cs typeface="Courier New" panose="02070309020205020404" pitchFamily="49" charset="0"/>
-              </a:rPr>
-              <a:t>   </a:t>
-            </a:r>
-            <a:r>
-              <a:rPr lang="en-US" dirty="0" err="1">
-                <a:latin typeface="Courier New" panose="02070309020205020404" pitchFamily="49" charset="0"/>
-                <a:cs typeface="Courier New" panose="02070309020205020404" pitchFamily="49" charset="0"/>
-              </a:rPr>
-              <a:t>Get_Number_Request</a:t>
-            </a:r>
-            <a:r>
-              <a:rPr lang="en-US" dirty="0">
-                <a:latin typeface="Courier New" panose="02070309020205020404" pitchFamily="49" charset="0"/>
-                <a:cs typeface="Courier New" panose="02070309020205020404" pitchFamily="49" charset="0"/>
-              </a:rPr>
-              <a:t>,</a:t>
-            </a:r>
-            <a:br>
-              <a:rPr lang="en-US" dirty="0">
-                <a:latin typeface="Courier New" panose="02070309020205020404" pitchFamily="49" charset="0"/>
-                <a:cs typeface="Courier New" panose="02070309020205020404" pitchFamily="49" charset="0"/>
-              </a:rPr>
-            </a:br>
-            <a:r>
-              <a:rPr lang="en-US" dirty="0">
-                <a:latin typeface="Courier New" panose="02070309020205020404" pitchFamily="49" charset="0"/>
-                <a:cs typeface="Courier New" panose="02070309020205020404" pitchFamily="49" charset="0"/>
-              </a:rPr>
-              <a:t>   </a:t>
-            </a:r>
-            <a:r>
-              <a:rPr lang="en-US" dirty="0" err="1">
-                <a:latin typeface="Courier New" panose="02070309020205020404" pitchFamily="49" charset="0"/>
-                <a:cs typeface="Courier New" panose="02070309020205020404" pitchFamily="49" charset="0"/>
-              </a:rPr>
-              <a:t>Get_Number_Reply</a:t>
-            </a:r>
-            <a:r>
-              <a:rPr lang="en-US" dirty="0">
-                <a:latin typeface="Courier New" panose="02070309020205020404" pitchFamily="49" charset="0"/>
-                <a:cs typeface="Courier New" panose="02070309020205020404" pitchFamily="49" charset="0"/>
-              </a:rPr>
-              <a:t>);</a:t>
-            </a:r>
-          </a:p>
-          <a:p>
-            <a:r>
-              <a:rPr lang="en-US" dirty="0"/>
-              <a:t>The encoding/decoding subprograms are strongly typed. This gives back the loss of type safety incurred by going to general mailboxes.</a:t>
+              <a:rPr lang="en-US" dirty="0"/>
+              <a:t>… the same entry</a:t>
+            </a:r>
+          </a:p>
+          <a:p>
+            <a:pPr lvl="1"/>
+            <a:r>
+              <a:rPr lang="en-US" dirty="0"/>
+              <a:t>… the same protected procedures</a:t>
+            </a:r>
+          </a:p>
+          <a:p>
+            <a:pPr lvl="1"/>
+            <a:r>
+              <a:rPr lang="en-US" dirty="0"/>
+              <a:t>… the same internal data storage area</a:t>
+            </a:r>
+          </a:p>
+          <a:p>
+            <a:r>
+              <a:rPr lang="en-US" dirty="0"/>
+              <a:t>Yet, the communication needs of different modules will be different!</a:t>
+            </a:r>
+          </a:p>
+          <a:p>
+            <a:r>
+              <a:rPr lang="en-US" dirty="0"/>
+              <a:t>In CubedOS, the mailboxes hold low-level octet arrays</a:t>
+            </a:r>
+          </a:p>
+          <a:p>
+            <a:pPr lvl="1"/>
+            <a:r>
+              <a:rPr lang="en-US" dirty="0"/>
+              <a:t>Sending modules are expected to </a:t>
+            </a:r>
+            <a:r>
+              <a:rPr lang="en-US" i="1" dirty="0"/>
+              <a:t>encode</a:t>
+            </a:r>
+            <a:r>
+              <a:rPr lang="en-US" dirty="0"/>
+              <a:t> the data they need to send into raw octets (a </a:t>
+            </a:r>
+            <a:r>
+              <a:rPr lang="en-US" i="1" dirty="0"/>
+              <a:t>message</a:t>
+            </a:r>
+            <a:r>
+              <a:rPr lang="en-US" dirty="0"/>
+              <a:t>) before installing that data into a mailbox.</a:t>
+            </a:r>
+          </a:p>
+          <a:p>
+            <a:pPr lvl="1"/>
+            <a:r>
+              <a:rPr lang="en-US" dirty="0"/>
+              <a:t>Receiving modules are expected to </a:t>
+            </a:r>
+            <a:r>
+              <a:rPr lang="en-US" i="1" dirty="0"/>
+              <a:t>decode</a:t>
+            </a:r>
+            <a:r>
+              <a:rPr lang="en-US" dirty="0"/>
+              <a:t> the messages they receive back into meaningful data items with appropriate types.</a:t>
             </a:r>
           </a:p>
         </p:txBody>
@@ -4767,7 +4656,7 @@
     </p:spTree>
     <p:extLst>
       <p:ext uri="{BB962C8B-B14F-4D97-AF65-F5344CB8AC3E}">
-        <p14:creationId xmlns:p14="http://schemas.microsoft.com/office/powerpoint/2010/main" val="4192253080"/>
+        <p14:creationId xmlns:p14="http://schemas.microsoft.com/office/powerpoint/2010/main" val="2555325921"/>
       </p:ext>
     </p:extLst>
   </p:cSld>
@@ -4799,7 +4688,7 @@
           <p:cNvPr id="2" name="Title 1">
             <a:extLst>
               <a:ext uri="{FF2B5EF4-FFF2-40B4-BE49-F238E27FC236}">
-                <a16:creationId xmlns:a16="http://schemas.microsoft.com/office/drawing/2014/main" id="{365B9EE6-02AB-4FCA-A595-FB37CD626922}"/>
+                <a16:creationId xmlns:a16="http://schemas.microsoft.com/office/drawing/2014/main" id="{2F822B15-C865-4835-97A3-7541D4A5DBCE}"/>
               </a:ext>
             </a:extLst>
           </p:cNvPr>
@@ -4817,7 +4706,7 @@
           <a:p>
             <a:r>
               <a:rPr lang="en-US" dirty="0"/>
-              <a:t>Still Difficult?</a:t>
+              <a:t>Isn’t That Bad??</a:t>
             </a:r>
           </a:p>
         </p:txBody>
@@ -4827,7 +4716,7 @@
           <p:cNvPr id="3" name="Content Placeholder 2">
             <a:extLst>
               <a:ext uri="{FF2B5EF4-FFF2-40B4-BE49-F238E27FC236}">
-                <a16:creationId xmlns:a16="http://schemas.microsoft.com/office/drawing/2014/main" id="{6608EA35-7586-496D-B0D6-486C2491CC4C}"/>
+                <a16:creationId xmlns:a16="http://schemas.microsoft.com/office/drawing/2014/main" id="{290DEE58-870A-441E-8E50-9939CC668657}"/>
               </a:ext>
             </a:extLst>
           </p:cNvPr>
@@ -4845,13 +4734,21 @@
           <a:p>
             <a:r>
               <a:rPr lang="en-US" dirty="0"/>
-              <a:t>Now developers have to write a tedious API package for every module. How is that better than hand tuning POs?</a:t>
-            </a:r>
-          </a:p>
-          <a:p>
-            <a:r>
-              <a:rPr lang="en-US" dirty="0"/>
-              <a:t>It isn’t!</a:t>
+              <a:t>Yes!</a:t>
+            </a:r>
+          </a:p>
+          <a:p>
+            <a:pPr lvl="1"/>
+            <a:r>
+              <a:rPr lang="en-US" dirty="0"/>
+              <a:t>The type safety of specifically typed protected procedures has been lost. Compile time errors are now runtime errors when a message fails to decode in a meaningful way.</a:t>
+            </a:r>
+          </a:p>
+          <a:p>
+            <a:pPr lvl="1"/>
+            <a:r>
+              <a:rPr lang="en-US" dirty="0"/>
+              <a:t>The destination of a message is specified using an integer index into an array… a runtime quantity. It is now possible to install a message in the wrong mailbox by accident.</a:t>
             </a:r>
           </a:p>
           <a:p>
@@ -4864,30 +4761,14 @@
             <a:pPr lvl="1"/>
             <a:r>
               <a:rPr lang="en-US" dirty="0"/>
-              <a:t>CubedOS includes a tool called </a:t>
-            </a:r>
-            <a:r>
-              <a:rPr lang="en-US" b="1" i="1" dirty="0"/>
-              <a:t>Merc</a:t>
-            </a:r>
-            <a:r>
-              <a:rPr lang="en-US" dirty="0"/>
-              <a:t> that takes a high level interface specification and automatically generates a </a:t>
-            </a:r>
-            <a:r>
-              <a:rPr lang="en-US" dirty="0" err="1"/>
-              <a:t>SPARKable</a:t>
-            </a:r>
-            <a:r>
-              <a:rPr lang="en-US" dirty="0"/>
-              <a:t> API package based on that specification.</a:t>
+              <a:t>Servers can now communicate with clients without a priori knowledge of them. They just need the index of the client’s mailbox (part of the request).</a:t>
             </a:r>
           </a:p>
           <a:p>
             <a:pPr lvl="1"/>
             <a:r>
               <a:rPr lang="en-US" dirty="0"/>
-              <a:t>Unfortunately Merc isn’t quite ready for the prime time, but it is close.</a:t>
+              <a:t>Communication patterns can now dynamically change.</a:t>
             </a:r>
           </a:p>
         </p:txBody>
@@ -4895,7 +4776,7 @@
     </p:spTree>
     <p:extLst>
       <p:ext uri="{BB962C8B-B14F-4D97-AF65-F5344CB8AC3E}">
-        <p14:creationId xmlns:p14="http://schemas.microsoft.com/office/powerpoint/2010/main" val="3745798952"/>
+        <p14:creationId xmlns:p14="http://schemas.microsoft.com/office/powerpoint/2010/main" val="3974678013"/>
       </p:ext>
     </p:extLst>
   </p:cSld>
@@ -5013,6 +4894,675 @@
           <p:cNvPr id="2" name="Title 1">
             <a:extLst>
               <a:ext uri="{FF2B5EF4-FFF2-40B4-BE49-F238E27FC236}">
+                <a16:creationId xmlns:a16="http://schemas.microsoft.com/office/drawing/2014/main" id="{227F93E6-D956-4472-9051-7BD0932C7F4B}"/>
+              </a:ext>
+            </a:extLst>
+          </p:cNvPr>
+          <p:cNvSpPr>
+            <a:spLocks noGrp="1"/>
+          </p:cNvSpPr>
+          <p:nvPr>
+            <p:ph type="title"/>
+          </p:nvPr>
+        </p:nvSpPr>
+        <p:spPr/>
+        <p:txBody>
+          <a:bodyPr/>
+          <a:lstStyle/>
+          <a:p>
+            <a:r>
+              <a:rPr lang="en-US" dirty="0"/>
+              <a:t>Not That Bad</a:t>
+            </a:r>
+          </a:p>
+        </p:txBody>
+      </p:sp>
+      <p:sp>
+        <p:nvSpPr>
+          <p:cNvPr id="3" name="Content Placeholder 2">
+            <a:extLst>
+              <a:ext uri="{FF2B5EF4-FFF2-40B4-BE49-F238E27FC236}">
+                <a16:creationId xmlns:a16="http://schemas.microsoft.com/office/drawing/2014/main" id="{65D262A2-82A0-4473-815A-C95AF9258DDC}"/>
+              </a:ext>
+            </a:extLst>
+          </p:cNvPr>
+          <p:cNvSpPr>
+            <a:spLocks noGrp="1"/>
+          </p:cNvSpPr>
+          <p:nvPr>
+            <p:ph idx="1"/>
+          </p:nvPr>
+        </p:nvSpPr>
+        <p:spPr/>
+        <p:txBody>
+          <a:bodyPr>
+            <a:normAutofit lnSpcReduction="10000"/>
+          </a:bodyPr>
+          <a:lstStyle/>
+          <a:p>
+            <a:r>
+              <a:rPr lang="en-US" dirty="0"/>
+              <a:t>A CubedOS convention is for every module to have an API package with encoding/decoding subprograms for module messages</a:t>
+            </a:r>
+          </a:p>
+          <a:p>
+            <a:pPr lvl="1"/>
+            <a:r>
+              <a:rPr lang="en-US" dirty="0"/>
+              <a:t>Example: A random number generating server module.</a:t>
+            </a:r>
+          </a:p>
+          <a:p>
+            <a:pPr lvl="1"/>
+            <a:r>
+              <a:rPr lang="en-US" dirty="0"/>
+              <a:t>Client: Calls API function </a:t>
+            </a:r>
+            <a:r>
+              <a:rPr lang="en-US" dirty="0" err="1"/>
+              <a:t>Get_Number_Request_Encode</a:t>
+            </a:r>
+            <a:r>
+              <a:rPr lang="en-US" dirty="0"/>
+              <a:t> to construct a message asking for a random number. Sends the resulting message to the server’s mailbox.</a:t>
+            </a:r>
+          </a:p>
+          <a:p>
+            <a:pPr lvl="1"/>
+            <a:r>
+              <a:rPr lang="en-US" dirty="0"/>
+              <a:t>Server: Reads message from mailbox. Decodes the request using API procedure </a:t>
+            </a:r>
+            <a:r>
+              <a:rPr lang="en-US" dirty="0" err="1"/>
+              <a:t>Get_Number_Request_Decode</a:t>
+            </a:r>
+            <a:r>
+              <a:rPr lang="en-US" dirty="0"/>
+              <a:t>. Generates a random number.</a:t>
+            </a:r>
+          </a:p>
+          <a:p>
+            <a:pPr lvl="1"/>
+            <a:r>
+              <a:rPr lang="en-US" dirty="0"/>
+              <a:t>Server: Calls API function </a:t>
+            </a:r>
+            <a:r>
+              <a:rPr lang="en-US" dirty="0" err="1"/>
+              <a:t>Get_Number_Reply_Encode</a:t>
+            </a:r>
+            <a:r>
+              <a:rPr lang="en-US" dirty="0"/>
+              <a:t> to construct a message containing the random number. Sends the resulting message to the client’s mailbox (array index taken from message header).</a:t>
+            </a:r>
+          </a:p>
+          <a:p>
+            <a:pPr lvl="1"/>
+            <a:r>
+              <a:rPr lang="en-US" dirty="0"/>
+              <a:t>Client: Reads message from mailbox. Decodes using API procedure </a:t>
+            </a:r>
+            <a:r>
+              <a:rPr lang="en-US" dirty="0" err="1"/>
+              <a:t>Get_Number_Reply_Decode</a:t>
+            </a:r>
+            <a:r>
+              <a:rPr lang="en-US" dirty="0"/>
+              <a:t>.</a:t>
+            </a:r>
+          </a:p>
+        </p:txBody>
+      </p:sp>
+    </p:spTree>
+    <p:extLst>
+      <p:ext uri="{BB962C8B-B14F-4D97-AF65-F5344CB8AC3E}">
+        <p14:creationId xmlns:p14="http://schemas.microsoft.com/office/powerpoint/2010/main" val="1522187031"/>
+      </p:ext>
+    </p:extLst>
+  </p:cSld>
+  <p:clrMapOvr>
+    <a:masterClrMapping/>
+  </p:clrMapOvr>
+</p:sld>
+</file>
+
+<file path=ppt/slides/slide21.xml><?xml version="1.0" encoding="utf-8"?>
+<p:sld xmlns:a="http://schemas.openxmlformats.org/drawingml/2006/main" xmlns:r="http://schemas.openxmlformats.org/officeDocument/2006/relationships" xmlns:p="http://schemas.openxmlformats.org/presentationml/2006/main">
+  <p:cSld>
+    <p:spTree>
+      <p:nvGrpSpPr>
+        <p:cNvPr id="1" name=""/>
+        <p:cNvGrpSpPr/>
+        <p:nvPr/>
+      </p:nvGrpSpPr>
+      <p:grpSpPr>
+        <a:xfrm>
+          <a:off x="0" y="0"/>
+          <a:ext cx="0" cy="0"/>
+          <a:chOff x="0" y="0"/>
+          <a:chExt cx="0" cy="0"/>
+        </a:xfrm>
+      </p:grpSpPr>
+      <p:sp>
+        <p:nvSpPr>
+          <p:cNvPr id="2" name="Title 1">
+            <a:extLst>
+              <a:ext uri="{FF2B5EF4-FFF2-40B4-BE49-F238E27FC236}">
+                <a16:creationId xmlns:a16="http://schemas.microsoft.com/office/drawing/2014/main" id="{AEC4863B-E970-4A97-857A-801E85E4CD09}"/>
+              </a:ext>
+            </a:extLst>
+          </p:cNvPr>
+          <p:cNvSpPr>
+            <a:spLocks noGrp="1"/>
+          </p:cNvSpPr>
+          <p:nvPr>
+            <p:ph type="title"/>
+          </p:nvPr>
+        </p:nvSpPr>
+        <p:spPr/>
+        <p:txBody>
+          <a:bodyPr/>
+          <a:lstStyle/>
+          <a:p>
+            <a:r>
+              <a:rPr lang="en-US" dirty="0"/>
+              <a:t>Conventions</a:t>
+            </a:r>
+          </a:p>
+        </p:txBody>
+      </p:sp>
+      <p:sp>
+        <p:nvSpPr>
+          <p:cNvPr id="3" name="Content Placeholder 2">
+            <a:extLst>
+              <a:ext uri="{FF2B5EF4-FFF2-40B4-BE49-F238E27FC236}">
+                <a16:creationId xmlns:a16="http://schemas.microsoft.com/office/drawing/2014/main" id="{8B2C9848-21AE-493A-AC78-51E73E7BED29}"/>
+              </a:ext>
+            </a:extLst>
+          </p:cNvPr>
+          <p:cNvSpPr>
+            <a:spLocks noGrp="1"/>
+          </p:cNvSpPr>
+          <p:nvPr>
+            <p:ph idx="1"/>
+          </p:nvPr>
+        </p:nvSpPr>
+        <p:spPr/>
+        <p:txBody>
+          <a:bodyPr>
+            <a:normAutofit lnSpcReduction="10000"/>
+          </a:bodyPr>
+          <a:lstStyle/>
+          <a:p>
+            <a:r>
+              <a:rPr lang="en-US" dirty="0"/>
+              <a:t>CubedOS conceptualizes modules as clients or servers</a:t>
+            </a:r>
+          </a:p>
+          <a:p>
+            <a:pPr lvl="1"/>
+            <a:r>
+              <a:rPr lang="en-US" dirty="0"/>
+              <a:t>… with the understanding that some modules act as both at different times.</a:t>
+            </a:r>
+          </a:p>
+          <a:p>
+            <a:r>
+              <a:rPr lang="en-US" dirty="0"/>
+              <a:t>Thus messages are either “requests” or “replies.”</a:t>
+            </a:r>
+          </a:p>
+          <a:p>
+            <a:r>
+              <a:rPr lang="en-US" dirty="0"/>
+              <a:t>CubedOS convention:</a:t>
+            </a:r>
+          </a:p>
+          <a:p>
+            <a:pPr lvl="1"/>
+            <a:r>
+              <a:rPr lang="en-US" dirty="0"/>
+              <a:t>Request messages are constructed (by the client) using an API function with the name </a:t>
+            </a:r>
+            <a:r>
+              <a:rPr lang="en-US" dirty="0" err="1">
+                <a:latin typeface="Courier New" panose="02070309020205020404" pitchFamily="49" charset="0"/>
+                <a:cs typeface="Courier New" panose="02070309020205020404" pitchFamily="49" charset="0"/>
+              </a:rPr>
+              <a:t>Message_Name</a:t>
+            </a:r>
+            <a:r>
+              <a:rPr lang="en-US" dirty="0" err="1"/>
+              <a:t>_Request_Encode</a:t>
+            </a:r>
+            <a:r>
+              <a:rPr lang="en-US" dirty="0"/>
+              <a:t>.</a:t>
+            </a:r>
+          </a:p>
+          <a:p>
+            <a:pPr lvl="1"/>
+            <a:r>
+              <a:rPr lang="en-US" dirty="0"/>
+              <a:t>Request messages are decoded (by the server) using an API procedure with the name </a:t>
+            </a:r>
+            <a:r>
+              <a:rPr lang="en-US" dirty="0" err="1">
+                <a:latin typeface="Courier New" panose="02070309020205020404" pitchFamily="49" charset="0"/>
+                <a:cs typeface="Courier New" panose="02070309020205020404" pitchFamily="49" charset="0"/>
+              </a:rPr>
+              <a:t>Message_Name</a:t>
+            </a:r>
+            <a:r>
+              <a:rPr lang="en-US" dirty="0" err="1"/>
+              <a:t>_Request_Decode</a:t>
+            </a:r>
+            <a:r>
+              <a:rPr lang="en-US" dirty="0"/>
+              <a:t>.</a:t>
+            </a:r>
+          </a:p>
+          <a:p>
+            <a:pPr lvl="1"/>
+            <a:r>
+              <a:rPr lang="en-US" dirty="0"/>
+              <a:t>Reply messages are constructed (by the server) using an API function with the name </a:t>
+            </a:r>
+            <a:r>
+              <a:rPr lang="en-US" dirty="0" err="1">
+                <a:latin typeface="Courier New" panose="02070309020205020404" pitchFamily="49" charset="0"/>
+                <a:cs typeface="Courier New" panose="02070309020205020404" pitchFamily="49" charset="0"/>
+              </a:rPr>
+              <a:t>Message_Name</a:t>
+            </a:r>
+            <a:r>
+              <a:rPr lang="en-US" dirty="0" err="1"/>
+              <a:t>_Reply_Encode</a:t>
+            </a:r>
+            <a:r>
+              <a:rPr lang="en-US" dirty="0"/>
+              <a:t>.</a:t>
+            </a:r>
+          </a:p>
+          <a:p>
+            <a:pPr lvl="1"/>
+            <a:r>
+              <a:rPr lang="en-US" dirty="0"/>
+              <a:t>Reply messages are decoded (by the client) using an API procedure with the name </a:t>
+            </a:r>
+            <a:r>
+              <a:rPr lang="en-US" dirty="0" err="1">
+                <a:latin typeface="Courier New" panose="02070309020205020404" pitchFamily="49" charset="0"/>
+                <a:cs typeface="Courier New" panose="02070309020205020404" pitchFamily="49" charset="0"/>
+              </a:rPr>
+              <a:t>Message_Name</a:t>
+            </a:r>
+            <a:r>
+              <a:rPr lang="en-US" dirty="0" err="1"/>
+              <a:t>_Reply_Decode</a:t>
+            </a:r>
+            <a:r>
+              <a:rPr lang="en-US" dirty="0"/>
+              <a:t>.</a:t>
+            </a:r>
+          </a:p>
+        </p:txBody>
+      </p:sp>
+    </p:spTree>
+    <p:extLst>
+      <p:ext uri="{BB962C8B-B14F-4D97-AF65-F5344CB8AC3E}">
+        <p14:creationId xmlns:p14="http://schemas.microsoft.com/office/powerpoint/2010/main" val="1422545887"/>
+      </p:ext>
+    </p:extLst>
+  </p:cSld>
+  <p:clrMapOvr>
+    <a:masterClrMapping/>
+  </p:clrMapOvr>
+</p:sld>
+</file>
+
+<file path=ppt/slides/slide22.xml><?xml version="1.0" encoding="utf-8"?>
+<p:sld xmlns:a="http://schemas.openxmlformats.org/drawingml/2006/main" xmlns:r="http://schemas.openxmlformats.org/officeDocument/2006/relationships" xmlns:p="http://schemas.openxmlformats.org/presentationml/2006/main">
+  <p:cSld>
+    <p:spTree>
+      <p:nvGrpSpPr>
+        <p:cNvPr id="1" name=""/>
+        <p:cNvGrpSpPr/>
+        <p:nvPr/>
+      </p:nvGrpSpPr>
+      <p:grpSpPr>
+        <a:xfrm>
+          <a:off x="0" y="0"/>
+          <a:ext cx="0" cy="0"/>
+          <a:chOff x="0" y="0"/>
+          <a:chExt cx="0" cy="0"/>
+        </a:xfrm>
+      </p:grpSpPr>
+      <p:sp>
+        <p:nvSpPr>
+          <p:cNvPr id="2" name="Title 1">
+            <a:extLst>
+              <a:ext uri="{FF2B5EF4-FFF2-40B4-BE49-F238E27FC236}">
+                <a16:creationId xmlns:a16="http://schemas.microsoft.com/office/drawing/2014/main" id="{A8305739-7513-4ACA-A520-5844D813EDB2}"/>
+              </a:ext>
+            </a:extLst>
+          </p:cNvPr>
+          <p:cNvSpPr>
+            <a:spLocks noGrp="1"/>
+          </p:cNvSpPr>
+          <p:nvPr>
+            <p:ph type="title"/>
+          </p:nvPr>
+        </p:nvSpPr>
+        <p:spPr/>
+        <p:txBody>
+          <a:bodyPr/>
+          <a:lstStyle/>
+          <a:p>
+            <a:r>
+              <a:rPr lang="en-US" dirty="0"/>
+              <a:t>What Messages?</a:t>
+            </a:r>
+          </a:p>
+        </p:txBody>
+      </p:sp>
+      <p:sp>
+        <p:nvSpPr>
+          <p:cNvPr id="3" name="Content Placeholder 2">
+            <a:extLst>
+              <a:ext uri="{FF2B5EF4-FFF2-40B4-BE49-F238E27FC236}">
+                <a16:creationId xmlns:a16="http://schemas.microsoft.com/office/drawing/2014/main" id="{CD1E17CF-30F0-4F98-9039-E3253A703155}"/>
+              </a:ext>
+            </a:extLst>
+          </p:cNvPr>
+          <p:cNvSpPr>
+            <a:spLocks noGrp="1"/>
+          </p:cNvSpPr>
+          <p:nvPr>
+            <p:ph idx="1"/>
+          </p:nvPr>
+        </p:nvSpPr>
+        <p:spPr/>
+        <p:txBody>
+          <a:bodyPr/>
+          <a:lstStyle/>
+          <a:p>
+            <a:r>
+              <a:rPr lang="en-US" dirty="0"/>
+              <a:t>CubedOS convention: The messages a module understands are declared in that module’s API package using an enumeration type.</a:t>
+            </a:r>
+          </a:p>
+          <a:p>
+            <a:pPr lvl="1"/>
+            <a:r>
+              <a:rPr lang="en-US" b="1" dirty="0">
+                <a:latin typeface="Courier New" panose="02070309020205020404" pitchFamily="49" charset="0"/>
+                <a:cs typeface="Courier New" panose="02070309020205020404" pitchFamily="49" charset="0"/>
+              </a:rPr>
+              <a:t>type</a:t>
+            </a:r>
+            <a:r>
+              <a:rPr lang="en-US" dirty="0">
+                <a:latin typeface="Courier New" panose="02070309020205020404" pitchFamily="49" charset="0"/>
+                <a:cs typeface="Courier New" panose="02070309020205020404" pitchFamily="49" charset="0"/>
+              </a:rPr>
+              <a:t> </a:t>
+            </a:r>
+            <a:r>
+              <a:rPr lang="en-US" dirty="0" err="1">
+                <a:latin typeface="Courier New" panose="02070309020205020404" pitchFamily="49" charset="0"/>
+                <a:cs typeface="Courier New" panose="02070309020205020404" pitchFamily="49" charset="0"/>
+              </a:rPr>
+              <a:t>Message_Type</a:t>
+            </a:r>
+            <a:r>
+              <a:rPr lang="en-US" dirty="0">
+                <a:latin typeface="Courier New" panose="02070309020205020404" pitchFamily="49" charset="0"/>
+                <a:cs typeface="Courier New" panose="02070309020205020404" pitchFamily="49" charset="0"/>
+              </a:rPr>
+              <a:t> </a:t>
+            </a:r>
+            <a:r>
+              <a:rPr lang="en-US" b="1" dirty="0">
+                <a:latin typeface="Courier New" panose="02070309020205020404" pitchFamily="49" charset="0"/>
+                <a:cs typeface="Courier New" panose="02070309020205020404" pitchFamily="49" charset="0"/>
+              </a:rPr>
+              <a:t>is</a:t>
+            </a:r>
+            <a:r>
+              <a:rPr lang="en-US" dirty="0">
+                <a:latin typeface="Courier New" panose="02070309020205020404" pitchFamily="49" charset="0"/>
+                <a:cs typeface="Courier New" panose="02070309020205020404" pitchFamily="49" charset="0"/>
+              </a:rPr>
+              <a:t> (</a:t>
+            </a:r>
+            <a:br>
+              <a:rPr lang="en-US" dirty="0">
+                <a:latin typeface="Courier New" panose="02070309020205020404" pitchFamily="49" charset="0"/>
+                <a:cs typeface="Courier New" panose="02070309020205020404" pitchFamily="49" charset="0"/>
+              </a:rPr>
+            </a:br>
+            <a:r>
+              <a:rPr lang="en-US" dirty="0">
+                <a:latin typeface="Courier New" panose="02070309020205020404" pitchFamily="49" charset="0"/>
+                <a:cs typeface="Courier New" panose="02070309020205020404" pitchFamily="49" charset="0"/>
+              </a:rPr>
+              <a:t>   </a:t>
+            </a:r>
+            <a:r>
+              <a:rPr lang="en-US" dirty="0" err="1">
+                <a:latin typeface="Courier New" panose="02070309020205020404" pitchFamily="49" charset="0"/>
+                <a:cs typeface="Courier New" panose="02070309020205020404" pitchFamily="49" charset="0"/>
+              </a:rPr>
+              <a:t>Get_Number_Request</a:t>
+            </a:r>
+            <a:r>
+              <a:rPr lang="en-US" dirty="0">
+                <a:latin typeface="Courier New" panose="02070309020205020404" pitchFamily="49" charset="0"/>
+                <a:cs typeface="Courier New" panose="02070309020205020404" pitchFamily="49" charset="0"/>
+              </a:rPr>
+              <a:t>,</a:t>
+            </a:r>
+            <a:br>
+              <a:rPr lang="en-US" dirty="0">
+                <a:latin typeface="Courier New" panose="02070309020205020404" pitchFamily="49" charset="0"/>
+                <a:cs typeface="Courier New" panose="02070309020205020404" pitchFamily="49" charset="0"/>
+              </a:rPr>
+            </a:br>
+            <a:r>
+              <a:rPr lang="en-US" dirty="0">
+                <a:latin typeface="Courier New" panose="02070309020205020404" pitchFamily="49" charset="0"/>
+                <a:cs typeface="Courier New" panose="02070309020205020404" pitchFamily="49" charset="0"/>
+              </a:rPr>
+              <a:t>   </a:t>
+            </a:r>
+            <a:r>
+              <a:rPr lang="en-US" dirty="0" err="1">
+                <a:latin typeface="Courier New" panose="02070309020205020404" pitchFamily="49" charset="0"/>
+                <a:cs typeface="Courier New" panose="02070309020205020404" pitchFamily="49" charset="0"/>
+              </a:rPr>
+              <a:t>Get_Number_Reply</a:t>
+            </a:r>
+            <a:r>
+              <a:rPr lang="en-US" dirty="0">
+                <a:latin typeface="Courier New" panose="02070309020205020404" pitchFamily="49" charset="0"/>
+                <a:cs typeface="Courier New" panose="02070309020205020404" pitchFamily="49" charset="0"/>
+              </a:rPr>
+              <a:t>);</a:t>
+            </a:r>
+          </a:p>
+          <a:p>
+            <a:r>
+              <a:rPr lang="en-US" dirty="0"/>
+              <a:t>The encoding/decoding subprograms are strongly typed. This gives back the loss of type safety incurred by going to general mailboxes.</a:t>
+            </a:r>
+          </a:p>
+        </p:txBody>
+      </p:sp>
+    </p:spTree>
+    <p:extLst>
+      <p:ext uri="{BB962C8B-B14F-4D97-AF65-F5344CB8AC3E}">
+        <p14:creationId xmlns:p14="http://schemas.microsoft.com/office/powerpoint/2010/main" val="4192253080"/>
+      </p:ext>
+    </p:extLst>
+  </p:cSld>
+  <p:clrMapOvr>
+    <a:masterClrMapping/>
+  </p:clrMapOvr>
+</p:sld>
+</file>
+
+<file path=ppt/slides/slide23.xml><?xml version="1.0" encoding="utf-8"?>
+<p:sld xmlns:a="http://schemas.openxmlformats.org/drawingml/2006/main" xmlns:r="http://schemas.openxmlformats.org/officeDocument/2006/relationships" xmlns:p="http://schemas.openxmlformats.org/presentationml/2006/main">
+  <p:cSld>
+    <p:spTree>
+      <p:nvGrpSpPr>
+        <p:cNvPr id="1" name=""/>
+        <p:cNvGrpSpPr/>
+        <p:nvPr/>
+      </p:nvGrpSpPr>
+      <p:grpSpPr>
+        <a:xfrm>
+          <a:off x="0" y="0"/>
+          <a:ext cx="0" cy="0"/>
+          <a:chOff x="0" y="0"/>
+          <a:chExt cx="0" cy="0"/>
+        </a:xfrm>
+      </p:grpSpPr>
+      <p:sp>
+        <p:nvSpPr>
+          <p:cNvPr id="2" name="Title 1">
+            <a:extLst>
+              <a:ext uri="{FF2B5EF4-FFF2-40B4-BE49-F238E27FC236}">
+                <a16:creationId xmlns:a16="http://schemas.microsoft.com/office/drawing/2014/main" id="{365B9EE6-02AB-4FCA-A595-FB37CD626922}"/>
+              </a:ext>
+            </a:extLst>
+          </p:cNvPr>
+          <p:cNvSpPr>
+            <a:spLocks noGrp="1"/>
+          </p:cNvSpPr>
+          <p:nvPr>
+            <p:ph type="title"/>
+          </p:nvPr>
+        </p:nvSpPr>
+        <p:spPr/>
+        <p:txBody>
+          <a:bodyPr/>
+          <a:lstStyle/>
+          <a:p>
+            <a:r>
+              <a:rPr lang="en-US" dirty="0"/>
+              <a:t>Still Difficult?</a:t>
+            </a:r>
+          </a:p>
+        </p:txBody>
+      </p:sp>
+      <p:sp>
+        <p:nvSpPr>
+          <p:cNvPr id="3" name="Content Placeholder 2">
+            <a:extLst>
+              <a:ext uri="{FF2B5EF4-FFF2-40B4-BE49-F238E27FC236}">
+                <a16:creationId xmlns:a16="http://schemas.microsoft.com/office/drawing/2014/main" id="{6608EA35-7586-496D-B0D6-486C2491CC4C}"/>
+              </a:ext>
+            </a:extLst>
+          </p:cNvPr>
+          <p:cNvSpPr>
+            <a:spLocks noGrp="1"/>
+          </p:cNvSpPr>
+          <p:nvPr>
+            <p:ph idx="1"/>
+          </p:nvPr>
+        </p:nvSpPr>
+        <p:spPr/>
+        <p:txBody>
+          <a:bodyPr/>
+          <a:lstStyle/>
+          <a:p>
+            <a:r>
+              <a:rPr lang="en-US" dirty="0"/>
+              <a:t>Now developers have to write a tedious API package for every module. How is that better than hand tuning POs?</a:t>
+            </a:r>
+          </a:p>
+          <a:p>
+            <a:r>
+              <a:rPr lang="en-US" dirty="0"/>
+              <a:t>It isn’t!</a:t>
+            </a:r>
+          </a:p>
+          <a:p>
+            <a:r>
+              <a:rPr lang="en-US" dirty="0"/>
+              <a:t>But…</a:t>
+            </a:r>
+          </a:p>
+          <a:p>
+            <a:pPr lvl="1"/>
+            <a:r>
+              <a:rPr lang="en-US" dirty="0"/>
+              <a:t>CubedOS includes a tool called </a:t>
+            </a:r>
+            <a:r>
+              <a:rPr lang="en-US" b="1" i="1" dirty="0"/>
+              <a:t>Merc</a:t>
+            </a:r>
+            <a:r>
+              <a:rPr lang="en-US" dirty="0"/>
+              <a:t> that takes a high level interface specification and automatically generates a </a:t>
+            </a:r>
+            <a:r>
+              <a:rPr lang="en-US" dirty="0" err="1"/>
+              <a:t>SPARKable</a:t>
+            </a:r>
+            <a:r>
+              <a:rPr lang="en-US" dirty="0"/>
+              <a:t> API package based on that specification.</a:t>
+            </a:r>
+          </a:p>
+          <a:p>
+            <a:pPr lvl="1"/>
+            <a:r>
+              <a:rPr lang="en-US" dirty="0"/>
+              <a:t>Unfortunately Merc isn’t quite ready for the prime time, but it is close.</a:t>
+            </a:r>
+          </a:p>
+        </p:txBody>
+      </p:sp>
+    </p:spTree>
+    <p:extLst>
+      <p:ext uri="{BB962C8B-B14F-4D97-AF65-F5344CB8AC3E}">
+        <p14:creationId xmlns:p14="http://schemas.microsoft.com/office/powerpoint/2010/main" val="3745798952"/>
+      </p:ext>
+    </p:extLst>
+  </p:cSld>
+  <p:clrMapOvr>
+    <a:masterClrMapping/>
+  </p:clrMapOvr>
+</p:sld>
+</file>
+
+<file path=ppt/slides/slide24.xml><?xml version="1.0" encoding="utf-8"?>
+<p:sld xmlns:a="http://schemas.openxmlformats.org/drawingml/2006/main" xmlns:r="http://schemas.openxmlformats.org/officeDocument/2006/relationships" xmlns:p="http://schemas.openxmlformats.org/presentationml/2006/main">
+  <p:cSld>
+    <p:spTree>
+      <p:nvGrpSpPr>
+        <p:cNvPr id="1" name=""/>
+        <p:cNvGrpSpPr/>
+        <p:nvPr/>
+      </p:nvGrpSpPr>
+      <p:grpSpPr>
+        <a:xfrm>
+          <a:off x="0" y="0"/>
+          <a:ext cx="0" cy="0"/>
+          <a:chOff x="0" y="0"/>
+          <a:chExt cx="0" cy="0"/>
+        </a:xfrm>
+      </p:grpSpPr>
+      <p:sp>
+        <p:nvSpPr>
+          <p:cNvPr id="2" name="Title 1">
+            <a:extLst>
+              <a:ext uri="{FF2B5EF4-FFF2-40B4-BE49-F238E27FC236}">
                 <a16:creationId xmlns:a16="http://schemas.microsoft.com/office/drawing/2014/main" id="{E032D7FF-7D25-4EA3-A80B-B4F54C9FD18A}"/>
               </a:ext>
             </a:extLst>
@@ -5121,7 +5671,7 @@
 </p:sld>
 </file>
 
-<file path=ppt/slides/slide21.xml><?xml version="1.0" encoding="utf-8"?>
+<file path=ppt/slides/slide25.xml><?xml version="1.0" encoding="utf-8"?>
 <p:sld xmlns:a="http://schemas.openxmlformats.org/drawingml/2006/main" xmlns:r="http://schemas.openxmlformats.org/officeDocument/2006/relationships" xmlns:p="http://schemas.openxmlformats.org/presentationml/2006/main">
   <p:cSld>
     <p:spTree>
@@ -5473,7 +6023,11 @@
             </a:r>
             <a:r>
               <a:rPr lang="en-US" dirty="0"/>
-              <a:t>, called the primary task</a:t>
+              <a:t>, called the </a:t>
+            </a:r>
+            <a:r>
+              <a:rPr lang="en-US" i="1" dirty="0"/>
+              <a:t>primary task</a:t>
             </a:r>
           </a:p>
           <a:p>
@@ -5705,7 +6259,7 @@
           <p:cNvPr id="2" name="Title 1">
             <a:extLst>
               <a:ext uri="{FF2B5EF4-FFF2-40B4-BE49-F238E27FC236}">
-                <a16:creationId xmlns:a16="http://schemas.microsoft.com/office/drawing/2014/main" id="{99DB4545-9E72-4096-B27E-0B5DF935AD7D}"/>
+                <a16:creationId xmlns:a16="http://schemas.microsoft.com/office/drawing/2014/main" id="{B70BA843-3C0E-40C3-90E1-6BC5615B901E}"/>
               </a:ext>
             </a:extLst>
           </p:cNvPr>
@@ -5723,71 +6277,366 @@
           <a:p>
             <a:r>
               <a:rPr lang="en-US" dirty="0"/>
-              <a:t>Modules vs Libraries</a:t>
-            </a:r>
-          </a:p>
-        </p:txBody>
-      </p:sp>
-      <p:sp>
-        <p:nvSpPr>
-          <p:cNvPr id="3" name="Content Placeholder 2">
-            <a:extLst>
-              <a:ext uri="{FF2B5EF4-FFF2-40B4-BE49-F238E27FC236}">
-                <a16:creationId xmlns:a16="http://schemas.microsoft.com/office/drawing/2014/main" id="{AFC8F00F-1A69-4936-93A7-75E2AC6D7ACC}"/>
-              </a:ext>
-            </a:extLst>
-          </p:cNvPr>
-          <p:cNvSpPr>
-            <a:spLocks noGrp="1"/>
-          </p:cNvSpPr>
-          <p:nvPr>
-            <p:ph idx="1"/>
-          </p:nvPr>
-        </p:nvSpPr>
-        <p:spPr/>
-        <p:txBody>
-          <a:bodyPr/>
-          <a:lstStyle/>
-          <a:p>
-            <a:r>
-              <a:rPr lang="en-US" dirty="0"/>
-              <a:t>A CubedOS application can also make use of ordinary Ada package libraries. However…</a:t>
-            </a:r>
-          </a:p>
-          <a:p>
-            <a:pPr lvl="1"/>
-            <a:r>
-              <a:rPr lang="en-US" dirty="0"/>
-              <a:t>Communication between modules is only intended to be done via stand alone POs that are touched by the primary tasks; not via shared data inside a library package.</a:t>
-            </a:r>
-          </a:p>
-          <a:p>
-            <a:pPr lvl="1"/>
-            <a:r>
-              <a:rPr lang="en-US" dirty="0"/>
-              <a:t>Package libraries must therefor be task-safe and contain only pure (</a:t>
-            </a:r>
-            <a:r>
-              <a:rPr lang="en-US" dirty="0" err="1"/>
-              <a:t>i</a:t>
-            </a:r>
-            <a:r>
-              <a:rPr lang="en-US" dirty="0"/>
-              <a:t>. e., side effect-free) code.</a:t>
-            </a:r>
-          </a:p>
-          <a:p>
-            <a:pPr lvl="1"/>
-            <a:r>
-              <a:rPr lang="en-US" dirty="0"/>
-              <a:t>Currently there is no automatic checking of this, but SPARK will prevent egregious violations.</a:t>
-            </a:r>
-          </a:p>
-          <a:p>
-            <a:pPr lvl="1"/>
-            <a:r>
-              <a:rPr lang="en-US" i="1" dirty="0"/>
-              <a:t>There is no back door method for modules to communicate!</a:t>
+              <a:t>Ada Protected Objects (Spec)</a:t>
+            </a:r>
+          </a:p>
+        </p:txBody>
+      </p:sp>
+      <p:sp>
+        <p:nvSpPr>
+          <p:cNvPr id="4" name="TextBox 3">
+            <a:extLst>
+              <a:ext uri="{FF2B5EF4-FFF2-40B4-BE49-F238E27FC236}">
+                <a16:creationId xmlns:a16="http://schemas.microsoft.com/office/drawing/2014/main" id="{48C2F5CA-4F95-4434-AE88-E3A6E9434820}"/>
+              </a:ext>
+            </a:extLst>
+          </p:cNvPr>
+          <p:cNvSpPr txBox="1"/>
+          <p:nvPr/>
+        </p:nvSpPr>
+        <p:spPr>
+          <a:xfrm>
+            <a:off x="1233996" y="1690688"/>
+            <a:ext cx="7077579" cy="3416320"/>
+          </a:xfrm>
+          <a:prstGeom prst="rect">
+            <a:avLst/>
+          </a:prstGeom>
+          <a:noFill/>
+        </p:spPr>
+        <p:txBody>
+          <a:bodyPr wrap="none" rtlCol="0">
+            <a:spAutoFit/>
+          </a:bodyPr>
+          <a:lstStyle/>
+          <a:p>
+            <a:r>
+              <a:rPr lang="en-US" b="1" dirty="0">
+                <a:latin typeface="Courier New" panose="02070309020205020404" pitchFamily="49" charset="0"/>
+                <a:cs typeface="Courier New" panose="02070309020205020404" pitchFamily="49" charset="0"/>
+              </a:rPr>
+              <a:t>package</a:t>
+            </a:r>
+            <a:r>
+              <a:rPr lang="en-US" dirty="0">
+                <a:latin typeface="Courier New" panose="02070309020205020404" pitchFamily="49" charset="0"/>
+                <a:cs typeface="Courier New" panose="02070309020205020404" pitchFamily="49" charset="0"/>
+              </a:rPr>
+              <a:t> Example </a:t>
+            </a:r>
+            <a:r>
+              <a:rPr lang="en-US" b="1" dirty="0">
+                <a:latin typeface="Courier New" panose="02070309020205020404" pitchFamily="49" charset="0"/>
+                <a:cs typeface="Courier New" panose="02070309020205020404" pitchFamily="49" charset="0"/>
+              </a:rPr>
+              <a:t>is</a:t>
+            </a:r>
+          </a:p>
+          <a:p>
+            <a:endParaRPr lang="en-US" dirty="0">
+              <a:latin typeface="Courier New" panose="02070309020205020404" pitchFamily="49" charset="0"/>
+              <a:cs typeface="Courier New" panose="02070309020205020404" pitchFamily="49" charset="0"/>
+            </a:endParaRPr>
+          </a:p>
+          <a:p>
+            <a:r>
+              <a:rPr lang="en-US" dirty="0">
+                <a:latin typeface="Courier New" panose="02070309020205020404" pitchFamily="49" charset="0"/>
+                <a:cs typeface="Courier New" panose="02070309020205020404" pitchFamily="49" charset="0"/>
+              </a:rPr>
+              <a:t>   </a:t>
+            </a:r>
+            <a:r>
+              <a:rPr lang="en-US" b="1" dirty="0">
+                <a:latin typeface="Courier New" panose="02070309020205020404" pitchFamily="49" charset="0"/>
+                <a:cs typeface="Courier New" panose="02070309020205020404" pitchFamily="49" charset="0"/>
+              </a:rPr>
+              <a:t>protected</a:t>
+            </a:r>
+            <a:r>
+              <a:rPr lang="en-US" dirty="0">
+                <a:latin typeface="Courier New" panose="02070309020205020404" pitchFamily="49" charset="0"/>
+                <a:cs typeface="Courier New" panose="02070309020205020404" pitchFamily="49" charset="0"/>
+              </a:rPr>
+              <a:t> </a:t>
+            </a:r>
+            <a:r>
+              <a:rPr lang="en-US" dirty="0" err="1">
+                <a:latin typeface="Courier New" panose="02070309020205020404" pitchFamily="49" charset="0"/>
+                <a:cs typeface="Courier New" panose="02070309020205020404" pitchFamily="49" charset="0"/>
+              </a:rPr>
+              <a:t>Integer_Holder</a:t>
+            </a:r>
+            <a:r>
+              <a:rPr lang="en-US" dirty="0">
+                <a:latin typeface="Courier New" panose="02070309020205020404" pitchFamily="49" charset="0"/>
+                <a:cs typeface="Courier New" panose="02070309020205020404" pitchFamily="49" charset="0"/>
+              </a:rPr>
+              <a:t> </a:t>
+            </a:r>
+            <a:r>
+              <a:rPr lang="en-US" b="1" dirty="0">
+                <a:latin typeface="Courier New" panose="02070309020205020404" pitchFamily="49" charset="0"/>
+                <a:cs typeface="Courier New" panose="02070309020205020404" pitchFamily="49" charset="0"/>
+              </a:rPr>
+              <a:t>is</a:t>
+            </a:r>
+          </a:p>
+          <a:p>
+            <a:r>
+              <a:rPr lang="en-US" dirty="0">
+                <a:latin typeface="Courier New" panose="02070309020205020404" pitchFamily="49" charset="0"/>
+                <a:cs typeface="Courier New" panose="02070309020205020404" pitchFamily="49" charset="0"/>
+              </a:rPr>
+              <a:t>      </a:t>
+            </a:r>
+            <a:r>
+              <a:rPr lang="en-US" b="1" dirty="0">
+                <a:latin typeface="Courier New" panose="02070309020205020404" pitchFamily="49" charset="0"/>
+                <a:cs typeface="Courier New" panose="02070309020205020404" pitchFamily="49" charset="0"/>
+              </a:rPr>
+              <a:t>function</a:t>
+            </a:r>
+            <a:r>
+              <a:rPr lang="en-US" dirty="0">
+                <a:latin typeface="Courier New" panose="02070309020205020404" pitchFamily="49" charset="0"/>
+                <a:cs typeface="Courier New" panose="02070309020205020404" pitchFamily="49" charset="0"/>
+              </a:rPr>
+              <a:t> </a:t>
+            </a:r>
+            <a:r>
+              <a:rPr lang="en-US" dirty="0" err="1">
+                <a:latin typeface="Courier New" panose="02070309020205020404" pitchFamily="49" charset="0"/>
+                <a:cs typeface="Courier New" panose="02070309020205020404" pitchFamily="49" charset="0"/>
+              </a:rPr>
+              <a:t>Get_Value</a:t>
+            </a:r>
+            <a:r>
+              <a:rPr lang="en-US" dirty="0">
+                <a:latin typeface="Courier New" panose="02070309020205020404" pitchFamily="49" charset="0"/>
+                <a:cs typeface="Courier New" panose="02070309020205020404" pitchFamily="49" charset="0"/>
+              </a:rPr>
+              <a:t> </a:t>
+            </a:r>
+            <a:r>
+              <a:rPr lang="en-US" b="1" dirty="0">
+                <a:latin typeface="Courier New" panose="02070309020205020404" pitchFamily="49" charset="0"/>
+                <a:cs typeface="Courier New" panose="02070309020205020404" pitchFamily="49" charset="0"/>
+              </a:rPr>
+              <a:t>return</a:t>
+            </a:r>
+            <a:r>
+              <a:rPr lang="en-US" dirty="0">
+                <a:latin typeface="Courier New" panose="02070309020205020404" pitchFamily="49" charset="0"/>
+                <a:cs typeface="Courier New" panose="02070309020205020404" pitchFamily="49" charset="0"/>
+              </a:rPr>
+              <a:t> Integer;</a:t>
+            </a:r>
+          </a:p>
+          <a:p>
+            <a:r>
+              <a:rPr lang="en-US" dirty="0">
+                <a:latin typeface="Courier New" panose="02070309020205020404" pitchFamily="49" charset="0"/>
+                <a:cs typeface="Courier New" panose="02070309020205020404" pitchFamily="49" charset="0"/>
+              </a:rPr>
+              <a:t>      </a:t>
+            </a:r>
+            <a:r>
+              <a:rPr lang="en-US" b="1" dirty="0">
+                <a:latin typeface="Courier New" panose="02070309020205020404" pitchFamily="49" charset="0"/>
+                <a:cs typeface="Courier New" panose="02070309020205020404" pitchFamily="49" charset="0"/>
+              </a:rPr>
+              <a:t>procedure</a:t>
+            </a:r>
+            <a:r>
+              <a:rPr lang="en-US" dirty="0">
+                <a:latin typeface="Courier New" panose="02070309020205020404" pitchFamily="49" charset="0"/>
+                <a:cs typeface="Courier New" panose="02070309020205020404" pitchFamily="49" charset="0"/>
+              </a:rPr>
+              <a:t> </a:t>
+            </a:r>
+            <a:r>
+              <a:rPr lang="en-US" dirty="0" err="1">
+                <a:latin typeface="Courier New" panose="02070309020205020404" pitchFamily="49" charset="0"/>
+                <a:cs typeface="Courier New" panose="02070309020205020404" pitchFamily="49" charset="0"/>
+              </a:rPr>
+              <a:t>Update_Value</a:t>
+            </a:r>
+            <a:r>
+              <a:rPr lang="en-US" dirty="0">
+                <a:latin typeface="Courier New" panose="02070309020205020404" pitchFamily="49" charset="0"/>
+                <a:cs typeface="Courier New" panose="02070309020205020404" pitchFamily="49" charset="0"/>
+              </a:rPr>
+              <a:t>(Delta : </a:t>
+            </a:r>
+            <a:r>
+              <a:rPr lang="en-US" b="1" dirty="0">
+                <a:latin typeface="Courier New" panose="02070309020205020404" pitchFamily="49" charset="0"/>
+                <a:cs typeface="Courier New" panose="02070309020205020404" pitchFamily="49" charset="0"/>
+              </a:rPr>
+              <a:t>in</a:t>
+            </a:r>
+            <a:r>
+              <a:rPr lang="en-US" dirty="0">
+                <a:latin typeface="Courier New" panose="02070309020205020404" pitchFamily="49" charset="0"/>
+                <a:cs typeface="Courier New" panose="02070309020205020404" pitchFamily="49" charset="0"/>
+              </a:rPr>
+              <a:t> Integer);</a:t>
+            </a:r>
+          </a:p>
+          <a:p>
+            <a:r>
+              <a:rPr lang="en-US" dirty="0">
+                <a:latin typeface="Courier New" panose="02070309020205020404" pitchFamily="49" charset="0"/>
+                <a:cs typeface="Courier New" panose="02070309020205020404" pitchFamily="49" charset="0"/>
+              </a:rPr>
+              <a:t>      </a:t>
+            </a:r>
+            <a:r>
+              <a:rPr lang="en-US" b="1" dirty="0">
+                <a:latin typeface="Courier New" panose="02070309020205020404" pitchFamily="49" charset="0"/>
+                <a:cs typeface="Courier New" panose="02070309020205020404" pitchFamily="49" charset="0"/>
+              </a:rPr>
+              <a:t>entry</a:t>
+            </a:r>
+            <a:r>
+              <a:rPr lang="en-US" dirty="0">
+                <a:latin typeface="Courier New" panose="02070309020205020404" pitchFamily="49" charset="0"/>
+                <a:cs typeface="Courier New" panose="02070309020205020404" pitchFamily="49" charset="0"/>
+              </a:rPr>
+              <a:t> </a:t>
+            </a:r>
+            <a:r>
+              <a:rPr lang="en-US" dirty="0" err="1">
+                <a:latin typeface="Courier New" panose="02070309020205020404" pitchFamily="49" charset="0"/>
+                <a:cs typeface="Courier New" panose="02070309020205020404" pitchFamily="49" charset="0"/>
+              </a:rPr>
+              <a:t>Wait_For_Zero</a:t>
+            </a:r>
+            <a:r>
+              <a:rPr lang="en-US" dirty="0">
+                <a:latin typeface="Courier New" panose="02070309020205020404" pitchFamily="49" charset="0"/>
+                <a:cs typeface="Courier New" panose="02070309020205020404" pitchFamily="49" charset="0"/>
+              </a:rPr>
+              <a:t>(</a:t>
+            </a:r>
+            <a:r>
+              <a:rPr lang="en-US" dirty="0" err="1">
+                <a:latin typeface="Courier New" panose="02070309020205020404" pitchFamily="49" charset="0"/>
+                <a:cs typeface="Courier New" panose="02070309020205020404" pitchFamily="49" charset="0"/>
+              </a:rPr>
+              <a:t>New_Value</a:t>
+            </a:r>
+            <a:r>
+              <a:rPr lang="en-US" dirty="0">
+                <a:latin typeface="Courier New" panose="02070309020205020404" pitchFamily="49" charset="0"/>
+                <a:cs typeface="Courier New" panose="02070309020205020404" pitchFamily="49" charset="0"/>
+              </a:rPr>
+              <a:t> : </a:t>
+            </a:r>
+            <a:r>
+              <a:rPr lang="en-US" b="1" dirty="0">
+                <a:latin typeface="Courier New" panose="02070309020205020404" pitchFamily="49" charset="0"/>
+                <a:cs typeface="Courier New" panose="02070309020205020404" pitchFamily="49" charset="0"/>
+              </a:rPr>
+              <a:t>in</a:t>
+            </a:r>
+            <a:r>
+              <a:rPr lang="en-US" dirty="0">
+                <a:latin typeface="Courier New" panose="02070309020205020404" pitchFamily="49" charset="0"/>
+                <a:cs typeface="Courier New" panose="02070309020205020404" pitchFamily="49" charset="0"/>
+              </a:rPr>
+              <a:t> Integer);</a:t>
+            </a:r>
+          </a:p>
+          <a:p>
+            <a:endParaRPr lang="en-US" dirty="0">
+              <a:latin typeface="Courier New" panose="02070309020205020404" pitchFamily="49" charset="0"/>
+              <a:cs typeface="Courier New" panose="02070309020205020404" pitchFamily="49" charset="0"/>
+            </a:endParaRPr>
+          </a:p>
+          <a:p>
+            <a:r>
+              <a:rPr lang="en-US" dirty="0">
+                <a:latin typeface="Courier New" panose="02070309020205020404" pitchFamily="49" charset="0"/>
+                <a:cs typeface="Courier New" panose="02070309020205020404" pitchFamily="49" charset="0"/>
+              </a:rPr>
+              <a:t>   </a:t>
+            </a:r>
+            <a:r>
+              <a:rPr lang="en-US" b="1" dirty="0">
+                <a:latin typeface="Courier New" panose="02070309020205020404" pitchFamily="49" charset="0"/>
+                <a:cs typeface="Courier New" panose="02070309020205020404" pitchFamily="49" charset="0"/>
+              </a:rPr>
+              <a:t>private</a:t>
+            </a:r>
+          </a:p>
+          <a:p>
+            <a:r>
+              <a:rPr lang="en-US" dirty="0">
+                <a:latin typeface="Courier New" panose="02070309020205020404" pitchFamily="49" charset="0"/>
+                <a:cs typeface="Courier New" panose="02070309020205020404" pitchFamily="49" charset="0"/>
+              </a:rPr>
+              <a:t>      Value : Natural := 0;</a:t>
+            </a:r>
+          </a:p>
+          <a:p>
+            <a:r>
+              <a:rPr lang="en-US" dirty="0">
+                <a:latin typeface="Courier New" panose="02070309020205020404" pitchFamily="49" charset="0"/>
+                <a:cs typeface="Courier New" panose="02070309020205020404" pitchFamily="49" charset="0"/>
+              </a:rPr>
+              <a:t>   </a:t>
+            </a:r>
+            <a:r>
+              <a:rPr lang="en-US" b="1" dirty="0">
+                <a:latin typeface="Courier New" panose="02070309020205020404" pitchFamily="49" charset="0"/>
+                <a:cs typeface="Courier New" panose="02070309020205020404" pitchFamily="49" charset="0"/>
+              </a:rPr>
+              <a:t>end</a:t>
+            </a:r>
+            <a:r>
+              <a:rPr lang="en-US" dirty="0">
+                <a:latin typeface="Courier New" panose="02070309020205020404" pitchFamily="49" charset="0"/>
+                <a:cs typeface="Courier New" panose="02070309020205020404" pitchFamily="49" charset="0"/>
+              </a:rPr>
+              <a:t> </a:t>
+            </a:r>
+            <a:r>
+              <a:rPr lang="en-US" dirty="0" err="1">
+                <a:latin typeface="Courier New" panose="02070309020205020404" pitchFamily="49" charset="0"/>
+                <a:cs typeface="Courier New" panose="02070309020205020404" pitchFamily="49" charset="0"/>
+              </a:rPr>
+              <a:t>Integer_Holder</a:t>
+            </a:r>
+            <a:r>
+              <a:rPr lang="en-US" dirty="0">
+                <a:latin typeface="Courier New" panose="02070309020205020404" pitchFamily="49" charset="0"/>
+                <a:cs typeface="Courier New" panose="02070309020205020404" pitchFamily="49" charset="0"/>
+              </a:rPr>
+              <a:t>;</a:t>
+            </a:r>
+          </a:p>
+          <a:p>
+            <a:endParaRPr lang="en-US" dirty="0">
+              <a:latin typeface="Courier New" panose="02070309020205020404" pitchFamily="49" charset="0"/>
+              <a:cs typeface="Courier New" panose="02070309020205020404" pitchFamily="49" charset="0"/>
+            </a:endParaRPr>
+          </a:p>
+          <a:p>
+            <a:r>
+              <a:rPr lang="en-US" b="1" dirty="0">
+                <a:latin typeface="Courier New" panose="02070309020205020404" pitchFamily="49" charset="0"/>
+                <a:cs typeface="Courier New" panose="02070309020205020404" pitchFamily="49" charset="0"/>
+              </a:rPr>
+              <a:t>end</a:t>
+            </a:r>
+            <a:r>
+              <a:rPr lang="en-US" dirty="0">
+                <a:latin typeface="Courier New" panose="02070309020205020404" pitchFamily="49" charset="0"/>
+                <a:cs typeface="Courier New" panose="02070309020205020404" pitchFamily="49" charset="0"/>
+              </a:rPr>
+              <a:t> Example;</a:t>
             </a:r>
           </a:p>
         </p:txBody>
@@ -5795,7 +6644,7 @@
     </p:spTree>
     <p:extLst>
       <p:ext uri="{BB962C8B-B14F-4D97-AF65-F5344CB8AC3E}">
-        <p14:creationId xmlns:p14="http://schemas.microsoft.com/office/powerpoint/2010/main" val="3223411626"/>
+        <p14:creationId xmlns:p14="http://schemas.microsoft.com/office/powerpoint/2010/main" val="3555130256"/>
       </p:ext>
     </p:extLst>
   </p:cSld>
@@ -5827,7 +6676,7 @@
           <p:cNvPr id="2" name="Title 1">
             <a:extLst>
               <a:ext uri="{FF2B5EF4-FFF2-40B4-BE49-F238E27FC236}">
-                <a16:creationId xmlns:a16="http://schemas.microsoft.com/office/drawing/2014/main" id="{EB734359-A3AE-4CA5-AFB7-7F9CF217D0A8}"/>
+                <a16:creationId xmlns:a16="http://schemas.microsoft.com/office/drawing/2014/main" id="{B70BA843-3C0E-40C3-90E1-6BC5615B901E}"/>
               </a:ext>
             </a:extLst>
           </p:cNvPr>
@@ -5845,107 +6694,358 @@
           <a:p>
             <a:r>
               <a:rPr lang="en-US" dirty="0"/>
-              <a:t>Ravenscar</a:t>
-            </a:r>
-          </a:p>
-        </p:txBody>
-      </p:sp>
-      <p:sp>
-        <p:nvSpPr>
-          <p:cNvPr id="3" name="Content Placeholder 2">
-            <a:extLst>
-              <a:ext uri="{FF2B5EF4-FFF2-40B4-BE49-F238E27FC236}">
-                <a16:creationId xmlns:a16="http://schemas.microsoft.com/office/drawing/2014/main" id="{98EFF623-7294-46A2-B346-31020D1CBAF4}"/>
-              </a:ext>
-            </a:extLst>
-          </p:cNvPr>
-          <p:cNvSpPr>
-            <a:spLocks noGrp="1"/>
-          </p:cNvSpPr>
-          <p:nvPr>
-            <p:ph idx="1"/>
-          </p:nvPr>
-        </p:nvSpPr>
-        <p:spPr/>
-        <p:txBody>
-          <a:bodyPr>
-            <a:normAutofit lnSpcReduction="10000"/>
+              <a:t>Ada Protected Objects (Body #1)</a:t>
+            </a:r>
+          </a:p>
+        </p:txBody>
+      </p:sp>
+      <p:sp>
+        <p:nvSpPr>
+          <p:cNvPr id="4" name="TextBox 3">
+            <a:extLst>
+              <a:ext uri="{FF2B5EF4-FFF2-40B4-BE49-F238E27FC236}">
+                <a16:creationId xmlns:a16="http://schemas.microsoft.com/office/drawing/2014/main" id="{48C2F5CA-4F95-4434-AE88-E3A6E9434820}"/>
+              </a:ext>
+            </a:extLst>
+          </p:cNvPr>
+          <p:cNvSpPr txBox="1"/>
+          <p:nvPr/>
+        </p:nvSpPr>
+        <p:spPr>
+          <a:xfrm>
+            <a:off x="1233996" y="1690688"/>
+            <a:ext cx="5974713" cy="3693319"/>
+          </a:xfrm>
+          <a:prstGeom prst="rect">
+            <a:avLst/>
+          </a:prstGeom>
+          <a:noFill/>
+        </p:spPr>
+        <p:txBody>
+          <a:bodyPr wrap="none" rtlCol="0">
+            <a:spAutoFit/>
           </a:bodyPr>
           <a:lstStyle/>
           <a:p>
             <a:r>
-              <a:rPr lang="en-US" dirty="0"/>
-              <a:t>Ada standard allows </a:t>
-            </a:r>
-            <a:r>
-              <a:rPr lang="en-US" i="1" dirty="0"/>
-              <a:t>profiles</a:t>
-            </a:r>
-            <a:r>
-              <a:rPr lang="en-US" dirty="0"/>
-              <a:t> that limit the language in various ways</a:t>
-            </a:r>
-          </a:p>
-          <a:p>
-            <a:r>
-              <a:rPr lang="en-US" dirty="0"/>
-              <a:t>Ravenscar is a profile that limits the tasking features of Ada</a:t>
-            </a:r>
-          </a:p>
-          <a:p>
-            <a:pPr lvl="1"/>
-            <a:r>
-              <a:rPr lang="en-US" dirty="0"/>
-              <a:t>… to make programs more analyzable.</a:t>
-            </a:r>
-          </a:p>
-          <a:p>
-            <a:pPr lvl="1"/>
-            <a:r>
-              <a:rPr lang="en-US" dirty="0"/>
-              <a:t>… to simplify the runtime system requirements.</a:t>
-            </a:r>
-          </a:p>
-          <a:p>
-            <a:r>
-              <a:rPr lang="en-US" dirty="0"/>
-              <a:t>Under Ravenscar:</a:t>
-            </a:r>
-          </a:p>
-          <a:p>
-            <a:pPr lvl="1"/>
-            <a:r>
-              <a:rPr lang="en-US" dirty="0"/>
-              <a:t>POs can have only a single entry (full Ada allows multiple entries).</a:t>
-            </a:r>
-          </a:p>
-          <a:p>
-            <a:pPr lvl="1"/>
-            <a:r>
-              <a:rPr lang="en-US" dirty="0"/>
-              <a:t>Barrier conditions must be “simple” (full Ada allows complex expressions).</a:t>
-            </a:r>
-          </a:p>
-          <a:p>
-            <a:pPr lvl="1"/>
-            <a:r>
-              <a:rPr lang="en-US" dirty="0"/>
-              <a:t>Only one task can be queued waiting on an entry (full Ada allows multiple tasks to be queued).</a:t>
-            </a:r>
-          </a:p>
-          <a:p>
-            <a:pPr lvl="1"/>
-            <a:r>
-              <a:rPr lang="en-US" dirty="0"/>
-              <a:t>All tasks must be at </a:t>
-            </a:r>
-            <a:r>
-              <a:rPr lang="en-US" i="1" dirty="0"/>
-              <a:t>library level </a:t>
-            </a:r>
-            <a:r>
-              <a:rPr lang="en-US" dirty="0"/>
-              <a:t>and be infinite loops (full Ada allows nested tasks, tasks inside subprograms, and task termination).</a:t>
+              <a:rPr lang="en-US" b="1" dirty="0">
+                <a:latin typeface="Courier New" panose="02070309020205020404" pitchFamily="49" charset="0"/>
+                <a:cs typeface="Courier New" panose="02070309020205020404" pitchFamily="49" charset="0"/>
+              </a:rPr>
+              <a:t>package</a:t>
+            </a:r>
+            <a:r>
+              <a:rPr lang="en-US" dirty="0">
+                <a:latin typeface="Courier New" panose="02070309020205020404" pitchFamily="49" charset="0"/>
+                <a:cs typeface="Courier New" panose="02070309020205020404" pitchFamily="49" charset="0"/>
+              </a:rPr>
+              <a:t> </a:t>
+            </a:r>
+            <a:r>
+              <a:rPr lang="en-US" b="1" dirty="0">
+                <a:latin typeface="Courier New" panose="02070309020205020404" pitchFamily="49" charset="0"/>
+                <a:cs typeface="Courier New" panose="02070309020205020404" pitchFamily="49" charset="0"/>
+              </a:rPr>
+              <a:t>body</a:t>
+            </a:r>
+            <a:r>
+              <a:rPr lang="en-US" dirty="0">
+                <a:latin typeface="Courier New" panose="02070309020205020404" pitchFamily="49" charset="0"/>
+                <a:cs typeface="Courier New" panose="02070309020205020404" pitchFamily="49" charset="0"/>
+              </a:rPr>
+              <a:t> Example </a:t>
+            </a:r>
+            <a:r>
+              <a:rPr lang="en-US" b="1" dirty="0">
+                <a:latin typeface="Courier New" panose="02070309020205020404" pitchFamily="49" charset="0"/>
+                <a:cs typeface="Courier New" panose="02070309020205020404" pitchFamily="49" charset="0"/>
+              </a:rPr>
+              <a:t>is</a:t>
+            </a:r>
+          </a:p>
+          <a:p>
+            <a:endParaRPr lang="en-US" dirty="0">
+              <a:latin typeface="Courier New" panose="02070309020205020404" pitchFamily="49" charset="0"/>
+              <a:cs typeface="Courier New" panose="02070309020205020404" pitchFamily="49" charset="0"/>
+            </a:endParaRPr>
+          </a:p>
+          <a:p>
+            <a:r>
+              <a:rPr lang="en-US" dirty="0">
+                <a:latin typeface="Courier New" panose="02070309020205020404" pitchFamily="49" charset="0"/>
+                <a:cs typeface="Courier New" panose="02070309020205020404" pitchFamily="49" charset="0"/>
+              </a:rPr>
+              <a:t>   </a:t>
+            </a:r>
+            <a:r>
+              <a:rPr lang="en-US" b="1" dirty="0">
+                <a:latin typeface="Courier New" panose="02070309020205020404" pitchFamily="49" charset="0"/>
+                <a:cs typeface="Courier New" panose="02070309020205020404" pitchFamily="49" charset="0"/>
+              </a:rPr>
+              <a:t>protected</a:t>
+            </a:r>
+            <a:r>
+              <a:rPr lang="en-US" dirty="0">
+                <a:latin typeface="Courier New" panose="02070309020205020404" pitchFamily="49" charset="0"/>
+                <a:cs typeface="Courier New" panose="02070309020205020404" pitchFamily="49" charset="0"/>
+              </a:rPr>
+              <a:t> </a:t>
+            </a:r>
+            <a:r>
+              <a:rPr lang="en-US" b="1" dirty="0">
+                <a:latin typeface="Courier New" panose="02070309020205020404" pitchFamily="49" charset="0"/>
+                <a:cs typeface="Courier New" panose="02070309020205020404" pitchFamily="49" charset="0"/>
+              </a:rPr>
+              <a:t>body</a:t>
+            </a:r>
+            <a:r>
+              <a:rPr lang="en-US" dirty="0">
+                <a:latin typeface="Courier New" panose="02070309020205020404" pitchFamily="49" charset="0"/>
+                <a:cs typeface="Courier New" panose="02070309020205020404" pitchFamily="49" charset="0"/>
+              </a:rPr>
+              <a:t> </a:t>
+            </a:r>
+            <a:r>
+              <a:rPr lang="en-US" dirty="0" err="1">
+                <a:latin typeface="Courier New" panose="02070309020205020404" pitchFamily="49" charset="0"/>
+                <a:cs typeface="Courier New" panose="02070309020205020404" pitchFamily="49" charset="0"/>
+              </a:rPr>
+              <a:t>Integer_Holder</a:t>
+            </a:r>
+            <a:r>
+              <a:rPr lang="en-US" dirty="0">
+                <a:latin typeface="Courier New" panose="02070309020205020404" pitchFamily="49" charset="0"/>
+                <a:cs typeface="Courier New" panose="02070309020205020404" pitchFamily="49" charset="0"/>
+              </a:rPr>
+              <a:t> </a:t>
+            </a:r>
+            <a:r>
+              <a:rPr lang="en-US" b="1" dirty="0">
+                <a:latin typeface="Courier New" panose="02070309020205020404" pitchFamily="49" charset="0"/>
+                <a:cs typeface="Courier New" panose="02070309020205020404" pitchFamily="49" charset="0"/>
+              </a:rPr>
+              <a:t>is</a:t>
+            </a:r>
+          </a:p>
+          <a:p>
+            <a:endParaRPr lang="en-US" b="1" dirty="0">
+              <a:latin typeface="Courier New" panose="02070309020205020404" pitchFamily="49" charset="0"/>
+              <a:cs typeface="Courier New" panose="02070309020205020404" pitchFamily="49" charset="0"/>
+            </a:endParaRPr>
+          </a:p>
+          <a:p>
+            <a:r>
+              <a:rPr lang="en-US" dirty="0">
+                <a:latin typeface="Courier New" panose="02070309020205020404" pitchFamily="49" charset="0"/>
+                <a:cs typeface="Courier New" panose="02070309020205020404" pitchFamily="49" charset="0"/>
+              </a:rPr>
+              <a:t>      </a:t>
+            </a:r>
+            <a:r>
+              <a:rPr lang="en-US" b="1" dirty="0">
+                <a:latin typeface="Courier New" panose="02070309020205020404" pitchFamily="49" charset="0"/>
+                <a:cs typeface="Courier New" panose="02070309020205020404" pitchFamily="49" charset="0"/>
+              </a:rPr>
+              <a:t>function</a:t>
+            </a:r>
+            <a:r>
+              <a:rPr lang="en-US" dirty="0">
+                <a:latin typeface="Courier New" panose="02070309020205020404" pitchFamily="49" charset="0"/>
+                <a:cs typeface="Courier New" panose="02070309020205020404" pitchFamily="49" charset="0"/>
+              </a:rPr>
+              <a:t> </a:t>
+            </a:r>
+            <a:r>
+              <a:rPr lang="en-US" dirty="0" err="1">
+                <a:latin typeface="Courier New" panose="02070309020205020404" pitchFamily="49" charset="0"/>
+                <a:cs typeface="Courier New" panose="02070309020205020404" pitchFamily="49" charset="0"/>
+              </a:rPr>
+              <a:t>Get_Value</a:t>
+            </a:r>
+            <a:r>
+              <a:rPr lang="en-US" dirty="0">
+                <a:latin typeface="Courier New" panose="02070309020205020404" pitchFamily="49" charset="0"/>
+                <a:cs typeface="Courier New" panose="02070309020205020404" pitchFamily="49" charset="0"/>
+              </a:rPr>
+              <a:t> </a:t>
+            </a:r>
+            <a:r>
+              <a:rPr lang="en-US" b="1" dirty="0">
+                <a:latin typeface="Courier New" panose="02070309020205020404" pitchFamily="49" charset="0"/>
+                <a:cs typeface="Courier New" panose="02070309020205020404" pitchFamily="49" charset="0"/>
+              </a:rPr>
+              <a:t>return</a:t>
+            </a:r>
+            <a:r>
+              <a:rPr lang="en-US" dirty="0">
+                <a:latin typeface="Courier New" panose="02070309020205020404" pitchFamily="49" charset="0"/>
+                <a:cs typeface="Courier New" panose="02070309020205020404" pitchFamily="49" charset="0"/>
+              </a:rPr>
+              <a:t> Integer </a:t>
+            </a:r>
+            <a:r>
+              <a:rPr lang="en-US" b="1" dirty="0">
+                <a:latin typeface="Courier New" panose="02070309020205020404" pitchFamily="49" charset="0"/>
+                <a:cs typeface="Courier New" panose="02070309020205020404" pitchFamily="49" charset="0"/>
+              </a:rPr>
+              <a:t>is</a:t>
+            </a:r>
+          </a:p>
+          <a:p>
+            <a:r>
+              <a:rPr lang="en-US" dirty="0">
+                <a:latin typeface="Courier New" panose="02070309020205020404" pitchFamily="49" charset="0"/>
+                <a:cs typeface="Courier New" panose="02070309020205020404" pitchFamily="49" charset="0"/>
+              </a:rPr>
+              <a:t>      </a:t>
+            </a:r>
+            <a:r>
+              <a:rPr lang="en-US" b="1" dirty="0">
+                <a:latin typeface="Courier New" panose="02070309020205020404" pitchFamily="49" charset="0"/>
+                <a:cs typeface="Courier New" panose="02070309020205020404" pitchFamily="49" charset="0"/>
+              </a:rPr>
+              <a:t>begin</a:t>
+            </a:r>
+          </a:p>
+          <a:p>
+            <a:r>
+              <a:rPr lang="en-US" dirty="0">
+                <a:latin typeface="Courier New" panose="02070309020205020404" pitchFamily="49" charset="0"/>
+                <a:cs typeface="Courier New" panose="02070309020205020404" pitchFamily="49" charset="0"/>
+              </a:rPr>
+              <a:t>         </a:t>
+            </a:r>
+            <a:r>
+              <a:rPr lang="en-US" b="1" dirty="0">
+                <a:latin typeface="Courier New" panose="02070309020205020404" pitchFamily="49" charset="0"/>
+                <a:cs typeface="Courier New" panose="02070309020205020404" pitchFamily="49" charset="0"/>
+              </a:rPr>
+              <a:t>return</a:t>
+            </a:r>
+            <a:r>
+              <a:rPr lang="en-US" dirty="0">
+                <a:latin typeface="Courier New" panose="02070309020205020404" pitchFamily="49" charset="0"/>
+                <a:cs typeface="Courier New" panose="02070309020205020404" pitchFamily="49" charset="0"/>
+              </a:rPr>
+              <a:t> Value;</a:t>
+            </a:r>
+          </a:p>
+          <a:p>
+            <a:r>
+              <a:rPr lang="en-US" dirty="0">
+                <a:latin typeface="Courier New" panose="02070309020205020404" pitchFamily="49" charset="0"/>
+                <a:cs typeface="Courier New" panose="02070309020205020404" pitchFamily="49" charset="0"/>
+              </a:rPr>
+              <a:t>      </a:t>
+            </a:r>
+            <a:r>
+              <a:rPr lang="en-US" b="1" dirty="0">
+                <a:latin typeface="Courier New" panose="02070309020205020404" pitchFamily="49" charset="0"/>
+                <a:cs typeface="Courier New" panose="02070309020205020404" pitchFamily="49" charset="0"/>
+              </a:rPr>
+              <a:t>end</a:t>
+            </a:r>
+            <a:r>
+              <a:rPr lang="en-US" dirty="0">
+                <a:latin typeface="Courier New" panose="02070309020205020404" pitchFamily="49" charset="0"/>
+                <a:cs typeface="Courier New" panose="02070309020205020404" pitchFamily="49" charset="0"/>
+              </a:rPr>
+              <a:t> </a:t>
+            </a:r>
+            <a:r>
+              <a:rPr lang="en-US" dirty="0" err="1">
+                <a:latin typeface="Courier New" panose="02070309020205020404" pitchFamily="49" charset="0"/>
+                <a:cs typeface="Courier New" panose="02070309020205020404" pitchFamily="49" charset="0"/>
+              </a:rPr>
+              <a:t>Get_Value</a:t>
+            </a:r>
+            <a:r>
+              <a:rPr lang="en-US" dirty="0">
+                <a:latin typeface="Courier New" panose="02070309020205020404" pitchFamily="49" charset="0"/>
+                <a:cs typeface="Courier New" panose="02070309020205020404" pitchFamily="49" charset="0"/>
+              </a:rPr>
+              <a:t>;</a:t>
+            </a:r>
+          </a:p>
+          <a:p>
+            <a:endParaRPr lang="en-US" dirty="0">
+              <a:latin typeface="Courier New" panose="02070309020205020404" pitchFamily="49" charset="0"/>
+              <a:cs typeface="Courier New" panose="02070309020205020404" pitchFamily="49" charset="0"/>
+            </a:endParaRPr>
+          </a:p>
+          <a:p>
+            <a:r>
+              <a:rPr lang="en-US" dirty="0">
+                <a:latin typeface="Courier New" panose="02070309020205020404" pitchFamily="49" charset="0"/>
+                <a:cs typeface="Courier New" panose="02070309020205020404" pitchFamily="49" charset="0"/>
+              </a:rPr>
+              <a:t>      -- </a:t>
+            </a:r>
+            <a:r>
+              <a:rPr lang="en-US" dirty="0" err="1">
+                <a:latin typeface="Courier New" panose="02070309020205020404" pitchFamily="49" charset="0"/>
+                <a:cs typeface="Courier New" panose="02070309020205020404" pitchFamily="49" charset="0"/>
+              </a:rPr>
+              <a:t>etc</a:t>
+            </a:r>
+            <a:r>
+              <a:rPr lang="en-US" dirty="0">
+                <a:latin typeface="Courier New" panose="02070309020205020404" pitchFamily="49" charset="0"/>
+                <a:cs typeface="Courier New" panose="02070309020205020404" pitchFamily="49" charset="0"/>
+              </a:rPr>
+              <a:t>…</a:t>
+            </a:r>
+          </a:p>
+          <a:p>
+            <a:r>
+              <a:rPr lang="en-US" b="1" dirty="0">
+                <a:latin typeface="Courier New" panose="02070309020205020404" pitchFamily="49" charset="0"/>
+                <a:cs typeface="Courier New" panose="02070309020205020404" pitchFamily="49" charset="0"/>
+              </a:rPr>
+              <a:t>   end</a:t>
+            </a:r>
+            <a:r>
+              <a:rPr lang="en-US" dirty="0">
+                <a:latin typeface="Courier New" panose="02070309020205020404" pitchFamily="49" charset="0"/>
+                <a:cs typeface="Courier New" panose="02070309020205020404" pitchFamily="49" charset="0"/>
+              </a:rPr>
+              <a:t> </a:t>
+            </a:r>
+            <a:r>
+              <a:rPr lang="en-US" dirty="0" err="1">
+                <a:latin typeface="Courier New" panose="02070309020205020404" pitchFamily="49" charset="0"/>
+                <a:cs typeface="Courier New" panose="02070309020205020404" pitchFamily="49" charset="0"/>
+              </a:rPr>
+              <a:t>Integer_Holder</a:t>
+            </a:r>
+            <a:r>
+              <a:rPr lang="en-US" dirty="0">
+                <a:latin typeface="Courier New" panose="02070309020205020404" pitchFamily="49" charset="0"/>
+                <a:cs typeface="Courier New" panose="02070309020205020404" pitchFamily="49" charset="0"/>
+              </a:rPr>
+              <a:t>;</a:t>
+            </a:r>
+          </a:p>
+          <a:p>
+            <a:endParaRPr lang="en-US" dirty="0">
+              <a:latin typeface="Courier New" panose="02070309020205020404" pitchFamily="49" charset="0"/>
+              <a:cs typeface="Courier New" panose="02070309020205020404" pitchFamily="49" charset="0"/>
+            </a:endParaRPr>
+          </a:p>
+          <a:p>
+            <a:r>
+              <a:rPr lang="en-US" b="1" dirty="0">
+                <a:latin typeface="Courier New" panose="02070309020205020404" pitchFamily="49" charset="0"/>
+                <a:cs typeface="Courier New" panose="02070309020205020404" pitchFamily="49" charset="0"/>
+              </a:rPr>
+              <a:t>end</a:t>
+            </a:r>
+            <a:r>
+              <a:rPr lang="en-US" dirty="0">
+                <a:latin typeface="Courier New" panose="02070309020205020404" pitchFamily="49" charset="0"/>
+                <a:cs typeface="Courier New" panose="02070309020205020404" pitchFamily="49" charset="0"/>
+              </a:rPr>
+              <a:t> Example;</a:t>
             </a:r>
           </a:p>
         </p:txBody>
@@ -5953,7 +7053,7 @@
     </p:spTree>
     <p:extLst>
       <p:ext uri="{BB962C8B-B14F-4D97-AF65-F5344CB8AC3E}">
-        <p14:creationId xmlns:p14="http://schemas.microsoft.com/office/powerpoint/2010/main" val="224088908"/>
+        <p14:creationId xmlns:p14="http://schemas.microsoft.com/office/powerpoint/2010/main" val="295241387"/>
       </p:ext>
     </p:extLst>
   </p:cSld>
@@ -5985,7 +7085,7 @@
           <p:cNvPr id="2" name="Title 1">
             <a:extLst>
               <a:ext uri="{FF2B5EF4-FFF2-40B4-BE49-F238E27FC236}">
-                <a16:creationId xmlns:a16="http://schemas.microsoft.com/office/drawing/2014/main" id="{B914E860-C560-4EB7-AD8D-048FAA144FCD}"/>
+                <a16:creationId xmlns:a16="http://schemas.microsoft.com/office/drawing/2014/main" id="{B70BA843-3C0E-40C3-90E1-6BC5615B901E}"/>
               </a:ext>
             </a:extLst>
           </p:cNvPr>
@@ -6002,95 +7102,460 @@
           <a:lstStyle/>
           <a:p>
             <a:r>
-              <a:rPr lang="en-US" dirty="0" err="1"/>
-              <a:t>Jorvik</a:t>
-            </a:r>
-            <a:endParaRPr lang="en-US" dirty="0"/>
-          </a:p>
-        </p:txBody>
-      </p:sp>
-      <p:sp>
-        <p:nvSpPr>
-          <p:cNvPr id="3" name="Content Placeholder 2">
-            <a:extLst>
-              <a:ext uri="{FF2B5EF4-FFF2-40B4-BE49-F238E27FC236}">
-                <a16:creationId xmlns:a16="http://schemas.microsoft.com/office/drawing/2014/main" id="{C1EC5B3F-C721-4F12-B32F-6A000BADC240}"/>
-              </a:ext>
-            </a:extLst>
-          </p:cNvPr>
-          <p:cNvSpPr>
-            <a:spLocks noGrp="1"/>
-          </p:cNvSpPr>
-          <p:nvPr>
-            <p:ph idx="1"/>
-          </p:nvPr>
-        </p:nvSpPr>
-        <p:spPr/>
-        <p:txBody>
-          <a:bodyPr/>
-          <a:lstStyle/>
-          <a:p>
-            <a:r>
-              <a:rPr lang="en-US" dirty="0"/>
-              <a:t>Ada 2022 will also support the </a:t>
-            </a:r>
-            <a:r>
-              <a:rPr lang="en-US" dirty="0" err="1"/>
-              <a:t>Jorvik</a:t>
-            </a:r>
-            <a:r>
-              <a:rPr lang="en-US" dirty="0"/>
-              <a:t> profile. It is like Ravenscar, but less limited</a:t>
-            </a:r>
-          </a:p>
-          <a:p>
-            <a:pPr lvl="1"/>
-            <a:r>
-              <a:rPr lang="en-US" dirty="0"/>
-              <a:t>POs can have multiple entries.</a:t>
-            </a:r>
-          </a:p>
-          <a:p>
-            <a:pPr lvl="1"/>
-            <a:r>
-              <a:rPr lang="en-US" dirty="0"/>
-              <a:t>Barrier conditions can be less “simple.”</a:t>
-            </a:r>
-          </a:p>
-          <a:p>
-            <a:r>
-              <a:rPr lang="en-US" dirty="0"/>
-              <a:t>CubedOS uses Ravenscar, but does not use </a:t>
-            </a:r>
-            <a:r>
-              <a:rPr lang="en-US" dirty="0" err="1"/>
-              <a:t>Jorvik</a:t>
-            </a:r>
-            <a:r>
-              <a:rPr lang="en-US" dirty="0"/>
-              <a:t> at this time</a:t>
-            </a:r>
-          </a:p>
-          <a:p>
-            <a:pPr lvl="1"/>
-            <a:r>
-              <a:rPr lang="en-US" dirty="0"/>
-              <a:t>… but may in the future if it seems necessary or useful.</a:t>
-            </a:r>
-          </a:p>
-          <a:p>
-            <a:pPr lvl="1"/>
-            <a:r>
-              <a:rPr lang="en-US" dirty="0"/>
-              <a:t>The “simple” barrier conditions do cause some difficulties for CubedOS, and </a:t>
-            </a:r>
-            <a:r>
-              <a:rPr lang="en-US" dirty="0" err="1"/>
-              <a:t>Jorvik</a:t>
-            </a:r>
-            <a:r>
-              <a:rPr lang="en-US" dirty="0"/>
-              <a:t> eliminates that issue.</a:t>
+              <a:rPr lang="en-US" dirty="0"/>
+              <a:t>Ada Protected Objects (Body #2)</a:t>
+            </a:r>
+          </a:p>
+        </p:txBody>
+      </p:sp>
+      <p:sp>
+        <p:nvSpPr>
+          <p:cNvPr id="4" name="TextBox 3">
+            <a:extLst>
+              <a:ext uri="{FF2B5EF4-FFF2-40B4-BE49-F238E27FC236}">
+                <a16:creationId xmlns:a16="http://schemas.microsoft.com/office/drawing/2014/main" id="{48C2F5CA-4F95-4434-AE88-E3A6E9434820}"/>
+              </a:ext>
+            </a:extLst>
+          </p:cNvPr>
+          <p:cNvSpPr txBox="1"/>
+          <p:nvPr/>
+        </p:nvSpPr>
+        <p:spPr>
+          <a:xfrm>
+            <a:off x="1233996" y="1690688"/>
+            <a:ext cx="7215437" cy="5078313"/>
+          </a:xfrm>
+          <a:prstGeom prst="rect">
+            <a:avLst/>
+          </a:prstGeom>
+          <a:noFill/>
+        </p:spPr>
+        <p:txBody>
+          <a:bodyPr wrap="none" rtlCol="0">
+            <a:spAutoFit/>
+          </a:bodyPr>
+          <a:lstStyle/>
+          <a:p>
+            <a:r>
+              <a:rPr lang="en-US" b="1" dirty="0">
+                <a:latin typeface="Courier New" panose="02070309020205020404" pitchFamily="49" charset="0"/>
+                <a:cs typeface="Courier New" panose="02070309020205020404" pitchFamily="49" charset="0"/>
+              </a:rPr>
+              <a:t>package</a:t>
+            </a:r>
+            <a:r>
+              <a:rPr lang="en-US" dirty="0">
+                <a:latin typeface="Courier New" panose="02070309020205020404" pitchFamily="49" charset="0"/>
+                <a:cs typeface="Courier New" panose="02070309020205020404" pitchFamily="49" charset="0"/>
+              </a:rPr>
+              <a:t> </a:t>
+            </a:r>
+            <a:r>
+              <a:rPr lang="en-US" b="1" dirty="0">
+                <a:latin typeface="Courier New" panose="02070309020205020404" pitchFamily="49" charset="0"/>
+                <a:cs typeface="Courier New" panose="02070309020205020404" pitchFamily="49" charset="0"/>
+              </a:rPr>
+              <a:t>body</a:t>
+            </a:r>
+            <a:r>
+              <a:rPr lang="en-US" dirty="0">
+                <a:latin typeface="Courier New" panose="02070309020205020404" pitchFamily="49" charset="0"/>
+                <a:cs typeface="Courier New" panose="02070309020205020404" pitchFamily="49" charset="0"/>
+              </a:rPr>
+              <a:t> Example </a:t>
+            </a:r>
+            <a:r>
+              <a:rPr lang="en-US" b="1" dirty="0">
+                <a:latin typeface="Courier New" panose="02070309020205020404" pitchFamily="49" charset="0"/>
+                <a:cs typeface="Courier New" panose="02070309020205020404" pitchFamily="49" charset="0"/>
+              </a:rPr>
+              <a:t>is</a:t>
+            </a:r>
+          </a:p>
+          <a:p>
+            <a:endParaRPr lang="en-US" dirty="0">
+              <a:latin typeface="Courier New" panose="02070309020205020404" pitchFamily="49" charset="0"/>
+              <a:cs typeface="Courier New" panose="02070309020205020404" pitchFamily="49" charset="0"/>
+            </a:endParaRPr>
+          </a:p>
+          <a:p>
+            <a:r>
+              <a:rPr lang="en-US" dirty="0">
+                <a:latin typeface="Courier New" panose="02070309020205020404" pitchFamily="49" charset="0"/>
+                <a:cs typeface="Courier New" panose="02070309020205020404" pitchFamily="49" charset="0"/>
+              </a:rPr>
+              <a:t>   </a:t>
+            </a:r>
+            <a:r>
+              <a:rPr lang="en-US" b="1" dirty="0">
+                <a:latin typeface="Courier New" panose="02070309020205020404" pitchFamily="49" charset="0"/>
+                <a:cs typeface="Courier New" panose="02070309020205020404" pitchFamily="49" charset="0"/>
+              </a:rPr>
+              <a:t>protected</a:t>
+            </a:r>
+            <a:r>
+              <a:rPr lang="en-US" dirty="0">
+                <a:latin typeface="Courier New" panose="02070309020205020404" pitchFamily="49" charset="0"/>
+                <a:cs typeface="Courier New" panose="02070309020205020404" pitchFamily="49" charset="0"/>
+              </a:rPr>
+              <a:t> </a:t>
+            </a:r>
+            <a:r>
+              <a:rPr lang="en-US" b="1" dirty="0">
+                <a:latin typeface="Courier New" panose="02070309020205020404" pitchFamily="49" charset="0"/>
+                <a:cs typeface="Courier New" panose="02070309020205020404" pitchFamily="49" charset="0"/>
+              </a:rPr>
+              <a:t>body</a:t>
+            </a:r>
+            <a:r>
+              <a:rPr lang="en-US" dirty="0">
+                <a:latin typeface="Courier New" panose="02070309020205020404" pitchFamily="49" charset="0"/>
+                <a:cs typeface="Courier New" panose="02070309020205020404" pitchFamily="49" charset="0"/>
+              </a:rPr>
+              <a:t> </a:t>
+            </a:r>
+            <a:r>
+              <a:rPr lang="en-US" dirty="0" err="1">
+                <a:latin typeface="Courier New" panose="02070309020205020404" pitchFamily="49" charset="0"/>
+                <a:cs typeface="Courier New" panose="02070309020205020404" pitchFamily="49" charset="0"/>
+              </a:rPr>
+              <a:t>Integer_Holder</a:t>
+            </a:r>
+            <a:r>
+              <a:rPr lang="en-US" dirty="0">
+                <a:latin typeface="Courier New" panose="02070309020205020404" pitchFamily="49" charset="0"/>
+                <a:cs typeface="Courier New" panose="02070309020205020404" pitchFamily="49" charset="0"/>
+              </a:rPr>
+              <a:t> </a:t>
+            </a:r>
+            <a:r>
+              <a:rPr lang="en-US" b="1" dirty="0">
+                <a:latin typeface="Courier New" panose="02070309020205020404" pitchFamily="49" charset="0"/>
+                <a:cs typeface="Courier New" panose="02070309020205020404" pitchFamily="49" charset="0"/>
+              </a:rPr>
+              <a:t>is</a:t>
+            </a:r>
+          </a:p>
+          <a:p>
+            <a:r>
+              <a:rPr lang="en-US" b="1" dirty="0">
+                <a:latin typeface="Courier New" panose="02070309020205020404" pitchFamily="49" charset="0"/>
+                <a:cs typeface="Courier New" panose="02070309020205020404" pitchFamily="49" charset="0"/>
+              </a:rPr>
+              <a:t>      </a:t>
+            </a:r>
+            <a:r>
+              <a:rPr lang="en-US" dirty="0">
+                <a:latin typeface="Courier New" panose="02070309020205020404" pitchFamily="49" charset="0"/>
+                <a:cs typeface="Courier New" panose="02070309020205020404" pitchFamily="49" charset="0"/>
+              </a:rPr>
+              <a:t>-- </a:t>
+            </a:r>
+            <a:r>
+              <a:rPr lang="en-US" dirty="0" err="1">
+                <a:latin typeface="Courier New" panose="02070309020205020404" pitchFamily="49" charset="0"/>
+                <a:cs typeface="Courier New" panose="02070309020205020404" pitchFamily="49" charset="0"/>
+              </a:rPr>
+              <a:t>etc</a:t>
+            </a:r>
+            <a:r>
+              <a:rPr lang="en-US" dirty="0">
+                <a:latin typeface="Courier New" panose="02070309020205020404" pitchFamily="49" charset="0"/>
+                <a:cs typeface="Courier New" panose="02070309020205020404" pitchFamily="49" charset="0"/>
+              </a:rPr>
+              <a:t>…</a:t>
+            </a:r>
+          </a:p>
+          <a:p>
+            <a:endParaRPr lang="en-US" b="1" dirty="0">
+              <a:latin typeface="Courier New" panose="02070309020205020404" pitchFamily="49" charset="0"/>
+              <a:cs typeface="Courier New" panose="02070309020205020404" pitchFamily="49" charset="0"/>
+            </a:endParaRPr>
+          </a:p>
+          <a:p>
+            <a:r>
+              <a:rPr lang="en-US" b="1" dirty="0">
+                <a:latin typeface="Courier New" panose="02070309020205020404" pitchFamily="49" charset="0"/>
+                <a:cs typeface="Courier New" panose="02070309020205020404" pitchFamily="49" charset="0"/>
+              </a:rPr>
+              <a:t>      procedure</a:t>
+            </a:r>
+            <a:r>
+              <a:rPr lang="en-US" dirty="0">
+                <a:latin typeface="Courier New" panose="02070309020205020404" pitchFamily="49" charset="0"/>
+                <a:cs typeface="Courier New" panose="02070309020205020404" pitchFamily="49" charset="0"/>
+              </a:rPr>
+              <a:t> </a:t>
+            </a:r>
+            <a:r>
+              <a:rPr lang="en-US" dirty="0" err="1">
+                <a:latin typeface="Courier New" panose="02070309020205020404" pitchFamily="49" charset="0"/>
+                <a:cs typeface="Courier New" panose="02070309020205020404" pitchFamily="49" charset="0"/>
+              </a:rPr>
+              <a:t>Update_Value</a:t>
+            </a:r>
+            <a:r>
+              <a:rPr lang="en-US" dirty="0">
+                <a:latin typeface="Courier New" panose="02070309020205020404" pitchFamily="49" charset="0"/>
+                <a:cs typeface="Courier New" panose="02070309020205020404" pitchFamily="49" charset="0"/>
+              </a:rPr>
+              <a:t>(Delta : </a:t>
+            </a:r>
+            <a:r>
+              <a:rPr lang="en-US" b="1" dirty="0">
+                <a:latin typeface="Courier New" panose="02070309020205020404" pitchFamily="49" charset="0"/>
+                <a:cs typeface="Courier New" panose="02070309020205020404" pitchFamily="49" charset="0"/>
+              </a:rPr>
+              <a:t>in</a:t>
+            </a:r>
+            <a:r>
+              <a:rPr lang="en-US" dirty="0">
+                <a:latin typeface="Courier New" panose="02070309020205020404" pitchFamily="49" charset="0"/>
+                <a:cs typeface="Courier New" panose="02070309020205020404" pitchFamily="49" charset="0"/>
+              </a:rPr>
+              <a:t> Integer) </a:t>
+            </a:r>
+            <a:r>
+              <a:rPr lang="en-US" b="1" dirty="0">
+                <a:latin typeface="Courier New" panose="02070309020205020404" pitchFamily="49" charset="0"/>
+                <a:cs typeface="Courier New" panose="02070309020205020404" pitchFamily="49" charset="0"/>
+              </a:rPr>
+              <a:t>is</a:t>
+            </a:r>
+          </a:p>
+          <a:p>
+            <a:r>
+              <a:rPr lang="en-US" dirty="0">
+                <a:latin typeface="Courier New" panose="02070309020205020404" pitchFamily="49" charset="0"/>
+                <a:cs typeface="Courier New" panose="02070309020205020404" pitchFamily="49" charset="0"/>
+              </a:rPr>
+              <a:t>      </a:t>
+            </a:r>
+            <a:r>
+              <a:rPr lang="en-US" b="1" dirty="0">
+                <a:latin typeface="Courier New" panose="02070309020205020404" pitchFamily="49" charset="0"/>
+                <a:cs typeface="Courier New" panose="02070309020205020404" pitchFamily="49" charset="0"/>
+              </a:rPr>
+              <a:t>begin</a:t>
+            </a:r>
+          </a:p>
+          <a:p>
+            <a:r>
+              <a:rPr lang="en-US" dirty="0">
+                <a:latin typeface="Courier New" panose="02070309020205020404" pitchFamily="49" charset="0"/>
+                <a:cs typeface="Courier New" panose="02070309020205020404" pitchFamily="49" charset="0"/>
+              </a:rPr>
+              <a:t>         </a:t>
+            </a:r>
+            <a:r>
+              <a:rPr lang="en-US" b="1" dirty="0">
+                <a:latin typeface="Courier New" panose="02070309020205020404" pitchFamily="49" charset="0"/>
+                <a:cs typeface="Courier New" panose="02070309020205020404" pitchFamily="49" charset="0"/>
+              </a:rPr>
+              <a:t>if</a:t>
+            </a:r>
+            <a:r>
+              <a:rPr lang="en-US" dirty="0">
+                <a:latin typeface="Courier New" panose="02070309020205020404" pitchFamily="49" charset="0"/>
+                <a:cs typeface="Courier New" panose="02070309020205020404" pitchFamily="49" charset="0"/>
+              </a:rPr>
+              <a:t> Value + Delta &lt; 0 </a:t>
+            </a:r>
+            <a:r>
+              <a:rPr lang="en-US" b="1" dirty="0">
+                <a:latin typeface="Courier New" panose="02070309020205020404" pitchFamily="49" charset="0"/>
+                <a:cs typeface="Courier New" panose="02070309020205020404" pitchFamily="49" charset="0"/>
+              </a:rPr>
+              <a:t>then</a:t>
+            </a:r>
+          </a:p>
+          <a:p>
+            <a:r>
+              <a:rPr lang="en-US" dirty="0">
+                <a:latin typeface="Courier New" panose="02070309020205020404" pitchFamily="49" charset="0"/>
+                <a:cs typeface="Courier New" panose="02070309020205020404" pitchFamily="49" charset="0"/>
+              </a:rPr>
+              <a:t>            Value := 0;</a:t>
+            </a:r>
+          </a:p>
+          <a:p>
+            <a:r>
+              <a:rPr lang="en-US" dirty="0">
+                <a:latin typeface="Courier New" panose="02070309020205020404" pitchFamily="49" charset="0"/>
+                <a:cs typeface="Courier New" panose="02070309020205020404" pitchFamily="49" charset="0"/>
+              </a:rPr>
+              <a:t>         </a:t>
+            </a:r>
+            <a:r>
+              <a:rPr lang="en-US" b="1" dirty="0">
+                <a:latin typeface="Courier New" panose="02070309020205020404" pitchFamily="49" charset="0"/>
+                <a:cs typeface="Courier New" panose="02070309020205020404" pitchFamily="49" charset="0"/>
+              </a:rPr>
+              <a:t>else</a:t>
+            </a:r>
+          </a:p>
+          <a:p>
+            <a:r>
+              <a:rPr lang="en-US" dirty="0">
+                <a:latin typeface="Courier New" panose="02070309020205020404" pitchFamily="49" charset="0"/>
+                <a:cs typeface="Courier New" panose="02070309020205020404" pitchFamily="49" charset="0"/>
+              </a:rPr>
+              <a:t>            Value := Value + Delta;</a:t>
+            </a:r>
+          </a:p>
+          <a:p>
+            <a:r>
+              <a:rPr lang="en-US" dirty="0">
+                <a:latin typeface="Courier New" panose="02070309020205020404" pitchFamily="49" charset="0"/>
+                <a:cs typeface="Courier New" panose="02070309020205020404" pitchFamily="49" charset="0"/>
+              </a:rPr>
+              <a:t>         </a:t>
+            </a:r>
+            <a:r>
+              <a:rPr lang="en-US" b="1" dirty="0">
+                <a:latin typeface="Courier New" panose="02070309020205020404" pitchFamily="49" charset="0"/>
+                <a:cs typeface="Courier New" panose="02070309020205020404" pitchFamily="49" charset="0"/>
+              </a:rPr>
+              <a:t>end</a:t>
+            </a:r>
+            <a:r>
+              <a:rPr lang="en-US" dirty="0">
+                <a:latin typeface="Courier New" panose="02070309020205020404" pitchFamily="49" charset="0"/>
+                <a:cs typeface="Courier New" panose="02070309020205020404" pitchFamily="49" charset="0"/>
+              </a:rPr>
+              <a:t> </a:t>
+            </a:r>
+            <a:r>
+              <a:rPr lang="en-US" b="1" dirty="0">
+                <a:latin typeface="Courier New" panose="02070309020205020404" pitchFamily="49" charset="0"/>
+                <a:cs typeface="Courier New" panose="02070309020205020404" pitchFamily="49" charset="0"/>
+              </a:rPr>
+              <a:t>if</a:t>
+            </a:r>
+            <a:r>
+              <a:rPr lang="en-US" dirty="0">
+                <a:latin typeface="Courier New" panose="02070309020205020404" pitchFamily="49" charset="0"/>
+                <a:cs typeface="Courier New" panose="02070309020205020404" pitchFamily="49" charset="0"/>
+              </a:rPr>
+              <a:t>;</a:t>
+            </a:r>
+          </a:p>
+          <a:p>
+            <a:r>
+              <a:rPr lang="en-US" dirty="0">
+                <a:latin typeface="Courier New" panose="02070309020205020404" pitchFamily="49" charset="0"/>
+                <a:cs typeface="Courier New" panose="02070309020205020404" pitchFamily="49" charset="0"/>
+              </a:rPr>
+              <a:t>      </a:t>
+            </a:r>
+            <a:r>
+              <a:rPr lang="en-US" b="1" dirty="0">
+                <a:latin typeface="Courier New" panose="02070309020205020404" pitchFamily="49" charset="0"/>
+                <a:cs typeface="Courier New" panose="02070309020205020404" pitchFamily="49" charset="0"/>
+              </a:rPr>
+              <a:t>end</a:t>
+            </a:r>
+            <a:r>
+              <a:rPr lang="en-US" dirty="0">
+                <a:latin typeface="Courier New" panose="02070309020205020404" pitchFamily="49" charset="0"/>
+                <a:cs typeface="Courier New" panose="02070309020205020404" pitchFamily="49" charset="0"/>
+              </a:rPr>
+              <a:t> </a:t>
+            </a:r>
+            <a:r>
+              <a:rPr lang="en-US" dirty="0" err="1">
+                <a:latin typeface="Courier New" panose="02070309020205020404" pitchFamily="49" charset="0"/>
+                <a:cs typeface="Courier New" panose="02070309020205020404" pitchFamily="49" charset="0"/>
+              </a:rPr>
+              <a:t>Update_Value</a:t>
+            </a:r>
+            <a:r>
+              <a:rPr lang="en-US" dirty="0">
+                <a:latin typeface="Courier New" panose="02070309020205020404" pitchFamily="49" charset="0"/>
+                <a:cs typeface="Courier New" panose="02070309020205020404" pitchFamily="49" charset="0"/>
+              </a:rPr>
+              <a:t>;</a:t>
+            </a:r>
+          </a:p>
+          <a:p>
+            <a:endParaRPr lang="en-US" dirty="0">
+              <a:latin typeface="Courier New" panose="02070309020205020404" pitchFamily="49" charset="0"/>
+              <a:cs typeface="Courier New" panose="02070309020205020404" pitchFamily="49" charset="0"/>
+            </a:endParaRPr>
+          </a:p>
+          <a:p>
+            <a:r>
+              <a:rPr lang="en-US" dirty="0">
+                <a:latin typeface="Courier New" panose="02070309020205020404" pitchFamily="49" charset="0"/>
+                <a:cs typeface="Courier New" panose="02070309020205020404" pitchFamily="49" charset="0"/>
+              </a:rPr>
+              <a:t>      -- </a:t>
+            </a:r>
+            <a:r>
+              <a:rPr lang="en-US" dirty="0" err="1">
+                <a:latin typeface="Courier New" panose="02070309020205020404" pitchFamily="49" charset="0"/>
+                <a:cs typeface="Courier New" panose="02070309020205020404" pitchFamily="49" charset="0"/>
+              </a:rPr>
+              <a:t>etc</a:t>
+            </a:r>
+            <a:r>
+              <a:rPr lang="en-US" dirty="0">
+                <a:latin typeface="Courier New" panose="02070309020205020404" pitchFamily="49" charset="0"/>
+                <a:cs typeface="Courier New" panose="02070309020205020404" pitchFamily="49" charset="0"/>
+              </a:rPr>
+              <a:t>…</a:t>
+            </a:r>
+          </a:p>
+          <a:p>
+            <a:r>
+              <a:rPr lang="en-US" b="1" dirty="0">
+                <a:latin typeface="Courier New" panose="02070309020205020404" pitchFamily="49" charset="0"/>
+                <a:cs typeface="Courier New" panose="02070309020205020404" pitchFamily="49" charset="0"/>
+              </a:rPr>
+              <a:t>   end</a:t>
+            </a:r>
+            <a:r>
+              <a:rPr lang="en-US" dirty="0">
+                <a:latin typeface="Courier New" panose="02070309020205020404" pitchFamily="49" charset="0"/>
+                <a:cs typeface="Courier New" panose="02070309020205020404" pitchFamily="49" charset="0"/>
+              </a:rPr>
+              <a:t> </a:t>
+            </a:r>
+            <a:r>
+              <a:rPr lang="en-US" dirty="0" err="1">
+                <a:latin typeface="Courier New" panose="02070309020205020404" pitchFamily="49" charset="0"/>
+                <a:cs typeface="Courier New" panose="02070309020205020404" pitchFamily="49" charset="0"/>
+              </a:rPr>
+              <a:t>Integer_Holder</a:t>
+            </a:r>
+            <a:r>
+              <a:rPr lang="en-US" dirty="0">
+                <a:latin typeface="Courier New" panose="02070309020205020404" pitchFamily="49" charset="0"/>
+                <a:cs typeface="Courier New" panose="02070309020205020404" pitchFamily="49" charset="0"/>
+              </a:rPr>
+              <a:t>;</a:t>
+            </a:r>
+          </a:p>
+          <a:p>
+            <a:endParaRPr lang="en-US" dirty="0">
+              <a:latin typeface="Courier New" panose="02070309020205020404" pitchFamily="49" charset="0"/>
+              <a:cs typeface="Courier New" panose="02070309020205020404" pitchFamily="49" charset="0"/>
+            </a:endParaRPr>
+          </a:p>
+          <a:p>
+            <a:r>
+              <a:rPr lang="en-US" b="1" dirty="0">
+                <a:latin typeface="Courier New" panose="02070309020205020404" pitchFamily="49" charset="0"/>
+                <a:cs typeface="Courier New" panose="02070309020205020404" pitchFamily="49" charset="0"/>
+              </a:rPr>
+              <a:t>end</a:t>
+            </a:r>
+            <a:r>
+              <a:rPr lang="en-US" dirty="0">
+                <a:latin typeface="Courier New" panose="02070309020205020404" pitchFamily="49" charset="0"/>
+                <a:cs typeface="Courier New" panose="02070309020205020404" pitchFamily="49" charset="0"/>
+              </a:rPr>
+              <a:t> Example;</a:t>
             </a:r>
           </a:p>
         </p:txBody>
@@ -6098,7 +7563,7 @@
     </p:spTree>
     <p:extLst>
       <p:ext uri="{BB962C8B-B14F-4D97-AF65-F5344CB8AC3E}">
-        <p14:creationId xmlns:p14="http://schemas.microsoft.com/office/powerpoint/2010/main" val="1732198395"/>
+        <p14:creationId xmlns:p14="http://schemas.microsoft.com/office/powerpoint/2010/main" val="963301128"/>
       </p:ext>
     </p:extLst>
   </p:cSld>
@@ -6130,7 +7595,7 @@
           <p:cNvPr id="2" name="Title 1">
             <a:extLst>
               <a:ext uri="{FF2B5EF4-FFF2-40B4-BE49-F238E27FC236}">
-                <a16:creationId xmlns:a16="http://schemas.microsoft.com/office/drawing/2014/main" id="{28F14640-6503-4EED-B8DC-F6E191E3CF83}"/>
+                <a16:creationId xmlns:a16="http://schemas.microsoft.com/office/drawing/2014/main" id="{B70BA843-3C0E-40C3-90E1-6BC5615B901E}"/>
               </a:ext>
             </a:extLst>
           </p:cNvPr>
@@ -6148,78 +7613,401 @@
           <a:p>
             <a:r>
               <a:rPr lang="en-US" dirty="0"/>
-              <a:t>General Ravenscar System</a:t>
-            </a:r>
-          </a:p>
-        </p:txBody>
-      </p:sp>
-      <p:graphicFrame>
-        <p:nvGraphicFramePr>
-          <p:cNvPr id="4" name="Object 3">
-            <a:extLst>
-              <a:ext uri="{FF2B5EF4-FFF2-40B4-BE49-F238E27FC236}">
-                <a16:creationId xmlns:a16="http://schemas.microsoft.com/office/drawing/2014/main" id="{D7CB1DDB-A130-4009-9839-30B5035882F6}"/>
-              </a:ext>
-            </a:extLst>
-          </p:cNvPr>
-          <p:cNvGraphicFramePr>
-            <a:graphicFrameLocks noChangeAspect="1"/>
-          </p:cNvGraphicFramePr>
-          <p:nvPr>
-            <p:extLst>
-              <p:ext uri="{D42A27DB-BD31-4B8C-83A1-F6EECF244321}">
-                <p14:modId xmlns:p14="http://schemas.microsoft.com/office/powerpoint/2010/main" val="3713236866"/>
-              </p:ext>
-            </p:extLst>
-          </p:nvPr>
-        </p:nvGraphicFramePr>
-        <p:xfrm>
-          <a:off x="3764756" y="2629694"/>
-          <a:ext cx="4662488" cy="2743200"/>
-        </p:xfrm>
-        <a:graphic>
-          <a:graphicData uri="http://schemas.openxmlformats.org/presentationml/2006/ole">
-            <mc:AlternateContent xmlns:mc="http://schemas.openxmlformats.org/markup-compatibility/2006">
-              <mc:Choice xmlns:v="urn:schemas-microsoft-com:vml" Requires="v">
-                <p:oleObj spid="_x0000_s1031" name="Acrobat Document" r:id="rId3" imgW="4663262" imgH="2743200" progId="Acrobat.Document.DC">
-                  <p:embed/>
-                </p:oleObj>
-              </mc:Choice>
-              <mc:Fallback>
-                <p:oleObj name="Acrobat Document" r:id="rId3" imgW="4663262" imgH="2743200" progId="Acrobat.Document.DC">
-                  <p:embed/>
-                  <p:pic>
-                    <p:nvPicPr>
-                      <p:cNvPr id="0" name=""/>
-                      <p:cNvPicPr/>
-                      <p:nvPr/>
-                    </p:nvPicPr>
-                    <p:blipFill>
-                      <a:blip r:embed="rId4"/>
-                      <a:stretch>
-                        <a:fillRect/>
-                      </a:stretch>
-                    </p:blipFill>
-                    <p:spPr>
-                      <a:xfrm>
-                        <a:off x="3764756" y="2629694"/>
-                        <a:ext cx="4662488" cy="2743200"/>
-                      </a:xfrm>
-                      <a:prstGeom prst="rect">
-                        <a:avLst/>
-                      </a:prstGeom>
-                    </p:spPr>
-                  </p:pic>
-                </p:oleObj>
-              </mc:Fallback>
-            </mc:AlternateContent>
-          </a:graphicData>
-        </a:graphic>
-      </p:graphicFrame>
+              <a:t>Ada Protected Objects (Body #3)</a:t>
+            </a:r>
+          </a:p>
+        </p:txBody>
+      </p:sp>
+      <p:sp>
+        <p:nvSpPr>
+          <p:cNvPr id="4" name="TextBox 3">
+            <a:extLst>
+              <a:ext uri="{FF2B5EF4-FFF2-40B4-BE49-F238E27FC236}">
+                <a16:creationId xmlns:a16="http://schemas.microsoft.com/office/drawing/2014/main" id="{48C2F5CA-4F95-4434-AE88-E3A6E9434820}"/>
+              </a:ext>
+            </a:extLst>
+          </p:cNvPr>
+          <p:cNvSpPr txBox="1"/>
+          <p:nvPr/>
+        </p:nvSpPr>
+        <p:spPr>
+          <a:xfrm>
+            <a:off x="1233996" y="1690688"/>
+            <a:ext cx="8456161" cy="3693319"/>
+          </a:xfrm>
+          <a:prstGeom prst="rect">
+            <a:avLst/>
+          </a:prstGeom>
+          <a:noFill/>
+        </p:spPr>
+        <p:txBody>
+          <a:bodyPr wrap="none" rtlCol="0">
+            <a:spAutoFit/>
+          </a:bodyPr>
+          <a:lstStyle/>
+          <a:p>
+            <a:r>
+              <a:rPr lang="en-US" b="1" dirty="0">
+                <a:latin typeface="Courier New" panose="02070309020205020404" pitchFamily="49" charset="0"/>
+                <a:cs typeface="Courier New" panose="02070309020205020404" pitchFamily="49" charset="0"/>
+              </a:rPr>
+              <a:t>package</a:t>
+            </a:r>
+            <a:r>
+              <a:rPr lang="en-US" dirty="0">
+                <a:latin typeface="Courier New" panose="02070309020205020404" pitchFamily="49" charset="0"/>
+                <a:cs typeface="Courier New" panose="02070309020205020404" pitchFamily="49" charset="0"/>
+              </a:rPr>
+              <a:t> </a:t>
+            </a:r>
+            <a:r>
+              <a:rPr lang="en-US" b="1" dirty="0">
+                <a:latin typeface="Courier New" panose="02070309020205020404" pitchFamily="49" charset="0"/>
+                <a:cs typeface="Courier New" panose="02070309020205020404" pitchFamily="49" charset="0"/>
+              </a:rPr>
+              <a:t>body</a:t>
+            </a:r>
+            <a:r>
+              <a:rPr lang="en-US" dirty="0">
+                <a:latin typeface="Courier New" panose="02070309020205020404" pitchFamily="49" charset="0"/>
+                <a:cs typeface="Courier New" panose="02070309020205020404" pitchFamily="49" charset="0"/>
+              </a:rPr>
+              <a:t> Example </a:t>
+            </a:r>
+            <a:r>
+              <a:rPr lang="en-US" b="1" dirty="0">
+                <a:latin typeface="Courier New" panose="02070309020205020404" pitchFamily="49" charset="0"/>
+                <a:cs typeface="Courier New" panose="02070309020205020404" pitchFamily="49" charset="0"/>
+              </a:rPr>
+              <a:t>is</a:t>
+            </a:r>
+          </a:p>
+          <a:p>
+            <a:endParaRPr lang="en-US" dirty="0">
+              <a:latin typeface="Courier New" panose="02070309020205020404" pitchFamily="49" charset="0"/>
+              <a:cs typeface="Courier New" panose="02070309020205020404" pitchFamily="49" charset="0"/>
+            </a:endParaRPr>
+          </a:p>
+          <a:p>
+            <a:r>
+              <a:rPr lang="en-US" dirty="0">
+                <a:latin typeface="Courier New" panose="02070309020205020404" pitchFamily="49" charset="0"/>
+                <a:cs typeface="Courier New" panose="02070309020205020404" pitchFamily="49" charset="0"/>
+              </a:rPr>
+              <a:t>   </a:t>
+            </a:r>
+            <a:r>
+              <a:rPr lang="en-US" b="1" dirty="0">
+                <a:latin typeface="Courier New" panose="02070309020205020404" pitchFamily="49" charset="0"/>
+                <a:cs typeface="Courier New" panose="02070309020205020404" pitchFamily="49" charset="0"/>
+              </a:rPr>
+              <a:t>protected</a:t>
+            </a:r>
+            <a:r>
+              <a:rPr lang="en-US" dirty="0">
+                <a:latin typeface="Courier New" panose="02070309020205020404" pitchFamily="49" charset="0"/>
+                <a:cs typeface="Courier New" panose="02070309020205020404" pitchFamily="49" charset="0"/>
+              </a:rPr>
+              <a:t> </a:t>
+            </a:r>
+            <a:r>
+              <a:rPr lang="en-US" b="1" dirty="0">
+                <a:latin typeface="Courier New" panose="02070309020205020404" pitchFamily="49" charset="0"/>
+                <a:cs typeface="Courier New" panose="02070309020205020404" pitchFamily="49" charset="0"/>
+              </a:rPr>
+              <a:t>body</a:t>
+            </a:r>
+            <a:r>
+              <a:rPr lang="en-US" dirty="0">
+                <a:latin typeface="Courier New" panose="02070309020205020404" pitchFamily="49" charset="0"/>
+                <a:cs typeface="Courier New" panose="02070309020205020404" pitchFamily="49" charset="0"/>
+              </a:rPr>
+              <a:t> </a:t>
+            </a:r>
+            <a:r>
+              <a:rPr lang="en-US" dirty="0" err="1">
+                <a:latin typeface="Courier New" panose="02070309020205020404" pitchFamily="49" charset="0"/>
+                <a:cs typeface="Courier New" panose="02070309020205020404" pitchFamily="49" charset="0"/>
+              </a:rPr>
+              <a:t>Integer_Holder</a:t>
+            </a:r>
+            <a:r>
+              <a:rPr lang="en-US" dirty="0">
+                <a:latin typeface="Courier New" panose="02070309020205020404" pitchFamily="49" charset="0"/>
+                <a:cs typeface="Courier New" panose="02070309020205020404" pitchFamily="49" charset="0"/>
+              </a:rPr>
+              <a:t> </a:t>
+            </a:r>
+            <a:r>
+              <a:rPr lang="en-US" b="1" dirty="0">
+                <a:latin typeface="Courier New" panose="02070309020205020404" pitchFamily="49" charset="0"/>
+                <a:cs typeface="Courier New" panose="02070309020205020404" pitchFamily="49" charset="0"/>
+              </a:rPr>
+              <a:t>is</a:t>
+            </a:r>
+            <a:endParaRPr lang="en-US" dirty="0">
+              <a:latin typeface="Courier New" panose="02070309020205020404" pitchFamily="49" charset="0"/>
+              <a:cs typeface="Courier New" panose="02070309020205020404" pitchFamily="49" charset="0"/>
+            </a:endParaRPr>
+          </a:p>
+          <a:p>
+            <a:r>
+              <a:rPr lang="en-US" dirty="0">
+                <a:latin typeface="Courier New" panose="02070309020205020404" pitchFamily="49" charset="0"/>
+                <a:cs typeface="Courier New" panose="02070309020205020404" pitchFamily="49" charset="0"/>
+              </a:rPr>
+              <a:t>      -- </a:t>
+            </a:r>
+            <a:r>
+              <a:rPr lang="en-US" dirty="0" err="1">
+                <a:latin typeface="Courier New" panose="02070309020205020404" pitchFamily="49" charset="0"/>
+                <a:cs typeface="Courier New" panose="02070309020205020404" pitchFamily="49" charset="0"/>
+              </a:rPr>
+              <a:t>etc</a:t>
+            </a:r>
+            <a:r>
+              <a:rPr lang="en-US" dirty="0">
+                <a:latin typeface="Courier New" panose="02070309020205020404" pitchFamily="49" charset="0"/>
+                <a:cs typeface="Courier New" panose="02070309020205020404" pitchFamily="49" charset="0"/>
+              </a:rPr>
+              <a:t>…</a:t>
+            </a:r>
+          </a:p>
+          <a:p>
+            <a:endParaRPr lang="en-US" dirty="0">
+              <a:latin typeface="Courier New" panose="02070309020205020404" pitchFamily="49" charset="0"/>
+              <a:cs typeface="Courier New" panose="02070309020205020404" pitchFamily="49" charset="0"/>
+            </a:endParaRPr>
+          </a:p>
+          <a:p>
+            <a:r>
+              <a:rPr lang="en-US" dirty="0">
+                <a:latin typeface="Courier New" panose="02070309020205020404" pitchFamily="49" charset="0"/>
+                <a:cs typeface="Courier New" panose="02070309020205020404" pitchFamily="49" charset="0"/>
+              </a:rPr>
+              <a:t>      </a:t>
+            </a:r>
+            <a:r>
+              <a:rPr lang="en-US" b="1" dirty="0">
+                <a:latin typeface="Courier New" panose="02070309020205020404" pitchFamily="49" charset="0"/>
+                <a:cs typeface="Courier New" panose="02070309020205020404" pitchFamily="49" charset="0"/>
+              </a:rPr>
+              <a:t>entry</a:t>
+            </a:r>
+            <a:r>
+              <a:rPr lang="en-US" dirty="0">
+                <a:latin typeface="Courier New" panose="02070309020205020404" pitchFamily="49" charset="0"/>
+                <a:cs typeface="Courier New" panose="02070309020205020404" pitchFamily="49" charset="0"/>
+              </a:rPr>
+              <a:t> </a:t>
+            </a:r>
+            <a:r>
+              <a:rPr lang="en-US" dirty="0" err="1">
+                <a:latin typeface="Courier New" panose="02070309020205020404" pitchFamily="49" charset="0"/>
+                <a:cs typeface="Courier New" panose="02070309020205020404" pitchFamily="49" charset="0"/>
+              </a:rPr>
+              <a:t>Wait_For_Zero</a:t>
+            </a:r>
+            <a:r>
+              <a:rPr lang="en-US" dirty="0">
+                <a:latin typeface="Courier New" panose="02070309020205020404" pitchFamily="49" charset="0"/>
+                <a:cs typeface="Courier New" panose="02070309020205020404" pitchFamily="49" charset="0"/>
+              </a:rPr>
+              <a:t>(</a:t>
+            </a:r>
+            <a:r>
+              <a:rPr lang="en-US" dirty="0" err="1">
+                <a:latin typeface="Courier New" panose="02070309020205020404" pitchFamily="49" charset="0"/>
+                <a:cs typeface="Courier New" panose="02070309020205020404" pitchFamily="49" charset="0"/>
+              </a:rPr>
+              <a:t>New_Value</a:t>
+            </a:r>
+            <a:r>
+              <a:rPr lang="en-US" dirty="0">
+                <a:latin typeface="Courier New" panose="02070309020205020404" pitchFamily="49" charset="0"/>
+                <a:cs typeface="Courier New" panose="02070309020205020404" pitchFamily="49" charset="0"/>
+              </a:rPr>
+              <a:t> : </a:t>
+            </a:r>
+            <a:r>
+              <a:rPr lang="en-US" b="1" dirty="0">
+                <a:latin typeface="Courier New" panose="02070309020205020404" pitchFamily="49" charset="0"/>
+                <a:cs typeface="Courier New" panose="02070309020205020404" pitchFamily="49" charset="0"/>
+              </a:rPr>
+              <a:t>in</a:t>
+            </a:r>
+            <a:r>
+              <a:rPr lang="en-US" dirty="0">
+                <a:latin typeface="Courier New" panose="02070309020205020404" pitchFamily="49" charset="0"/>
+                <a:cs typeface="Courier New" panose="02070309020205020404" pitchFamily="49" charset="0"/>
+              </a:rPr>
+              <a:t> Integer)</a:t>
+            </a:r>
+          </a:p>
+          <a:p>
+            <a:r>
+              <a:rPr lang="en-US" dirty="0">
+                <a:latin typeface="Courier New" panose="02070309020205020404" pitchFamily="49" charset="0"/>
+                <a:cs typeface="Courier New" panose="02070309020205020404" pitchFamily="49" charset="0"/>
+              </a:rPr>
+              <a:t>        </a:t>
+            </a:r>
+            <a:r>
+              <a:rPr lang="en-US" b="1" dirty="0">
+                <a:latin typeface="Courier New" panose="02070309020205020404" pitchFamily="49" charset="0"/>
+                <a:cs typeface="Courier New" panose="02070309020205020404" pitchFamily="49" charset="0"/>
+              </a:rPr>
+              <a:t>when</a:t>
+            </a:r>
+            <a:r>
+              <a:rPr lang="en-US" dirty="0">
+                <a:latin typeface="Courier New" panose="02070309020205020404" pitchFamily="49" charset="0"/>
+                <a:cs typeface="Courier New" panose="02070309020205020404" pitchFamily="49" charset="0"/>
+              </a:rPr>
+              <a:t> Value = 0 </a:t>
+            </a:r>
+            <a:r>
+              <a:rPr lang="en-US" b="1" dirty="0">
+                <a:latin typeface="Courier New" panose="02070309020205020404" pitchFamily="49" charset="0"/>
+                <a:cs typeface="Courier New" panose="02070309020205020404" pitchFamily="49" charset="0"/>
+              </a:rPr>
+              <a:t>is</a:t>
+            </a:r>
+          </a:p>
+          <a:p>
+            <a:r>
+              <a:rPr lang="en-US" dirty="0">
+                <a:latin typeface="Courier New" panose="02070309020205020404" pitchFamily="49" charset="0"/>
+                <a:cs typeface="Courier New" panose="02070309020205020404" pitchFamily="49" charset="0"/>
+              </a:rPr>
+              <a:t>      </a:t>
+            </a:r>
+            <a:r>
+              <a:rPr lang="en-US" b="1" dirty="0">
+                <a:latin typeface="Courier New" panose="02070309020205020404" pitchFamily="49" charset="0"/>
+                <a:cs typeface="Courier New" panose="02070309020205020404" pitchFamily="49" charset="0"/>
+              </a:rPr>
+              <a:t>begin</a:t>
+            </a:r>
+          </a:p>
+          <a:p>
+            <a:r>
+              <a:rPr lang="en-US" dirty="0">
+                <a:latin typeface="Courier New" panose="02070309020205020404" pitchFamily="49" charset="0"/>
+                <a:cs typeface="Courier New" panose="02070309020205020404" pitchFamily="49" charset="0"/>
+              </a:rPr>
+              <a:t>         Value := </a:t>
+            </a:r>
+            <a:r>
+              <a:rPr lang="en-US" dirty="0" err="1">
+                <a:latin typeface="Courier New" panose="02070309020205020404" pitchFamily="49" charset="0"/>
+                <a:cs typeface="Courier New" panose="02070309020205020404" pitchFamily="49" charset="0"/>
+              </a:rPr>
+              <a:t>New_Value</a:t>
+            </a:r>
+            <a:r>
+              <a:rPr lang="en-US" dirty="0">
+                <a:latin typeface="Courier New" panose="02070309020205020404" pitchFamily="49" charset="0"/>
+                <a:cs typeface="Courier New" panose="02070309020205020404" pitchFamily="49" charset="0"/>
+              </a:rPr>
+              <a:t>;  -- Include check for negative?</a:t>
+            </a:r>
+          </a:p>
+          <a:p>
+            <a:r>
+              <a:rPr lang="en-US" dirty="0">
+                <a:latin typeface="Courier New" panose="02070309020205020404" pitchFamily="49" charset="0"/>
+                <a:cs typeface="Courier New" panose="02070309020205020404" pitchFamily="49" charset="0"/>
+              </a:rPr>
+              <a:t>      </a:t>
+            </a:r>
+            <a:r>
+              <a:rPr lang="en-US" b="1" dirty="0">
+                <a:latin typeface="Courier New" panose="02070309020205020404" pitchFamily="49" charset="0"/>
+                <a:cs typeface="Courier New" panose="02070309020205020404" pitchFamily="49" charset="0"/>
+              </a:rPr>
+              <a:t>end</a:t>
+            </a:r>
+            <a:r>
+              <a:rPr lang="en-US" dirty="0">
+                <a:latin typeface="Courier New" panose="02070309020205020404" pitchFamily="49" charset="0"/>
+                <a:cs typeface="Courier New" panose="02070309020205020404" pitchFamily="49" charset="0"/>
+              </a:rPr>
+              <a:t> </a:t>
+            </a:r>
+            <a:r>
+              <a:rPr lang="en-US" dirty="0" err="1">
+                <a:latin typeface="Courier New" panose="02070309020205020404" pitchFamily="49" charset="0"/>
+                <a:cs typeface="Courier New" panose="02070309020205020404" pitchFamily="49" charset="0"/>
+              </a:rPr>
+              <a:t>Wait_For_Zero</a:t>
+            </a:r>
+            <a:r>
+              <a:rPr lang="en-US" dirty="0">
+                <a:latin typeface="Courier New" panose="02070309020205020404" pitchFamily="49" charset="0"/>
+                <a:cs typeface="Courier New" panose="02070309020205020404" pitchFamily="49" charset="0"/>
+              </a:rPr>
+              <a:t>;</a:t>
+            </a:r>
+          </a:p>
+          <a:p>
+            <a:r>
+              <a:rPr lang="en-US" b="1" dirty="0">
+                <a:latin typeface="Courier New" panose="02070309020205020404" pitchFamily="49" charset="0"/>
+                <a:cs typeface="Courier New" panose="02070309020205020404" pitchFamily="49" charset="0"/>
+              </a:rPr>
+              <a:t>   end</a:t>
+            </a:r>
+            <a:r>
+              <a:rPr lang="en-US" dirty="0">
+                <a:latin typeface="Courier New" panose="02070309020205020404" pitchFamily="49" charset="0"/>
+                <a:cs typeface="Courier New" panose="02070309020205020404" pitchFamily="49" charset="0"/>
+              </a:rPr>
+              <a:t> </a:t>
+            </a:r>
+            <a:r>
+              <a:rPr lang="en-US" dirty="0" err="1">
+                <a:latin typeface="Courier New" panose="02070309020205020404" pitchFamily="49" charset="0"/>
+                <a:cs typeface="Courier New" panose="02070309020205020404" pitchFamily="49" charset="0"/>
+              </a:rPr>
+              <a:t>Integer_Holder</a:t>
+            </a:r>
+            <a:r>
+              <a:rPr lang="en-US" dirty="0">
+                <a:latin typeface="Courier New" panose="02070309020205020404" pitchFamily="49" charset="0"/>
+                <a:cs typeface="Courier New" panose="02070309020205020404" pitchFamily="49" charset="0"/>
+              </a:rPr>
+              <a:t>;</a:t>
+            </a:r>
+          </a:p>
+          <a:p>
+            <a:endParaRPr lang="en-US" dirty="0">
+              <a:latin typeface="Courier New" panose="02070309020205020404" pitchFamily="49" charset="0"/>
+              <a:cs typeface="Courier New" panose="02070309020205020404" pitchFamily="49" charset="0"/>
+            </a:endParaRPr>
+          </a:p>
+          <a:p>
+            <a:r>
+              <a:rPr lang="en-US" b="1" dirty="0">
+                <a:latin typeface="Courier New" panose="02070309020205020404" pitchFamily="49" charset="0"/>
+                <a:cs typeface="Courier New" panose="02070309020205020404" pitchFamily="49" charset="0"/>
+              </a:rPr>
+              <a:t>end</a:t>
+            </a:r>
+            <a:r>
+              <a:rPr lang="en-US" dirty="0">
+                <a:latin typeface="Courier New" panose="02070309020205020404" pitchFamily="49" charset="0"/>
+                <a:cs typeface="Courier New" panose="02070309020205020404" pitchFamily="49" charset="0"/>
+              </a:rPr>
+              <a:t> Example;</a:t>
+            </a:r>
+          </a:p>
+        </p:txBody>
+      </p:sp>
     </p:spTree>
     <p:extLst>
       <p:ext uri="{BB962C8B-B14F-4D97-AF65-F5344CB8AC3E}">
-        <p14:creationId xmlns:p14="http://schemas.microsoft.com/office/powerpoint/2010/main" val="4194120168"/>
+        <p14:creationId xmlns:p14="http://schemas.microsoft.com/office/powerpoint/2010/main" val="1722152541"/>
       </p:ext>
     </p:extLst>
   </p:cSld>

</xml_diff>